<commit_message>
Final Version (candidate) - Presentation5 fail2ban
</commit_message>
<xml_diff>
--- a/MondayPresentations/5_fail2ban/Fail2Ban.pptx
+++ b/MondayPresentations/5_fail2ban/Fail2Ban.pptx
@@ -5,7 +5,7 @@
     <p:sldMasterId id="2147483648" r:id="rId1"/>
   </p:sldMasterIdLst>
   <p:notesMasterIdLst>
-    <p:notesMasterId r:id="rId7"/>
+    <p:notesMasterId r:id="rId16"/>
   </p:notesMasterIdLst>
   <p:sldIdLst>
     <p:sldId id="256" r:id="rId2"/>
@@ -13,6 +13,15 @@
     <p:sldId id="259" r:id="rId4"/>
     <p:sldId id="257" r:id="rId5"/>
     <p:sldId id="260" r:id="rId6"/>
+    <p:sldId id="261" r:id="rId7"/>
+    <p:sldId id="263" r:id="rId8"/>
+    <p:sldId id="267" r:id="rId9"/>
+    <p:sldId id="270" r:id="rId10"/>
+    <p:sldId id="272" r:id="rId11"/>
+    <p:sldId id="273" r:id="rId12"/>
+    <p:sldId id="264" r:id="rId13"/>
+    <p:sldId id="275" r:id="rId14"/>
+    <p:sldId id="274" r:id="rId15"/>
   </p:sldIdLst>
   <p:sldSz cx="12192000" cy="6858000"/>
   <p:notesSz cx="6858000" cy="9144000"/>
@@ -4387,7 +4396,10 @@
     <p:bg>
       <p:bgPr>
         <a:solidFill>
-          <a:schemeClr val="bg1"/>
+          <a:schemeClr val="bg1">
+            <a:tint val="95000"/>
+            <a:satMod val="170000"/>
+          </a:schemeClr>
         </a:solidFill>
         <a:effectLst/>
       </p:bgPr>
@@ -4408,10 +4420,10 @@
       </p:grpSpPr>
       <p:sp>
         <p:nvSpPr>
-          <p:cNvPr id="18" name="Rectangle 17">
-            <a:extLst>
-              <a:ext uri="{FF2B5EF4-FFF2-40B4-BE49-F238E27FC236}">
-                <a16:creationId xmlns:a16="http://schemas.microsoft.com/office/drawing/2014/main" id="{ACBE1851-2230-47A9-B000-CE9046EA61B9}"/>
+          <p:cNvPr id="36" name="Freeform: Shape 35">
+            <a:extLst>
+              <a:ext uri="{FF2B5EF4-FFF2-40B4-BE49-F238E27FC236}">
+                <a16:creationId xmlns:a16="http://schemas.microsoft.com/office/drawing/2014/main" id="{1DB7C82F-AB7E-4F0C-B829-FA1B9C415180}"/>
               </a:ext>
               <a:ext uri="{C183D7F6-B498-43B3-948B-1728B52AA6E4}">
                 <adec:decorative xmlns:adec="http://schemas.microsoft.com/office/drawing/2017/decorative" val="1"/>
@@ -4430,15 +4442,88 @@
           </p:nvPr>
         </p:nvSpPr>
         <p:spPr>
-          <a:xfrm>
+          <a:xfrm flipH="1">
             <a:off x="0" y="0"/>
-            <a:ext cx="5468548" cy="6858000"/>
-          </a:xfrm>
-          <a:prstGeom prst="rect">
+            <a:ext cx="6172782" cy="6858000"/>
+          </a:xfrm>
+          <a:custGeom>
             <a:avLst/>
-          </a:prstGeom>
+            <a:gdLst>
+              <a:gd name="connsiteX0" fmla="*/ 6172782 w 6172782"/>
+              <a:gd name="connsiteY0" fmla="*/ 0 h 6858000"/>
+              <a:gd name="connsiteX1" fmla="*/ 69075 w 6172782"/>
+              <a:gd name="connsiteY1" fmla="*/ 0 h 6858000"/>
+              <a:gd name="connsiteX2" fmla="*/ 35131 w 6172782"/>
+              <a:gd name="connsiteY2" fmla="*/ 267128 h 6858000"/>
+              <a:gd name="connsiteX3" fmla="*/ 0 w 6172782"/>
+              <a:gd name="connsiteY3" fmla="*/ 962845 h 6858000"/>
+              <a:gd name="connsiteX4" fmla="*/ 3276103 w 6172782"/>
+              <a:gd name="connsiteY4" fmla="*/ 6782205 h 6858000"/>
+              <a:gd name="connsiteX5" fmla="*/ 3407923 w 6172782"/>
+              <a:gd name="connsiteY5" fmla="*/ 6858000 h 6858000"/>
+              <a:gd name="connsiteX6" fmla="*/ 6172782 w 6172782"/>
+              <a:gd name="connsiteY6" fmla="*/ 6858000 h 6858000"/>
+            </a:gdLst>
+            <a:ahLst/>
+            <a:cxnLst>
+              <a:cxn ang="0">
+                <a:pos x="connsiteX0" y="connsiteY0"/>
+              </a:cxn>
+              <a:cxn ang="0">
+                <a:pos x="connsiteX1" y="connsiteY1"/>
+              </a:cxn>
+              <a:cxn ang="0">
+                <a:pos x="connsiteX2" y="connsiteY2"/>
+              </a:cxn>
+              <a:cxn ang="0">
+                <a:pos x="connsiteX3" y="connsiteY3"/>
+              </a:cxn>
+              <a:cxn ang="0">
+                <a:pos x="connsiteX4" y="connsiteY4"/>
+              </a:cxn>
+              <a:cxn ang="0">
+                <a:pos x="connsiteX5" y="connsiteY5"/>
+              </a:cxn>
+              <a:cxn ang="0">
+                <a:pos x="connsiteX6" y="connsiteY6"/>
+              </a:cxn>
+            </a:cxnLst>
+            <a:rect l="l" t="t" r="r" b="b"/>
+            <a:pathLst>
+              <a:path w="6172782" h="6858000">
+                <a:moveTo>
+                  <a:pt x="6172782" y="0"/>
+                </a:moveTo>
+                <a:lnTo>
+                  <a:pt x="69075" y="0"/>
+                </a:lnTo>
+                <a:lnTo>
+                  <a:pt x="35131" y="267128"/>
+                </a:lnTo>
+                <a:cubicBezTo>
+                  <a:pt x="11901" y="495874"/>
+                  <a:pt x="0" y="727970"/>
+                  <a:pt x="0" y="962845"/>
+                </a:cubicBezTo>
+                <a:cubicBezTo>
+                  <a:pt x="0" y="3429034"/>
+                  <a:pt x="1312002" y="5588789"/>
+                  <a:pt x="3276103" y="6782205"/>
+                </a:cubicBezTo>
+                <a:lnTo>
+                  <a:pt x="3407923" y="6858000"/>
+                </a:lnTo>
+                <a:lnTo>
+                  <a:pt x="6172782" y="6858000"/>
+                </a:lnTo>
+                <a:close/>
+              </a:path>
+            </a:pathLst>
+          </a:custGeom>
           <a:solidFill>
-            <a:srgbClr val="42724E"/>
+            <a:srgbClr val="FFFFFF">
+              <a:alpha val="80000"/>
+            </a:srgbClr>
           </a:solidFill>
           <a:ln>
             <a:noFill/>
@@ -4461,68 +4546,45 @@
           </a:fontRef>
         </p:style>
         <p:txBody>
-          <a:bodyPr rtlCol="0" anchor="ctr"/>
-          <a:lstStyle/>
-          <a:p>
-            <a:pPr algn="ctr"/>
-            <a:endParaRPr lang="en-US"/>
-          </a:p>
-        </p:txBody>
-      </p:sp>
-      <p:cxnSp>
-        <p:nvCxnSpPr>
-          <p:cNvPr id="20" name="Straight Connector 19">
-            <a:extLst>
-              <a:ext uri="{FF2B5EF4-FFF2-40B4-BE49-F238E27FC236}">
-                <a16:creationId xmlns:a16="http://schemas.microsoft.com/office/drawing/2014/main" id="{23B93832-6514-44F4-849B-5EE2C8A2337D}"/>
-              </a:ext>
-              <a:ext uri="{C183D7F6-B498-43B3-948B-1728B52AA6E4}">
-                <adec:decorative xmlns:adec="http://schemas.microsoft.com/office/drawing/2017/decorative" val="1"/>
-              </a:ext>
-            </a:extLst>
-          </p:cNvPr>
-          <p:cNvCxnSpPr>
-            <a:cxnSpLocks noGrp="1" noRot="1" noChangeAspect="1" noMove="1" noResize="1" noEditPoints="1" noAdjustHandles="1" noChangeArrowheads="1" noChangeShapeType="1"/>
-          </p:cNvCxnSpPr>
-          <p:nvPr>
-            <p:extLst>
-              <p:ext uri="{386F3935-93C4-4BCD-93E2-E3B085C9AB24}">
-                <p16:designElem xmlns:p16="http://schemas.microsoft.com/office/powerpoint/2015/main" val="1"/>
-              </p:ext>
-            </p:extLst>
-          </p:nvPr>
-        </p:nvCxnSpPr>
-        <p:spPr>
-          <a:xfrm>
-            <a:off x="786679" y="3928939"/>
-            <a:ext cx="3931920" cy="0"/>
-          </a:xfrm>
-          <a:prstGeom prst="line">
-            <a:avLst/>
-          </a:prstGeom>
-          <a:ln w="19050">
-            <a:solidFill>
-              <a:srgbClr val="FFFFFF">
-                <a:alpha val="80000"/>
-              </a:srgbClr>
-            </a:solidFill>
-          </a:ln>
-        </p:spPr>
-        <p:style>
-          <a:lnRef idx="1">
-            <a:schemeClr val="accent1"/>
-          </a:lnRef>
-          <a:fillRef idx="0">
-            <a:schemeClr val="accent1"/>
-          </a:fillRef>
-          <a:effectRef idx="0">
-            <a:schemeClr val="accent1"/>
-          </a:effectRef>
-          <a:fontRef idx="minor">
-            <a:schemeClr val="tx1"/>
-          </a:fontRef>
-        </p:style>
-      </p:cxnSp>
+          <a:bodyPr wrap="square" rtlCol="0" anchor="ctr">
+            <a:noAutofit/>
+          </a:bodyPr>
+          <a:lstStyle/>
+          <a:p>
+            <a:pPr marL="0" marR="0" lvl="0" indent="0" algn="ctr" defTabSz="914400" rtl="0" eaLnBrk="1" fontAlgn="auto" latinLnBrk="0" hangingPunct="1">
+              <a:lnSpc>
+                <a:spcPct val="100000"/>
+              </a:lnSpc>
+              <a:spcBef>
+                <a:spcPts val="0"/>
+              </a:spcBef>
+              <a:spcAft>
+                <a:spcPts val="0"/>
+              </a:spcAft>
+              <a:buClrTx/>
+              <a:buSzTx/>
+              <a:buFontTx/>
+              <a:buNone/>
+              <a:tabLst/>
+              <a:defRPr/>
+            </a:pPr>
+            <a:endParaRPr kumimoji="0" lang="en-US" sz="1800" b="0" i="0" u="none" strike="noStrike" kern="1200" cap="none" spc="0" normalizeH="0" baseline="0" noProof="0">
+              <a:ln>
+                <a:noFill/>
+              </a:ln>
+              <a:solidFill>
+                <a:prstClr val="white"/>
+              </a:solidFill>
+              <a:effectLst/>
+              <a:uLnTx/>
+              <a:uFillTx/>
+              <a:latin typeface="Calibri" panose="020F0502020204030204"/>
+              <a:ea typeface="+mn-ea"/>
+              <a:cs typeface="+mn-cs"/>
+            </a:endParaRPr>
+          </a:p>
+        </p:txBody>
+      </p:sp>
       <p:pic>
         <p:nvPicPr>
           <p:cNvPr id="13" name="Picture 12" descr="A drawing of a cartoon character&#10;&#10;Description generated with high confidence">
@@ -4545,25 +4607,413 @@
               </a:ext>
             </a:extLst>
           </a:blip>
-          <a:srcRect r="-1" b="3466"/>
+          <a:srcRect l="17210"/>
           <a:stretch/>
         </p:blipFill>
         <p:spPr>
           <a:xfrm>
-            <a:off x="6096000" y="945910"/>
-            <a:ext cx="5459470" cy="4967155"/>
+            <a:off x="20" y="10"/>
+            <a:ext cx="6024134" cy="6857990"/>
+          </a:xfrm>
+          <a:custGeom>
+            <a:avLst/>
+            <a:gdLst>
+              <a:gd name="connsiteX0" fmla="*/ 0 w 6024154"/>
+              <a:gd name="connsiteY0" fmla="*/ 0 h 6858000"/>
+              <a:gd name="connsiteX1" fmla="*/ 5953780 w 6024154"/>
+              <a:gd name="connsiteY1" fmla="*/ 0 h 6858000"/>
+              <a:gd name="connsiteX2" fmla="*/ 5989880 w 6024154"/>
+              <a:gd name="connsiteY2" fmla="*/ 284091 h 6858000"/>
+              <a:gd name="connsiteX3" fmla="*/ 6024154 w 6024154"/>
+              <a:gd name="connsiteY3" fmla="*/ 962844 h 6858000"/>
+              <a:gd name="connsiteX4" fmla="*/ 2549934 w 6024154"/>
+              <a:gd name="connsiteY4" fmla="*/ 6800152 h 6858000"/>
+              <a:gd name="connsiteX5" fmla="*/ 2436987 w 6024154"/>
+              <a:gd name="connsiteY5" fmla="*/ 6858000 h 6858000"/>
+              <a:gd name="connsiteX6" fmla="*/ 0 w 6024154"/>
+              <a:gd name="connsiteY6" fmla="*/ 6858000 h 6858000"/>
+            </a:gdLst>
+            <a:ahLst/>
+            <a:cxnLst>
+              <a:cxn ang="0">
+                <a:pos x="connsiteX0" y="connsiteY0"/>
+              </a:cxn>
+              <a:cxn ang="0">
+                <a:pos x="connsiteX1" y="connsiteY1"/>
+              </a:cxn>
+              <a:cxn ang="0">
+                <a:pos x="connsiteX2" y="connsiteY2"/>
+              </a:cxn>
+              <a:cxn ang="0">
+                <a:pos x="connsiteX3" y="connsiteY3"/>
+              </a:cxn>
+              <a:cxn ang="0">
+                <a:pos x="connsiteX4" y="connsiteY4"/>
+              </a:cxn>
+              <a:cxn ang="0">
+                <a:pos x="connsiteX5" y="connsiteY5"/>
+              </a:cxn>
+              <a:cxn ang="0">
+                <a:pos x="connsiteX6" y="connsiteY6"/>
+              </a:cxn>
+            </a:cxnLst>
+            <a:rect l="l" t="t" r="r" b="b"/>
+            <a:pathLst>
+              <a:path w="6024154" h="6858000">
+                <a:moveTo>
+                  <a:pt x="0" y="0"/>
+                </a:moveTo>
+                <a:lnTo>
+                  <a:pt x="5953780" y="0"/>
+                </a:lnTo>
+                <a:lnTo>
+                  <a:pt x="5989880" y="284091"/>
+                </a:lnTo>
+                <a:cubicBezTo>
+                  <a:pt x="6012544" y="507260"/>
+                  <a:pt x="6024154" y="733696"/>
+                  <a:pt x="6024154" y="962844"/>
+                </a:cubicBezTo>
+                <a:cubicBezTo>
+                  <a:pt x="6024154" y="3483472"/>
+                  <a:pt x="4619336" y="5675986"/>
+                  <a:pt x="2549934" y="6800152"/>
+                </a:cubicBezTo>
+                <a:lnTo>
+                  <a:pt x="2436987" y="6858000"/>
+                </a:lnTo>
+                <a:lnTo>
+                  <a:pt x="0" y="6858000"/>
+                </a:lnTo>
+                <a:close/>
+              </a:path>
+            </a:pathLst>
+          </a:custGeom>
+        </p:spPr>
+      </p:pic>
+      <p:sp>
+        <p:nvSpPr>
+          <p:cNvPr id="2" name="Title 1">
+            <a:extLst>
+              <a:ext uri="{FF2B5EF4-FFF2-40B4-BE49-F238E27FC236}">
+                <a16:creationId xmlns:a16="http://schemas.microsoft.com/office/drawing/2014/main" id="{20C7CC26-8994-46B7-A7E9-990F85AEBC19}"/>
+              </a:ext>
+            </a:extLst>
+          </p:cNvPr>
+          <p:cNvSpPr>
+            <a:spLocks noGrp="1"/>
+          </p:cNvSpPr>
+          <p:nvPr>
+            <p:ph type="ctrTitle"/>
+          </p:nvPr>
+        </p:nvSpPr>
+        <p:spPr>
+          <a:xfrm>
+            <a:off x="6746628" y="1783959"/>
+            <a:ext cx="4645250" cy="2889114"/>
+          </a:xfrm>
+        </p:spPr>
+        <p:txBody>
+          <a:bodyPr anchor="b">
+            <a:normAutofit/>
+          </a:bodyPr>
+          <a:lstStyle/>
+          <a:p>
+            <a:pPr algn="l"/>
+            <a:r>
+              <a:rPr lang="en-US" b="1">
+                <a:latin typeface="Arial Black" panose="020B0A04020102020204" pitchFamily="34" charset="0"/>
+              </a:rPr>
+              <a:t>FAIL2BAN</a:t>
+            </a:r>
+          </a:p>
+        </p:txBody>
+      </p:sp>
+      <p:sp>
+        <p:nvSpPr>
+          <p:cNvPr id="3" name="Subtitle 2">
+            <a:extLst>
+              <a:ext uri="{FF2B5EF4-FFF2-40B4-BE49-F238E27FC236}">
+                <a16:creationId xmlns:a16="http://schemas.microsoft.com/office/drawing/2014/main" id="{90E077CE-3354-478B-841A-390DE8FBDAD8}"/>
+              </a:ext>
+            </a:extLst>
+          </p:cNvPr>
+          <p:cNvSpPr>
+            <a:spLocks noGrp="1"/>
+          </p:cNvSpPr>
+          <p:nvPr>
+            <p:ph type="subTitle" idx="1"/>
+          </p:nvPr>
+        </p:nvSpPr>
+        <p:spPr>
+          <a:xfrm>
+            <a:off x="6746627" y="4750893"/>
+            <a:ext cx="4645250" cy="1147863"/>
+          </a:xfrm>
+        </p:spPr>
+        <p:txBody>
+          <a:bodyPr anchor="t">
+            <a:normAutofit/>
+          </a:bodyPr>
+          <a:lstStyle/>
+          <a:p>
+            <a:pPr algn="l"/>
+            <a:r>
+              <a:rPr lang="en-US" sz="2000"/>
+              <a:t>Francis B. Odisi</a:t>
+            </a:r>
+          </a:p>
+        </p:txBody>
+      </p:sp>
+    </p:spTree>
+    <p:extLst>
+      <p:ext uri="{BB962C8B-B14F-4D97-AF65-F5344CB8AC3E}">
+        <p14:creationId xmlns:p14="http://schemas.microsoft.com/office/powerpoint/2010/main" val="58590654"/>
+      </p:ext>
+    </p:extLst>
+  </p:cSld>
+  <p:clrMapOvr>
+    <a:overrideClrMapping bg1="dk1" tx1="lt1" bg2="dk2" tx2="lt2" accent1="accent1" accent2="accent2" accent3="accent3" accent4="accent4" accent5="accent5" accent6="accent6" hlink="hlink" folHlink="folHlink"/>
+  </p:clrMapOvr>
+</p:sld>
+</file>
+
+<file path=ppt/slides/slide10.xml><?xml version="1.0" encoding="utf-8"?>
+<p:sld xmlns:a="http://schemas.openxmlformats.org/drawingml/2006/main" xmlns:r="http://schemas.openxmlformats.org/officeDocument/2006/relationships" xmlns:p="http://schemas.openxmlformats.org/presentationml/2006/main">
+  <p:cSld>
+    <p:bg>
+      <p:bgPr>
+        <a:solidFill>
+          <a:schemeClr val="bg1"/>
+        </a:solidFill>
+        <a:effectLst/>
+      </p:bgPr>
+    </p:bg>
+    <p:spTree>
+      <p:nvGrpSpPr>
+        <p:cNvPr id="1" name=""/>
+        <p:cNvGrpSpPr/>
+        <p:nvPr/>
+      </p:nvGrpSpPr>
+      <p:grpSpPr>
+        <a:xfrm>
+          <a:off x="0" y="0"/>
+          <a:ext cx="0" cy="0"/>
+          <a:chOff x="0" y="0"/>
+          <a:chExt cx="0" cy="0"/>
+        </a:xfrm>
+      </p:grpSpPr>
+      <p:sp>
+        <p:nvSpPr>
+          <p:cNvPr id="3" name="Content Placeholder 2">
+            <a:extLst>
+              <a:ext uri="{FF2B5EF4-FFF2-40B4-BE49-F238E27FC236}">
+                <a16:creationId xmlns:a16="http://schemas.microsoft.com/office/drawing/2014/main" id="{53E7C274-D9C6-4274-8466-68D65667A66A}"/>
+              </a:ext>
+            </a:extLst>
+          </p:cNvPr>
+          <p:cNvSpPr>
+            <a:spLocks noGrp="1"/>
+          </p:cNvSpPr>
+          <p:nvPr>
+            <p:ph idx="1"/>
+          </p:nvPr>
+        </p:nvSpPr>
+        <p:spPr>
+          <a:xfrm>
+            <a:off x="412750" y="1930248"/>
+            <a:ext cx="6318250" cy="3937152"/>
+          </a:xfrm>
+        </p:spPr>
+        <p:txBody>
+          <a:bodyPr>
+            <a:noAutofit/>
+          </a:bodyPr>
+          <a:lstStyle/>
+          <a:p>
+            <a:pPr>
+              <a:spcAft>
+                <a:spcPts val="1200"/>
+              </a:spcAft>
+            </a:pPr>
+            <a:r>
+              <a:rPr lang="en-US" sz="3200" dirty="0"/>
+              <a:t>Client/Server architecture</a:t>
+            </a:r>
+          </a:p>
+          <a:p>
+            <a:pPr>
+              <a:spcAft>
+                <a:spcPts val="1200"/>
+              </a:spcAft>
+            </a:pPr>
+            <a:r>
+              <a:rPr lang="en-US" sz="3200" dirty="0"/>
+              <a:t>Multi-threaded</a:t>
+            </a:r>
+          </a:p>
+          <a:p>
+            <a:pPr>
+              <a:spcAft>
+                <a:spcPts val="1200"/>
+              </a:spcAft>
+            </a:pPr>
+            <a:r>
+              <a:rPr lang="en-US" sz="3200" dirty="0"/>
+              <a:t>Database support</a:t>
+            </a:r>
+          </a:p>
+          <a:p>
+            <a:pPr>
+              <a:spcAft>
+                <a:spcPts val="1200"/>
+              </a:spcAft>
+            </a:pPr>
+            <a:r>
+              <a:rPr lang="en-US" sz="3200" dirty="0"/>
+              <a:t>Highly configurable using split configuration files</a:t>
+            </a:r>
+          </a:p>
+          <a:p>
+            <a:pPr>
+              <a:spcAft>
+                <a:spcPts val="1200"/>
+              </a:spcAft>
+            </a:pPr>
+            <a:r>
+              <a:rPr lang="en-US" sz="3200" dirty="0"/>
+              <a:t>Timeout on ban commands</a:t>
+            </a:r>
+          </a:p>
+        </p:txBody>
+      </p:sp>
+      <p:sp>
+        <p:nvSpPr>
+          <p:cNvPr id="23" name="Title 1">
+            <a:extLst>
+              <a:ext uri="{FF2B5EF4-FFF2-40B4-BE49-F238E27FC236}">
+                <a16:creationId xmlns:a16="http://schemas.microsoft.com/office/drawing/2014/main" id="{B4BD1465-E306-4B88-80FC-E7D576EF1DDE}"/>
+              </a:ext>
+            </a:extLst>
+          </p:cNvPr>
+          <p:cNvSpPr>
+            <a:spLocks noGrp="1"/>
+          </p:cNvSpPr>
+          <p:nvPr>
+            <p:ph type="title"/>
+          </p:nvPr>
+        </p:nvSpPr>
+        <p:spPr>
+          <a:xfrm>
+            <a:off x="0" y="5231"/>
+            <a:ext cx="12192000" cy="705969"/>
+          </a:xfrm>
+          <a:solidFill>
+            <a:schemeClr val="tx1">
+              <a:lumMod val="75000"/>
+              <a:lumOff val="25000"/>
+            </a:schemeClr>
+          </a:solidFill>
+        </p:spPr>
+        <p:txBody>
+          <a:bodyPr>
+            <a:normAutofit/>
+          </a:bodyPr>
+          <a:lstStyle/>
+          <a:p>
+            <a:pPr algn="ctr"/>
+            <a:r>
+              <a:rPr lang="en-US" b="1" dirty="0">
+                <a:solidFill>
+                  <a:schemeClr val="bg1"/>
+                </a:solidFill>
+                <a:latin typeface="+mn-lt"/>
+              </a:rPr>
+              <a:t>Additional Features</a:t>
+            </a:r>
+          </a:p>
+        </p:txBody>
+      </p:sp>
+      <p:pic>
+        <p:nvPicPr>
+          <p:cNvPr id="24" name="Picture 23" descr="A close up of a logo&#10;&#10;Description generated with high confidence">
+            <a:extLst>
+              <a:ext uri="{FF2B5EF4-FFF2-40B4-BE49-F238E27FC236}">
+                <a16:creationId xmlns:a16="http://schemas.microsoft.com/office/drawing/2014/main" id="{0CAFAEEA-9ED5-4F16-9E5C-F2A4E73A664F}"/>
+              </a:ext>
+            </a:extLst>
+          </p:cNvPr>
+          <p:cNvPicPr>
+            <a:picLocks noChangeAspect="1"/>
+          </p:cNvPicPr>
+          <p:nvPr/>
+        </p:nvPicPr>
+        <p:blipFill>
+          <a:blip r:embed="rId2">
+            <a:extLst>
+              <a:ext uri="{28A0092B-C50C-407E-A947-70E740481C1C}">
+                <a14:useLocalDpi xmlns:a14="http://schemas.microsoft.com/office/drawing/2010/main" val="0"/>
+              </a:ext>
+            </a:extLst>
+          </a:blip>
+          <a:stretch>
+            <a:fillRect/>
+          </a:stretch>
+        </p:blipFill>
+        <p:spPr>
+          <a:xfrm>
+            <a:off x="8422103" y="3937000"/>
+            <a:ext cx="3211096" cy="2405222"/>
           </a:xfrm>
           <a:prstGeom prst="rect">
             <a:avLst/>
           </a:prstGeom>
         </p:spPr>
       </p:pic>
-      <p:sp>
-        <p:nvSpPr>
-          <p:cNvPr id="2" name="Title 1">
-            <a:extLst>
-              <a:ext uri="{FF2B5EF4-FFF2-40B4-BE49-F238E27FC236}">
-                <a16:creationId xmlns:a16="http://schemas.microsoft.com/office/drawing/2014/main" id="{20C7CC26-8994-46B7-A7E9-990F85AEBC19}"/>
+    </p:spTree>
+    <p:extLst>
+      <p:ext uri="{BB962C8B-B14F-4D97-AF65-F5344CB8AC3E}">
+        <p14:creationId xmlns:p14="http://schemas.microsoft.com/office/powerpoint/2010/main" val="2336316075"/>
+      </p:ext>
+    </p:extLst>
+  </p:cSld>
+  <p:clrMapOvr>
+    <a:masterClrMapping/>
+  </p:clrMapOvr>
+</p:sld>
+</file>
+
+<file path=ppt/slides/slide11.xml><?xml version="1.0" encoding="utf-8"?>
+<p:sld xmlns:a="http://schemas.openxmlformats.org/drawingml/2006/main" xmlns:r="http://schemas.openxmlformats.org/officeDocument/2006/relationships" xmlns:p="http://schemas.openxmlformats.org/presentationml/2006/main">
+  <p:cSld>
+    <p:bg>
+      <p:bgPr>
+        <a:solidFill>
+          <a:schemeClr val="bg1"/>
+        </a:solidFill>
+        <a:effectLst/>
+      </p:bgPr>
+    </p:bg>
+    <p:spTree>
+      <p:nvGrpSpPr>
+        <p:cNvPr id="1" name=""/>
+        <p:cNvGrpSpPr/>
+        <p:nvPr/>
+      </p:nvGrpSpPr>
+      <p:grpSpPr>
+        <a:xfrm>
+          <a:off x="0" y="0"/>
+          <a:ext cx="0" cy="0"/>
+          <a:chOff x="0" y="0"/>
+          <a:chExt cx="0" cy="0"/>
+        </a:xfrm>
+      </p:grpSpPr>
+      <p:sp>
+        <p:nvSpPr>
+          <p:cNvPr id="3" name="Content Placeholder 2">
+            <a:extLst>
+              <a:ext uri="{FF2B5EF4-FFF2-40B4-BE49-F238E27FC236}">
+                <a16:creationId xmlns:a16="http://schemas.microsoft.com/office/drawing/2014/main" id="{53E7C274-D9C6-4274-8466-68D65667A66A}"/>
               </a:ext>
             </a:extLst>
           </p:cNvPr>
@@ -4571,78 +5021,759 @@
             <a:spLocks noGrp="1"/>
           </p:cNvSpPr>
           <p:nvPr>
-            <p:ph type="ctrTitle"/>
+            <p:ph idx="1"/>
           </p:nvPr>
         </p:nvSpPr>
         <p:spPr>
           <a:xfrm>
-            <a:off x="634276" y="803705"/>
-            <a:ext cx="4208656" cy="3034857"/>
+            <a:off x="317500" y="1940411"/>
+            <a:ext cx="6483350" cy="3503924"/>
           </a:xfrm>
         </p:spPr>
         <p:txBody>
-          <a:bodyPr anchor="b">
+          <a:bodyPr>
+            <a:noAutofit/>
+          </a:bodyPr>
+          <a:lstStyle/>
+          <a:p>
+            <a:pPr>
+              <a:spcAft>
+                <a:spcPts val="1200"/>
+              </a:spcAft>
+            </a:pPr>
+            <a:r>
+              <a:rPr lang="en-US" sz="3200"/>
+              <a:t>Can handle multiple services at once</a:t>
+            </a:r>
+          </a:p>
+          <a:p>
+            <a:pPr>
+              <a:spcAft>
+                <a:spcPts val="1200"/>
+              </a:spcAft>
+            </a:pPr>
+            <a:r>
+              <a:rPr lang="en-US" sz="3200"/>
+              <a:t>Resolves DNS hostname &gt; IP address</a:t>
+            </a:r>
+          </a:p>
+          <a:p>
+            <a:pPr>
+              <a:spcAft>
+                <a:spcPts val="1200"/>
+              </a:spcAft>
+            </a:pPr>
+            <a:r>
+              <a:rPr lang="en-US" sz="3200"/>
+              <a:t>Multi-line parsing in filters</a:t>
+            </a:r>
+          </a:p>
+          <a:p>
+            <a:pPr>
+              <a:spcAft>
+                <a:spcPts val="1200"/>
+              </a:spcAft>
+            </a:pPr>
+            <a:r>
+              <a:rPr lang="en-US" sz="3200"/>
+              <a:t>Custom date time support for filters</a:t>
+            </a:r>
+          </a:p>
+          <a:p>
+            <a:pPr>
+              <a:spcAft>
+                <a:spcPts val="1200"/>
+              </a:spcAft>
+            </a:pPr>
+            <a:r>
+              <a:rPr lang="en-US" sz="3200"/>
+              <a:t>Timezone awareness by default</a:t>
+            </a:r>
+            <a:endParaRPr lang="en-US" sz="3200" dirty="0"/>
+          </a:p>
+        </p:txBody>
+      </p:sp>
+      <p:sp>
+        <p:nvSpPr>
+          <p:cNvPr id="23" name="Title 1">
+            <a:extLst>
+              <a:ext uri="{FF2B5EF4-FFF2-40B4-BE49-F238E27FC236}">
+                <a16:creationId xmlns:a16="http://schemas.microsoft.com/office/drawing/2014/main" id="{B4BD1465-E306-4B88-80FC-E7D576EF1DDE}"/>
+              </a:ext>
+            </a:extLst>
+          </p:cNvPr>
+          <p:cNvSpPr>
+            <a:spLocks noGrp="1"/>
+          </p:cNvSpPr>
+          <p:nvPr>
+            <p:ph type="title"/>
+          </p:nvPr>
+        </p:nvSpPr>
+        <p:spPr>
+          <a:xfrm>
+            <a:off x="0" y="5231"/>
+            <a:ext cx="12192000" cy="705969"/>
+          </a:xfrm>
+          <a:solidFill>
+            <a:schemeClr val="tx1">
+              <a:lumMod val="75000"/>
+              <a:lumOff val="25000"/>
+            </a:schemeClr>
+          </a:solidFill>
+        </p:spPr>
+        <p:txBody>
+          <a:bodyPr>
             <a:normAutofit/>
           </a:bodyPr>
           <a:lstStyle/>
           <a:p>
-            <a:pPr algn="r"/>
-            <a:r>
-              <a:rPr lang="en-US" sz="5400" b="1">
+            <a:pPr algn="ctr"/>
+            <a:r>
+              <a:rPr lang="en-US" b="1">
+                <a:solidFill>
+                  <a:schemeClr val="bg1"/>
+                </a:solidFill>
+                <a:latin typeface="+mn-lt"/>
+              </a:rPr>
+              <a:t>Additional Features</a:t>
+            </a:r>
+            <a:endParaRPr lang="en-US" b="1" dirty="0">
+              <a:solidFill>
+                <a:schemeClr val="bg1"/>
+              </a:solidFill>
+              <a:latin typeface="+mn-lt"/>
+            </a:endParaRPr>
+          </a:p>
+        </p:txBody>
+      </p:sp>
+      <p:pic>
+        <p:nvPicPr>
+          <p:cNvPr id="5" name="Picture 4" descr="A close up of a logo&#10;&#10;Description generated with high confidence">
+            <a:extLst>
+              <a:ext uri="{FF2B5EF4-FFF2-40B4-BE49-F238E27FC236}">
+                <a16:creationId xmlns:a16="http://schemas.microsoft.com/office/drawing/2014/main" id="{2924CFD9-9B92-492D-954C-EAC730E5176B}"/>
+              </a:ext>
+            </a:extLst>
+          </p:cNvPr>
+          <p:cNvPicPr>
+            <a:picLocks noChangeAspect="1"/>
+          </p:cNvPicPr>
+          <p:nvPr/>
+        </p:nvPicPr>
+        <p:blipFill>
+          <a:blip r:embed="rId2">
+            <a:extLst>
+              <a:ext uri="{28A0092B-C50C-407E-A947-70E740481C1C}">
+                <a14:useLocalDpi xmlns:a14="http://schemas.microsoft.com/office/drawing/2010/main" val="0"/>
+              </a:ext>
+            </a:extLst>
+          </a:blip>
+          <a:stretch>
+            <a:fillRect/>
+          </a:stretch>
+        </p:blipFill>
+        <p:spPr>
+          <a:xfrm>
+            <a:off x="8422103" y="3937000"/>
+            <a:ext cx="3211096" cy="2405222"/>
+          </a:xfrm>
+          <a:prstGeom prst="rect">
+            <a:avLst/>
+          </a:prstGeom>
+        </p:spPr>
+      </p:pic>
+    </p:spTree>
+    <p:extLst>
+      <p:ext uri="{BB962C8B-B14F-4D97-AF65-F5344CB8AC3E}">
+        <p14:creationId xmlns:p14="http://schemas.microsoft.com/office/powerpoint/2010/main" val="2731030370"/>
+      </p:ext>
+    </p:extLst>
+  </p:cSld>
+  <p:clrMapOvr>
+    <a:masterClrMapping/>
+  </p:clrMapOvr>
+</p:sld>
+</file>
+
+<file path=ppt/slides/slide12.xml><?xml version="1.0" encoding="utf-8"?>
+<p:sld xmlns:a="http://schemas.openxmlformats.org/drawingml/2006/main" xmlns:r="http://schemas.openxmlformats.org/officeDocument/2006/relationships" xmlns:p="http://schemas.openxmlformats.org/presentationml/2006/main">
+  <p:cSld>
+    <p:bg>
+      <p:bgPr>
+        <a:solidFill>
+          <a:schemeClr val="bg1"/>
+        </a:solidFill>
+        <a:effectLst/>
+      </p:bgPr>
+    </p:bg>
+    <p:spTree>
+      <p:nvGrpSpPr>
+        <p:cNvPr id="1" name=""/>
+        <p:cNvGrpSpPr/>
+        <p:nvPr/>
+      </p:nvGrpSpPr>
+      <p:grpSpPr>
+        <a:xfrm>
+          <a:off x="0" y="0"/>
+          <a:ext cx="0" cy="0"/>
+          <a:chOff x="0" y="0"/>
+          <a:chExt cx="0" cy="0"/>
+        </a:xfrm>
+      </p:grpSpPr>
+      <p:sp>
+        <p:nvSpPr>
+          <p:cNvPr id="92" name="Rectangle 91">
+            <a:extLst>
+              <a:ext uri="{FF2B5EF4-FFF2-40B4-BE49-F238E27FC236}">
+                <a16:creationId xmlns:a16="http://schemas.microsoft.com/office/drawing/2014/main" id="{01D0AF59-99C3-4251-AB9A-C966C6AD4400}"/>
+              </a:ext>
+              <a:ext uri="{C183D7F6-B498-43B3-948B-1728B52AA6E4}">
+                <adec:decorative xmlns:adec="http://schemas.microsoft.com/office/drawing/2017/decorative" val="1"/>
+              </a:ext>
+            </a:extLst>
+          </p:cNvPr>
+          <p:cNvSpPr>
+            <a:spLocks noGrp="1" noRot="1" noChangeAspect="1" noMove="1" noResize="1" noEditPoints="1" noAdjustHandles="1" noChangeArrowheads="1" noChangeShapeType="1" noTextEdit="1"/>
+          </p:cNvSpPr>
+          <p:nvPr>
+            <p:extLst>
+              <p:ext uri="{386F3935-93C4-4BCD-93E2-E3B085C9AB24}">
+                <p16:designElem xmlns:p16="http://schemas.microsoft.com/office/powerpoint/2015/main" val="1"/>
+              </p:ext>
+            </p:extLst>
+          </p:nvPr>
+        </p:nvSpPr>
+        <p:spPr>
+          <a:xfrm>
+            <a:off x="0" y="0"/>
+            <a:ext cx="12192000" cy="6858000"/>
+          </a:xfrm>
+          <a:prstGeom prst="rect">
+            <a:avLst/>
+          </a:prstGeom>
+          <a:solidFill>
+            <a:schemeClr val="bg2"/>
+          </a:solidFill>
+          <a:ln>
+            <a:noFill/>
+          </a:ln>
+        </p:spPr>
+        <p:style>
+          <a:lnRef idx="2">
+            <a:schemeClr val="accent1">
+              <a:shade val="50000"/>
+            </a:schemeClr>
+          </a:lnRef>
+          <a:fillRef idx="1">
+            <a:schemeClr val="accent1"/>
+          </a:fillRef>
+          <a:effectRef idx="0">
+            <a:schemeClr val="accent1"/>
+          </a:effectRef>
+          <a:fontRef idx="minor">
+            <a:schemeClr val="lt1"/>
+          </a:fontRef>
+        </p:style>
+        <p:txBody>
+          <a:bodyPr rtlCol="0" anchor="ctr"/>
+          <a:lstStyle/>
+          <a:p>
+            <a:pPr algn="ctr"/>
+            <a:endParaRPr lang="en-US"/>
+          </a:p>
+        </p:txBody>
+      </p:sp>
+      <p:sp>
+        <p:nvSpPr>
+          <p:cNvPr id="94" name="Rectangle 93">
+            <a:extLst>
+              <a:ext uri="{FF2B5EF4-FFF2-40B4-BE49-F238E27FC236}">
+                <a16:creationId xmlns:a16="http://schemas.microsoft.com/office/drawing/2014/main" id="{1855405F-37A2-4869-9154-F8BE3BECE6C3}"/>
+              </a:ext>
+              <a:ext uri="{C183D7F6-B498-43B3-948B-1728B52AA6E4}">
+                <adec:decorative xmlns:adec="http://schemas.microsoft.com/office/drawing/2017/decorative" val="1"/>
+              </a:ext>
+            </a:extLst>
+          </p:cNvPr>
+          <p:cNvSpPr>
+            <a:spLocks noGrp="1" noRot="1" noChangeAspect="1" noMove="1" noResize="1" noEditPoints="1" noAdjustHandles="1" noChangeArrowheads="1" noChangeShapeType="1" noTextEdit="1"/>
+          </p:cNvSpPr>
+          <p:nvPr>
+            <p:extLst>
+              <p:ext uri="{386F3935-93C4-4BCD-93E2-E3B085C9AB24}">
+                <p16:designElem xmlns:p16="http://schemas.microsoft.com/office/powerpoint/2015/main" val="1"/>
+              </p:ext>
+            </p:extLst>
+          </p:nvPr>
+        </p:nvSpPr>
+        <p:spPr>
+          <a:xfrm>
+            <a:off x="477012" y="480060"/>
+            <a:ext cx="11237976" cy="5897880"/>
+          </a:xfrm>
+          <a:prstGeom prst="rect">
+            <a:avLst/>
+          </a:prstGeom>
+          <a:solidFill>
+            <a:srgbClr val="FFFFFF"/>
+          </a:solidFill>
+          <a:ln w="9525">
+            <a:noFill/>
+          </a:ln>
+          <a:effectLst>
+            <a:outerShdw blurRad="63500" dist="17780" dir="5400000" algn="t" rotWithShape="0">
+              <a:prstClr val="black">
+                <a:alpha val="43000"/>
+              </a:prstClr>
+            </a:outerShdw>
+          </a:effectLst>
+        </p:spPr>
+        <p:style>
+          <a:lnRef idx="2">
+            <a:schemeClr val="accent1">
+              <a:shade val="50000"/>
+            </a:schemeClr>
+          </a:lnRef>
+          <a:fillRef idx="1">
+            <a:schemeClr val="accent1"/>
+          </a:fillRef>
+          <a:effectRef idx="0">
+            <a:schemeClr val="accent1"/>
+          </a:effectRef>
+          <a:fontRef idx="minor">
+            <a:schemeClr val="lt1"/>
+          </a:fontRef>
+        </p:style>
+        <p:txBody>
+          <a:bodyPr rtlCol="0" anchor="ctr"/>
+          <a:lstStyle/>
+          <a:p>
+            <a:pPr algn="ctr"/>
+            <a:endParaRPr lang="en-US"/>
+          </a:p>
+        </p:txBody>
+      </p:sp>
+      <p:pic>
+        <p:nvPicPr>
+          <p:cNvPr id="2068" name="Picture 2" descr="Fail2ban-screenshot.jpg">
+            <a:extLst>
+              <a:ext uri="{FF2B5EF4-FFF2-40B4-BE49-F238E27FC236}">
+                <a16:creationId xmlns:a16="http://schemas.microsoft.com/office/drawing/2014/main" id="{50387F1B-6FBD-4133-8588-5CAC0F349DD1}"/>
+              </a:ext>
+            </a:extLst>
+          </p:cNvPr>
+          <p:cNvPicPr>
+            <a:picLocks noGrp="1" noChangeAspect="1" noChangeArrowheads="1"/>
+          </p:cNvPicPr>
+          <p:nvPr>
+            <p:ph idx="1"/>
+          </p:nvPr>
+        </p:nvPicPr>
+        <p:blipFill>
+          <a:blip r:embed="rId2">
+            <a:extLst>
+              <a:ext uri="{28A0092B-C50C-407E-A947-70E740481C1C}">
+                <a14:useLocalDpi xmlns:a14="http://schemas.microsoft.com/office/drawing/2010/main" val="0"/>
+              </a:ext>
+            </a:extLst>
+          </a:blip>
+          <a:srcRect/>
+          <a:stretch>
+            <a:fillRect/>
+          </a:stretch>
+        </p:blipFill>
+        <p:spPr bwMode="auto">
+          <a:xfrm>
+            <a:off x="1843278" y="643467"/>
+            <a:ext cx="8505444" cy="5571066"/>
+          </a:xfrm>
+          <a:prstGeom prst="rect">
+            <a:avLst/>
+          </a:prstGeom>
+          <a:noFill/>
+          <a:extLst>
+            <a:ext uri="{909E8E84-426E-40DD-AFC4-6F175D3DCCD1}">
+              <a14:hiddenFill xmlns:a14="http://schemas.microsoft.com/office/drawing/2010/main">
                 <a:solidFill>
                   <a:srgbClr val="FFFFFF"/>
                 </a:solidFill>
-                <a:latin typeface="Arial Black" panose="020B0A04020102020204" pitchFamily="34" charset="0"/>
-              </a:rPr>
-              <a:t>FAIL2BAN</a:t>
-            </a:r>
-          </a:p>
-        </p:txBody>
-      </p:sp>
-      <p:sp>
-        <p:nvSpPr>
-          <p:cNvPr id="3" name="Subtitle 2">
-            <a:extLst>
-              <a:ext uri="{FF2B5EF4-FFF2-40B4-BE49-F238E27FC236}">
-                <a16:creationId xmlns:a16="http://schemas.microsoft.com/office/drawing/2014/main" id="{90E077CE-3354-478B-841A-390DE8FBDAD8}"/>
-              </a:ext>
-            </a:extLst>
-          </p:cNvPr>
-          <p:cNvSpPr>
-            <a:spLocks noGrp="1"/>
-          </p:cNvSpPr>
-          <p:nvPr>
-            <p:ph type="subTitle" idx="1"/>
-          </p:nvPr>
-        </p:nvSpPr>
-        <p:spPr>
-          <a:xfrm>
-            <a:off x="638921" y="4013165"/>
-            <a:ext cx="4204012" cy="2205732"/>
-          </a:xfrm>
+              </a14:hiddenFill>
+            </a:ext>
+          </a:extLst>
         </p:spPr>
-        <p:txBody>
-          <a:bodyPr anchor="t">
-            <a:normAutofit/>
-          </a:bodyPr>
-          <a:lstStyle/>
-          <a:p>
-            <a:pPr algn="r"/>
-            <a:r>
-              <a:rPr lang="en-US" sz="1800">
-                <a:solidFill>
-                  <a:srgbClr val="FFFFFF"/>
-                </a:solidFill>
-              </a:rPr>
-              <a:t>Francis B. Odisi</a:t>
-            </a:r>
-          </a:p>
-        </p:txBody>
-      </p:sp>
+      </p:pic>
     </p:spTree>
     <p:extLst>
       <p:ext uri="{BB962C8B-B14F-4D97-AF65-F5344CB8AC3E}">
-        <p14:creationId xmlns:p14="http://schemas.microsoft.com/office/powerpoint/2010/main" val="58590654"/>
+        <p14:creationId xmlns:p14="http://schemas.microsoft.com/office/powerpoint/2010/main" val="2382750837"/>
+      </p:ext>
+    </p:extLst>
+  </p:cSld>
+  <p:clrMapOvr>
+    <a:masterClrMapping/>
+  </p:clrMapOvr>
+</p:sld>
+</file>
+
+<file path=ppt/slides/slide13.xml><?xml version="1.0" encoding="utf-8"?>
+<p:sld xmlns:a="http://schemas.openxmlformats.org/drawingml/2006/main" xmlns:r="http://schemas.openxmlformats.org/officeDocument/2006/relationships" xmlns:p="http://schemas.openxmlformats.org/presentationml/2006/main">
+  <p:cSld>
+    <p:bg>
+      <p:bgPr>
+        <a:solidFill>
+          <a:schemeClr val="bg1"/>
+        </a:solidFill>
+        <a:effectLst/>
+      </p:bgPr>
+    </p:bg>
+    <p:spTree>
+      <p:nvGrpSpPr>
+        <p:cNvPr id="1" name=""/>
+        <p:cNvGrpSpPr/>
+        <p:nvPr/>
+      </p:nvGrpSpPr>
+      <p:grpSpPr>
+        <a:xfrm>
+          <a:off x="0" y="0"/>
+          <a:ext cx="0" cy="0"/>
+          <a:chOff x="0" y="0"/>
+          <a:chExt cx="0" cy="0"/>
+        </a:xfrm>
+      </p:grpSpPr>
+      <p:sp>
+        <p:nvSpPr>
+          <p:cNvPr id="26" name="Rectangle 16">
+            <a:extLst>
+              <a:ext uri="{FF2B5EF4-FFF2-40B4-BE49-F238E27FC236}">
+                <a16:creationId xmlns:a16="http://schemas.microsoft.com/office/drawing/2014/main" id="{32BC26D8-82FB-445E-AA49-62A77D7C1EE0}"/>
+              </a:ext>
+              <a:ext uri="{C183D7F6-B498-43B3-948B-1728B52AA6E4}">
+                <adec:decorative xmlns:adec="http://schemas.microsoft.com/office/drawing/2017/decorative" val="1"/>
+              </a:ext>
+            </a:extLst>
+          </p:cNvPr>
+          <p:cNvSpPr>
+            <a:spLocks noGrp="1" noRot="1" noChangeAspect="1" noMove="1" noResize="1" noEditPoints="1" noAdjustHandles="1" noChangeArrowheads="1" noChangeShapeType="1" noTextEdit="1"/>
+          </p:cNvSpPr>
+          <p:nvPr>
+            <p:extLst>
+              <p:ext uri="{386F3935-93C4-4BCD-93E2-E3B085C9AB24}">
+                <p16:designElem xmlns:p16="http://schemas.microsoft.com/office/powerpoint/2015/main" val="1"/>
+              </p:ext>
+            </p:extLst>
+          </p:nvPr>
+        </p:nvSpPr>
+        <p:spPr>
+          <a:xfrm>
+            <a:off x="0" y="0"/>
+            <a:ext cx="12192000" cy="6858000"/>
+          </a:xfrm>
+          <a:prstGeom prst="rect">
+            <a:avLst/>
+          </a:prstGeom>
+          <a:solidFill>
+            <a:schemeClr val="tx1">
+              <a:lumMod val="65000"/>
+              <a:lumOff val="35000"/>
+            </a:schemeClr>
+          </a:solidFill>
+          <a:ln>
+            <a:noFill/>
+          </a:ln>
+        </p:spPr>
+        <p:style>
+          <a:lnRef idx="2">
+            <a:schemeClr val="accent1">
+              <a:shade val="50000"/>
+            </a:schemeClr>
+          </a:lnRef>
+          <a:fillRef idx="1">
+            <a:schemeClr val="accent1"/>
+          </a:fillRef>
+          <a:effectRef idx="0">
+            <a:schemeClr val="accent1"/>
+          </a:effectRef>
+          <a:fontRef idx="minor">
+            <a:schemeClr val="lt1"/>
+          </a:fontRef>
+        </p:style>
+        <p:txBody>
+          <a:bodyPr rtlCol="0" anchor="ctr"/>
+          <a:lstStyle/>
+          <a:p>
+            <a:pPr algn="ctr"/>
+            <a:endParaRPr lang="en-US"/>
+          </a:p>
+        </p:txBody>
+      </p:sp>
+      <p:sp>
+        <p:nvSpPr>
+          <p:cNvPr id="19" name="Rectangle 18">
+            <a:extLst>
+              <a:ext uri="{FF2B5EF4-FFF2-40B4-BE49-F238E27FC236}">
+                <a16:creationId xmlns:a16="http://schemas.microsoft.com/office/drawing/2014/main" id="{CB44330D-EA18-4254-AA95-EB49948539B8}"/>
+              </a:ext>
+              <a:ext uri="{C183D7F6-B498-43B3-948B-1728B52AA6E4}">
+                <adec:decorative xmlns:adec="http://schemas.microsoft.com/office/drawing/2017/decorative" val="1"/>
+              </a:ext>
+            </a:extLst>
+          </p:cNvPr>
+          <p:cNvSpPr>
+            <a:spLocks noGrp="1" noRot="1" noChangeAspect="1" noMove="1" noResize="1" noEditPoints="1" noAdjustHandles="1" noChangeArrowheads="1" noChangeShapeType="1" noTextEdit="1"/>
+          </p:cNvSpPr>
+          <p:nvPr>
+            <p:extLst>
+              <p:ext uri="{386F3935-93C4-4BCD-93E2-E3B085C9AB24}">
+                <p16:designElem xmlns:p16="http://schemas.microsoft.com/office/powerpoint/2015/main" val="1"/>
+              </p:ext>
+            </p:extLst>
+          </p:nvPr>
+        </p:nvSpPr>
+        <p:spPr>
+          <a:xfrm>
+            <a:off x="477012" y="480060"/>
+            <a:ext cx="11237976" cy="5897880"/>
+          </a:xfrm>
+          <a:prstGeom prst="rect">
+            <a:avLst/>
+          </a:prstGeom>
+          <a:solidFill>
+            <a:srgbClr val="FFFFFF"/>
+          </a:solidFill>
+          <a:ln>
+            <a:noFill/>
+          </a:ln>
+        </p:spPr>
+        <p:style>
+          <a:lnRef idx="2">
+            <a:schemeClr val="accent1">
+              <a:shade val="50000"/>
+            </a:schemeClr>
+          </a:lnRef>
+          <a:fillRef idx="1">
+            <a:schemeClr val="accent1"/>
+          </a:fillRef>
+          <a:effectRef idx="0">
+            <a:schemeClr val="accent1"/>
+          </a:effectRef>
+          <a:fontRef idx="minor">
+            <a:schemeClr val="lt1"/>
+          </a:fontRef>
+        </p:style>
+        <p:txBody>
+          <a:bodyPr rtlCol="0" anchor="ctr"/>
+          <a:lstStyle/>
+          <a:p>
+            <a:pPr algn="ctr"/>
+            <a:endParaRPr lang="en-US"/>
+          </a:p>
+        </p:txBody>
+      </p:sp>
+      <p:pic>
+        <p:nvPicPr>
+          <p:cNvPr id="27" name="Content Placeholder 3">
+            <a:extLst>
+              <a:ext uri="{FF2B5EF4-FFF2-40B4-BE49-F238E27FC236}">
+                <a16:creationId xmlns:a16="http://schemas.microsoft.com/office/drawing/2014/main" id="{91E94739-7AB6-43AB-B54A-E6419B095F44}"/>
+              </a:ext>
+            </a:extLst>
+          </p:cNvPr>
+          <p:cNvPicPr>
+            <a:picLocks noGrp="1" noChangeAspect="1"/>
+          </p:cNvPicPr>
+          <p:nvPr>
+            <p:ph idx="1"/>
+          </p:nvPr>
+        </p:nvPicPr>
+        <p:blipFill>
+          <a:blip r:embed="rId2"/>
+          <a:stretch>
+            <a:fillRect/>
+          </a:stretch>
+        </p:blipFill>
+        <p:spPr>
+          <a:xfrm>
+            <a:off x="643467" y="729997"/>
+            <a:ext cx="10905066" cy="5398006"/>
+          </a:xfrm>
+          <a:prstGeom prst="rect">
+            <a:avLst/>
+          </a:prstGeom>
+        </p:spPr>
+      </p:pic>
+    </p:spTree>
+    <p:extLst>
+      <p:ext uri="{BB962C8B-B14F-4D97-AF65-F5344CB8AC3E}">
+        <p14:creationId xmlns:p14="http://schemas.microsoft.com/office/powerpoint/2010/main" val="4274483757"/>
+      </p:ext>
+    </p:extLst>
+  </p:cSld>
+  <p:clrMapOvr>
+    <a:masterClrMapping/>
+  </p:clrMapOvr>
+</p:sld>
+</file>
+
+<file path=ppt/slides/slide14.xml><?xml version="1.0" encoding="utf-8"?>
+<p:sld xmlns:a="http://schemas.openxmlformats.org/drawingml/2006/main" xmlns:r="http://schemas.openxmlformats.org/officeDocument/2006/relationships" xmlns:p="http://schemas.openxmlformats.org/presentationml/2006/main">
+  <p:cSld>
+    <p:bg>
+      <p:bgPr>
+        <a:solidFill>
+          <a:schemeClr val="bg1"/>
+        </a:solidFill>
+        <a:effectLst/>
+      </p:bgPr>
+    </p:bg>
+    <p:spTree>
+      <p:nvGrpSpPr>
+        <p:cNvPr id="1" name=""/>
+        <p:cNvGrpSpPr/>
+        <p:nvPr/>
+      </p:nvGrpSpPr>
+      <p:grpSpPr>
+        <a:xfrm>
+          <a:off x="0" y="0"/>
+          <a:ext cx="0" cy="0"/>
+          <a:chOff x="0" y="0"/>
+          <a:chExt cx="0" cy="0"/>
+        </a:xfrm>
+      </p:grpSpPr>
+      <p:pic>
+        <p:nvPicPr>
+          <p:cNvPr id="4" name="Picture 3" descr="A drawing of a cartoon character&#10;&#10;Description generated with high confidence">
+            <a:extLst>
+              <a:ext uri="{FF2B5EF4-FFF2-40B4-BE49-F238E27FC236}">
+                <a16:creationId xmlns:a16="http://schemas.microsoft.com/office/drawing/2014/main" id="{CBB175C8-60EC-4174-8BDD-1873E87E30F9}"/>
+              </a:ext>
+            </a:extLst>
+          </p:cNvPr>
+          <p:cNvPicPr>
+            <a:picLocks noChangeAspect="1"/>
+          </p:cNvPicPr>
+          <p:nvPr/>
+        </p:nvPicPr>
+        <p:blipFill rotWithShape="1">
+          <a:blip r:embed="rId2">
+            <a:extLst>
+              <a:ext uri="{28A0092B-C50C-407E-A947-70E740481C1C}">
+                <a14:useLocalDpi xmlns:a14="http://schemas.microsoft.com/office/drawing/2010/main" val="0"/>
+              </a:ext>
+            </a:extLst>
+          </a:blip>
+          <a:srcRect l="7712" r="-2" b="-2"/>
+          <a:stretch/>
+        </p:blipFill>
+        <p:spPr>
+          <a:xfrm>
+            <a:off x="6090613" y="640082"/>
+            <a:ext cx="5461724" cy="5577837"/>
+          </a:xfrm>
+          <a:prstGeom prst="rect">
+            <a:avLst/>
+          </a:prstGeom>
+          <a:effectLst/>
+        </p:spPr>
+      </p:pic>
+      <p:sp>
+        <p:nvSpPr>
+          <p:cNvPr id="2" name="Title 1">
+            <a:extLst>
+              <a:ext uri="{FF2B5EF4-FFF2-40B4-BE49-F238E27FC236}">
+                <a16:creationId xmlns:a16="http://schemas.microsoft.com/office/drawing/2014/main" id="{722B1022-AF8C-4DD6-8B10-4C181995D0B4}"/>
+              </a:ext>
+            </a:extLst>
+          </p:cNvPr>
+          <p:cNvSpPr>
+            <a:spLocks noGrp="1"/>
+          </p:cNvSpPr>
+          <p:nvPr>
+            <p:ph type="title"/>
+          </p:nvPr>
+        </p:nvSpPr>
+        <p:spPr>
+          <a:xfrm>
+            <a:off x="572729" y="2540616"/>
+            <a:ext cx="5127031" cy="1676603"/>
+          </a:xfrm>
+        </p:spPr>
+        <p:txBody>
+          <a:bodyPr>
+            <a:noAutofit/>
+          </a:bodyPr>
+          <a:lstStyle/>
+          <a:p>
+            <a:pPr algn="ctr"/>
+            <a:r>
+              <a:rPr lang="en-US" sz="30000" dirty="0">
+                <a:solidFill>
+                  <a:schemeClr val="bg2">
+                    <a:lumMod val="50000"/>
+                  </a:schemeClr>
+                </a:solidFill>
+              </a:rPr>
+              <a:t>?</a:t>
+            </a:r>
+          </a:p>
+        </p:txBody>
+      </p:sp>
+      <p:sp>
+        <p:nvSpPr>
+          <p:cNvPr id="3" name="Content Placeholder 2">
+            <a:extLst>
+              <a:ext uri="{FF2B5EF4-FFF2-40B4-BE49-F238E27FC236}">
+                <a16:creationId xmlns:a16="http://schemas.microsoft.com/office/drawing/2014/main" id="{FCE51C68-6958-4213-804D-2E9340819E4C}"/>
+              </a:ext>
+            </a:extLst>
+          </p:cNvPr>
+          <p:cNvSpPr>
+            <a:spLocks noGrp="1"/>
+          </p:cNvSpPr>
+          <p:nvPr>
+            <p:ph idx="1"/>
+          </p:nvPr>
+        </p:nvSpPr>
+        <p:spPr>
+          <a:xfrm>
+            <a:off x="648930" y="5200650"/>
+            <a:ext cx="5127029" cy="1023169"/>
+          </a:xfrm>
+        </p:spPr>
+        <p:txBody>
+          <a:bodyPr>
+            <a:normAutofit/>
+          </a:bodyPr>
+          <a:lstStyle/>
+          <a:p>
+            <a:pPr marL="0" indent="0" algn="ctr">
+              <a:buNone/>
+            </a:pPr>
+            <a:r>
+              <a:rPr lang="en-US" dirty="0">
+                <a:hlinkClick r:id="rId3"/>
+              </a:rPr>
+              <a:t>https://www.fail2ban.org</a:t>
+            </a:r>
+            <a:endParaRPr lang="en-US" dirty="0"/>
+          </a:p>
+          <a:p>
+            <a:pPr marL="0" indent="0" algn="ctr">
+              <a:buNone/>
+            </a:pPr>
+            <a:r>
+              <a:rPr lang="en-US" dirty="0">
+                <a:hlinkClick r:id="rId4"/>
+              </a:rPr>
+              <a:t>https://github.com/fail2ban</a:t>
+            </a:r>
+            <a:endParaRPr lang="en-US" dirty="0"/>
+          </a:p>
+        </p:txBody>
+      </p:sp>
+    </p:spTree>
+    <p:extLst>
+      <p:ext uri="{BB962C8B-B14F-4D97-AF65-F5344CB8AC3E}">
+        <p14:creationId xmlns:p14="http://schemas.microsoft.com/office/powerpoint/2010/main" val="2371076207"/>
       </p:ext>
     </p:extLst>
   </p:cSld>
@@ -5188,10 +6319,10 @@
       </p:grpSpPr>
       <p:sp>
         <p:nvSpPr>
-          <p:cNvPr id="39" name="Rectangle 38">
-            <a:extLst>
-              <a:ext uri="{FF2B5EF4-FFF2-40B4-BE49-F238E27FC236}">
-                <a16:creationId xmlns:a16="http://schemas.microsoft.com/office/drawing/2014/main" id="{A98BC887-4916-4227-9F48-3B078D238FAF}"/>
+          <p:cNvPr id="46" name="Rectangle 45">
+            <a:extLst>
+              <a:ext uri="{FF2B5EF4-FFF2-40B4-BE49-F238E27FC236}">
+                <a16:creationId xmlns:a16="http://schemas.microsoft.com/office/drawing/2014/main" id="{99899462-FC16-43B0-966B-FCA263450716}"/>
               </a:ext>
               <a:ext uri="{C183D7F6-B498-43B3-948B-1728B52AA6E4}">
                 <adec:decorative xmlns:adec="http://schemas.microsoft.com/office/drawing/2017/decorative" val="1"/>
@@ -5209,19 +6340,21 @@
             </p:extLst>
           </p:nvPr>
         </p:nvSpPr>
-        <p:spPr>
+        <p:spPr bwMode="ltGray">
           <a:xfrm>
-            <a:off x="0" y="0"/>
-            <a:ext cx="4636008" cy="6858000"/>
+            <a:off x="4654295" y="478232"/>
+            <a:ext cx="7034121" cy="5918673"/>
           </a:xfrm>
           <a:prstGeom prst="rect">
             <a:avLst/>
           </a:prstGeom>
           <a:solidFill>
-            <a:srgbClr val="C8CACA"/>
+            <a:srgbClr val="404040"/>
           </a:solidFill>
-          <a:ln>
-            <a:noFill/>
+          <a:ln w="127000" cap="sq" cmpd="thinThick">
+            <a:solidFill>
+              <a:srgbClr val="404040"/>
+            </a:solidFill>
           </a:ln>
         </p:spPr>
         <p:style>
@@ -5249,80 +6382,6 @@
           </a:p>
         </p:txBody>
       </p:sp>
-      <p:sp>
-        <p:nvSpPr>
-          <p:cNvPr id="41" name="Rounded Rectangle 9">
-            <a:extLst>
-              <a:ext uri="{FF2B5EF4-FFF2-40B4-BE49-F238E27FC236}">
-                <a16:creationId xmlns:a16="http://schemas.microsoft.com/office/drawing/2014/main" id="{1AD6DCFA-0E71-4650-A5E4-3C20E73EB6C9}"/>
-              </a:ext>
-              <a:ext uri="{C183D7F6-B498-43B3-948B-1728B52AA6E4}">
-                <adec:decorative xmlns:adec="http://schemas.microsoft.com/office/drawing/2017/decorative" val="1"/>
-              </a:ext>
-            </a:extLst>
-          </p:cNvPr>
-          <p:cNvSpPr>
-            <a:spLocks noGrp="1" noRot="1" noChangeAspect="1" noMove="1" noResize="1" noEditPoints="1" noAdjustHandles="1" noChangeArrowheads="1" noChangeShapeType="1" noTextEdit="1"/>
-          </p:cNvSpPr>
-          <p:nvPr>
-            <p:extLst>
-              <p:ext uri="{386F3935-93C4-4BCD-93E2-E3B085C9AB24}">
-                <p16:designElem xmlns:p16="http://schemas.microsoft.com/office/powerpoint/2015/main" val="1"/>
-              </p:ext>
-            </p:extLst>
-          </p:nvPr>
-        </p:nvSpPr>
-        <p:spPr>
-          <a:xfrm>
-            <a:off x="484632" y="484632"/>
-            <a:ext cx="3666744" cy="5739187"/>
-          </a:xfrm>
-          <a:prstGeom prst="roundRect">
-            <a:avLst>
-              <a:gd name="adj" fmla="val 0"/>
-            </a:avLst>
-          </a:prstGeom>
-          <a:solidFill>
-            <a:srgbClr val="FFFFFF"/>
-          </a:solidFill>
-          <a:ln w="9525">
-            <a:solidFill>
-              <a:srgbClr val="C8CACA"/>
-            </a:solidFill>
-          </a:ln>
-          <a:effectLst>
-            <a:outerShdw blurRad="57150" dist="19050" dir="5400000" algn="t" rotWithShape="0">
-              <a:prstClr val="black">
-                <a:alpha val="63000"/>
-              </a:prstClr>
-            </a:outerShdw>
-          </a:effectLst>
-        </p:spPr>
-        <p:style>
-          <a:lnRef idx="2">
-            <a:schemeClr val="accent1">
-              <a:shade val="50000"/>
-            </a:schemeClr>
-          </a:lnRef>
-          <a:fillRef idx="1">
-            <a:schemeClr val="accent1"/>
-          </a:fillRef>
-          <a:effectRef idx="0">
-            <a:schemeClr val="accent1"/>
-          </a:effectRef>
-          <a:fontRef idx="minor">
-            <a:schemeClr val="lt1"/>
-          </a:fontRef>
-        </p:style>
-        <p:txBody>
-          <a:bodyPr rtlCol="0" anchor="ctr"/>
-          <a:lstStyle/>
-          <a:p>
-            <a:pPr algn="ctr"/>
-            <a:endParaRPr lang="en-US"/>
-          </a:p>
-        </p:txBody>
-      </p:sp>
       <p:pic>
         <p:nvPicPr>
           <p:cNvPr id="17" name="Picture 16">
@@ -5344,15 +6403,66 @@
         </p:blipFill>
         <p:spPr>
           <a:xfrm>
-            <a:off x="804672" y="803049"/>
-            <a:ext cx="3026664" cy="2470743"/>
+            <a:off x="604437" y="478232"/>
+            <a:ext cx="3417627" cy="2789902"/>
           </a:xfrm>
           <a:prstGeom prst="rect">
             <a:avLst/>
           </a:prstGeom>
-          <a:effectLst/>
         </p:spPr>
       </p:pic>
+      <p:cxnSp>
+        <p:nvCxnSpPr>
+          <p:cNvPr id="48" name="Straight Connector 47">
+            <a:extLst>
+              <a:ext uri="{FF2B5EF4-FFF2-40B4-BE49-F238E27FC236}">
+                <a16:creationId xmlns:a16="http://schemas.microsoft.com/office/drawing/2014/main" id="{AAFEA932-2DF1-410C-A00A-7A1E7DBF7511}"/>
+              </a:ext>
+              <a:ext uri="{C183D7F6-B498-43B3-948B-1728B52AA6E4}">
+                <adec:decorative xmlns:adec="http://schemas.microsoft.com/office/drawing/2017/decorative" val="1"/>
+              </a:ext>
+            </a:extLst>
+          </p:cNvPr>
+          <p:cNvCxnSpPr>
+            <a:cxnSpLocks noGrp="1" noRot="1" noChangeAspect="1" noMove="1" noResize="1" noEditPoints="1" noAdjustHandles="1" noChangeArrowheads="1" noChangeShapeType="1"/>
+          </p:cNvCxnSpPr>
+          <p:nvPr>
+            <p:extLst>
+              <p:ext uri="{386F3935-93C4-4BCD-93E2-E3B085C9AB24}">
+                <p16:designElem xmlns:p16="http://schemas.microsoft.com/office/powerpoint/2015/main" val="1"/>
+              </p:ext>
+            </p:extLst>
+          </p:nvPr>
+        </p:nvCxnSpPr>
+        <p:spPr>
+          <a:xfrm>
+            <a:off x="5430098" y="2639023"/>
+            <a:ext cx="4562441" cy="0"/>
+          </a:xfrm>
+          <a:prstGeom prst="line">
+            <a:avLst/>
+          </a:prstGeom>
+          <a:ln w="22225">
+            <a:solidFill>
+              <a:srgbClr val="E7E6E6"/>
+            </a:solidFill>
+          </a:ln>
+        </p:spPr>
+        <p:style>
+          <a:lnRef idx="1">
+            <a:schemeClr val="accent1"/>
+          </a:lnRef>
+          <a:fillRef idx="0">
+            <a:schemeClr val="accent1"/>
+          </a:fillRef>
+          <a:effectRef idx="0">
+            <a:schemeClr val="accent1"/>
+          </a:effectRef>
+          <a:fontRef idx="minor">
+            <a:schemeClr val="tx1"/>
+          </a:fontRef>
+        </p:style>
+      </p:cxnSp>
       <p:pic>
         <p:nvPicPr>
           <p:cNvPr id="13" name="Picture 12" descr="A drawing of a cartoon character&#10;&#10;Description generated with high confidence">
@@ -5380,8 +6490,8 @@
         </p:blipFill>
         <p:spPr>
           <a:xfrm>
-            <a:off x="804672" y="3461344"/>
-            <a:ext cx="3026663" cy="2438400"/>
+            <a:off x="582384" y="3589867"/>
+            <a:ext cx="3461734" cy="2788920"/>
           </a:xfrm>
           <a:prstGeom prst="rect">
             <a:avLst/>
@@ -5406,50 +6516,8 @@
         </p:nvSpPr>
         <p:spPr>
           <a:xfrm>
-            <a:off x="5116878" y="629266"/>
-            <a:ext cx="6852872" cy="1676603"/>
-          </a:xfrm>
-        </p:spPr>
-        <p:txBody>
-          <a:bodyPr>
-            <a:noAutofit/>
-          </a:bodyPr>
-          <a:lstStyle/>
-          <a:p>
-            <a:r>
-              <a:rPr lang="en-US" b="1" dirty="0"/>
-              <a:t>Intrusion Prevention Software</a:t>
-            </a:r>
-            <a:br>
-              <a:rPr lang="en-US" dirty="0"/>
-            </a:br>
-            <a:r>
-              <a:rPr lang="en-US" sz="3200" dirty="0"/>
-              <a:t>Protects servers from brute-force attacks</a:t>
-            </a:r>
-          </a:p>
-        </p:txBody>
-      </p:sp>
-      <p:sp>
-        <p:nvSpPr>
-          <p:cNvPr id="3" name="Content Placeholder 2">
-            <a:extLst>
-              <a:ext uri="{FF2B5EF4-FFF2-40B4-BE49-F238E27FC236}">
-                <a16:creationId xmlns:a16="http://schemas.microsoft.com/office/drawing/2014/main" id="{5E01E7AD-6423-4D92-8BAA-4C06CCCFAB3F}"/>
-              </a:ext>
-            </a:extLst>
-          </p:cNvPr>
-          <p:cNvSpPr>
-            <a:spLocks noGrp="1"/>
-          </p:cNvSpPr>
-          <p:nvPr>
-            <p:ph idx="1"/>
-          </p:nvPr>
-        </p:nvSpPr>
-        <p:spPr>
-          <a:xfrm>
-            <a:off x="5116880" y="2438400"/>
-            <a:ext cx="6422848" cy="3785419"/>
+            <a:off x="5297762" y="603255"/>
+            <a:ext cx="6390654" cy="1874902"/>
           </a:xfrm>
         </p:spPr>
         <p:txBody>
@@ -5459,46 +6527,136 @@
           <a:lstStyle/>
           <a:p>
             <a:r>
-              <a:rPr lang="en-US" sz="3200" dirty="0"/>
+              <a:rPr lang="en-US" sz="4000" b="1" dirty="0">
+                <a:solidFill>
+                  <a:srgbClr val="FFFFFF"/>
+                </a:solidFill>
+              </a:rPr>
+              <a:t>Intrusion Prevention Software</a:t>
+            </a:r>
+            <a:br>
+              <a:rPr lang="en-US" sz="3100" dirty="0">
+                <a:solidFill>
+                  <a:srgbClr val="FFFFFF"/>
+                </a:solidFill>
+              </a:rPr>
+            </a:br>
+            <a:r>
+              <a:rPr lang="en-US" sz="3200" dirty="0">
+                <a:solidFill>
+                  <a:srgbClr val="FFFFFF"/>
+                </a:solidFill>
+              </a:rPr>
+              <a:t>Protects servers brute-force attacks</a:t>
+            </a:r>
+          </a:p>
+        </p:txBody>
+      </p:sp>
+      <p:sp>
+        <p:nvSpPr>
+          <p:cNvPr id="3" name="Content Placeholder 2">
+            <a:extLst>
+              <a:ext uri="{FF2B5EF4-FFF2-40B4-BE49-F238E27FC236}">
+                <a16:creationId xmlns:a16="http://schemas.microsoft.com/office/drawing/2014/main" id="{5E01E7AD-6423-4D92-8BAA-4C06CCCFAB3F}"/>
+              </a:ext>
+            </a:extLst>
+          </p:cNvPr>
+          <p:cNvSpPr>
+            <a:spLocks noGrp="1"/>
+          </p:cNvSpPr>
+          <p:nvPr>
+            <p:ph idx="1"/>
+          </p:nvPr>
+        </p:nvSpPr>
+        <p:spPr>
+          <a:xfrm>
+            <a:off x="5297762" y="2799889"/>
+            <a:ext cx="5747187" cy="2987543"/>
+          </a:xfrm>
+        </p:spPr>
+        <p:txBody>
+          <a:bodyPr anchor="t">
+            <a:normAutofit/>
+          </a:bodyPr>
+          <a:lstStyle/>
+          <a:p>
+            <a:r>
+              <a:rPr lang="en-US" sz="3200" dirty="0">
+                <a:solidFill>
+                  <a:srgbClr val="FFFFFF"/>
+                </a:solidFill>
+              </a:rPr>
               <a:t>Cyril </a:t>
             </a:r>
             <a:r>
-              <a:rPr lang="en-US" sz="3200" dirty="0" err="1"/>
+              <a:rPr lang="en-US" sz="3200" dirty="0" err="1">
+                <a:solidFill>
+                  <a:srgbClr val="FFFFFF"/>
+                </a:solidFill>
+              </a:rPr>
               <a:t>Jaquier</a:t>
             </a:r>
             <a:r>
-              <a:rPr lang="en-US" sz="3200" dirty="0"/>
+              <a:rPr lang="en-US" sz="3200" dirty="0">
+                <a:solidFill>
+                  <a:srgbClr val="FFFFFF"/>
+                </a:solidFill>
+              </a:rPr>
               <a:t>, in 2004</a:t>
             </a:r>
           </a:p>
           <a:p>
             <a:r>
-              <a:rPr lang="en-US" sz="3200" dirty="0"/>
+              <a:rPr lang="en-US" sz="3200" dirty="0">
+                <a:solidFill>
+                  <a:srgbClr val="FFFFFF"/>
+                </a:solidFill>
+              </a:rPr>
               <a:t>1</a:t>
             </a:r>
             <a:r>
-              <a:rPr lang="en-US" sz="3200" baseline="30000" dirty="0"/>
+              <a:rPr lang="en-US" sz="3200" baseline="30000" dirty="0">
+                <a:solidFill>
+                  <a:srgbClr val="FFFFFF"/>
+                </a:solidFill>
+              </a:rPr>
               <a:t>st</a:t>
             </a:r>
             <a:r>
-              <a:rPr lang="en-US" sz="3200" dirty="0"/>
+              <a:rPr lang="en-US" sz="3200" dirty="0">
+                <a:solidFill>
+                  <a:srgbClr val="FFFFFF"/>
+                </a:solidFill>
+              </a:rPr>
               <a:t> Stable in 2006 (0.6.0)</a:t>
             </a:r>
           </a:p>
           <a:p>
             <a:r>
-              <a:rPr lang="en-US" sz="3200" dirty="0"/>
+              <a:rPr lang="en-US" sz="3200" dirty="0">
+                <a:solidFill>
+                  <a:srgbClr val="FFFFFF"/>
+                </a:solidFill>
+              </a:rPr>
               <a:t>Written in Python</a:t>
             </a:r>
           </a:p>
           <a:p>
             <a:r>
-              <a:rPr lang="en-US" sz="3200" dirty="0"/>
+              <a:rPr lang="en-US" sz="3200" dirty="0">
+                <a:solidFill>
+                  <a:srgbClr val="FFFFFF"/>
+                </a:solidFill>
+              </a:rPr>
               <a:t>POSIX (Unix-like OS)</a:t>
             </a:r>
           </a:p>
           <a:p>
-            <a:endParaRPr lang="en-US" sz="3200" dirty="0"/>
+            <a:endParaRPr lang="en-US" sz="3200" dirty="0">
+              <a:solidFill>
+                <a:srgbClr val="FFFFFF"/>
+              </a:solidFill>
+            </a:endParaRPr>
           </a:p>
         </p:txBody>
       </p:sp>
@@ -5548,24 +6706,109 @@
             <p:ph type="title"/>
           </p:nvPr>
         </p:nvSpPr>
-        <p:spPr/>
-        <p:txBody>
-          <a:bodyPr/>
-          <a:lstStyle/>
-          <a:p>
-            <a:r>
-              <a:rPr lang="en-US" dirty="0"/>
-              <a:t>How it works</a:t>
-            </a:r>
-          </a:p>
-        </p:txBody>
-      </p:sp>
+        <p:spPr>
+          <a:xfrm>
+            <a:off x="0" y="5231"/>
+            <a:ext cx="12192000" cy="705969"/>
+          </a:xfrm>
+          <a:solidFill>
+            <a:schemeClr val="tx1">
+              <a:lumMod val="75000"/>
+              <a:lumOff val="25000"/>
+            </a:schemeClr>
+          </a:solidFill>
+        </p:spPr>
+        <p:txBody>
+          <a:bodyPr>
+            <a:normAutofit/>
+          </a:bodyPr>
+          <a:lstStyle/>
+          <a:p>
+            <a:pPr algn="ctr"/>
+            <a:r>
+              <a:rPr lang="en-US" b="1" dirty="0">
+                <a:solidFill>
+                  <a:schemeClr val="bg1"/>
+                </a:solidFill>
+                <a:latin typeface="+mn-lt"/>
+              </a:rPr>
+              <a:t>How it Works</a:t>
+            </a:r>
+          </a:p>
+        </p:txBody>
+      </p:sp>
+      <p:pic>
+        <p:nvPicPr>
+          <p:cNvPr id="11" name="Picture 10">
+            <a:extLst>
+              <a:ext uri="{FF2B5EF4-FFF2-40B4-BE49-F238E27FC236}">
+                <a16:creationId xmlns:a16="http://schemas.microsoft.com/office/drawing/2014/main" id="{15553F55-0857-4F9B-BCE8-91A38C820B0C}"/>
+              </a:ext>
+            </a:extLst>
+          </p:cNvPr>
+          <p:cNvPicPr>
+            <a:picLocks noChangeAspect="1"/>
+          </p:cNvPicPr>
+          <p:nvPr/>
+        </p:nvPicPr>
+        <p:blipFill>
+          <a:blip r:embed="rId2"/>
+          <a:stretch>
+            <a:fillRect/>
+          </a:stretch>
+        </p:blipFill>
+        <p:spPr>
+          <a:xfrm>
+            <a:off x="5254067" y="2345927"/>
+            <a:ext cx="1905000" cy="1905000"/>
+          </a:xfrm>
+          <a:prstGeom prst="rect">
+            <a:avLst/>
+          </a:prstGeom>
+        </p:spPr>
+      </p:pic>
+      <p:pic>
+        <p:nvPicPr>
+          <p:cNvPr id="5" name="Picture 4" descr="A close up of a sign&#10;&#10;Description generated with very high confidence">
+            <a:extLst>
+              <a:ext uri="{FF2B5EF4-FFF2-40B4-BE49-F238E27FC236}">
+                <a16:creationId xmlns:a16="http://schemas.microsoft.com/office/drawing/2014/main" id="{145127D7-14A1-41A3-B5E3-71DB45C0CA00}"/>
+              </a:ext>
+            </a:extLst>
+          </p:cNvPr>
+          <p:cNvPicPr>
+            <a:picLocks noChangeAspect="1"/>
+          </p:cNvPicPr>
+          <p:nvPr/>
+        </p:nvPicPr>
+        <p:blipFill>
+          <a:blip r:embed="rId3">
+            <a:extLst>
+              <a:ext uri="{28A0092B-C50C-407E-A947-70E740481C1C}">
+                <a14:useLocalDpi xmlns:a14="http://schemas.microsoft.com/office/drawing/2010/main" val="0"/>
+              </a:ext>
+            </a:extLst>
+          </a:blip>
+          <a:stretch>
+            <a:fillRect/>
+          </a:stretch>
+        </p:blipFill>
+        <p:spPr>
+          <a:xfrm>
+            <a:off x="9635765" y="2379301"/>
+            <a:ext cx="1838252" cy="1838252"/>
+          </a:xfrm>
+          <a:prstGeom prst="rect">
+            <a:avLst/>
+          </a:prstGeom>
+        </p:spPr>
+      </p:pic>
       <p:grpSp>
         <p:nvGrpSpPr>
-          <p:cNvPr id="7" name="Group 6">
-            <a:extLst>
-              <a:ext uri="{FF2B5EF4-FFF2-40B4-BE49-F238E27FC236}">
-                <a16:creationId xmlns:a16="http://schemas.microsoft.com/office/drawing/2014/main" id="{5E2F6689-B17F-49C5-8513-C59F87426FB7}"/>
+          <p:cNvPr id="9" name="Group 8">
+            <a:extLst>
+              <a:ext uri="{FF2B5EF4-FFF2-40B4-BE49-F238E27FC236}">
+                <a16:creationId xmlns:a16="http://schemas.microsoft.com/office/drawing/2014/main" id="{B8372BA9-C77F-48C7-A75D-648584677744}"/>
               </a:ext>
             </a:extLst>
           </p:cNvPr>
@@ -5574,57 +6817,46 @@
         </p:nvGrpSpPr>
         <p:grpSpPr>
           <a:xfrm>
-            <a:off x="5005388" y="866775"/>
-            <a:ext cx="1857376" cy="2628682"/>
-            <a:chOff x="757238" y="1825625"/>
-            <a:chExt cx="1857376" cy="2628682"/>
+            <a:off x="252413" y="2012155"/>
+            <a:ext cx="2761457" cy="2572545"/>
+            <a:chOff x="134541" y="1294605"/>
+            <a:chExt cx="2761457" cy="2572545"/>
           </a:xfrm>
         </p:grpSpPr>
         <p:pic>
           <p:nvPicPr>
-            <p:cNvPr id="1028" name="Picture 4" descr="Resultado de imagem para monitoring">
+            <p:cNvPr id="8" name="Picture 7" descr="A close up of a sign&#10;&#10;Description generated with high confidence">
               <a:extLst>
                 <a:ext uri="{FF2B5EF4-FFF2-40B4-BE49-F238E27FC236}">
-                  <a16:creationId xmlns:a16="http://schemas.microsoft.com/office/drawing/2014/main" id="{8533CA3F-7DB5-49BD-AC97-F87DF0C25227}"/>
+                  <a16:creationId xmlns:a16="http://schemas.microsoft.com/office/drawing/2014/main" id="{6622A1ED-0046-4ADA-B198-436807635D9F}"/>
                 </a:ext>
               </a:extLst>
             </p:cNvPr>
             <p:cNvPicPr>
-              <a:picLocks noChangeAspect="1" noChangeArrowheads="1"/>
+              <a:picLocks noChangeAspect="1"/>
             </p:cNvPicPr>
             <p:nvPr/>
           </p:nvPicPr>
           <p:blipFill>
-            <a:blip r:embed="rId2">
+            <a:blip r:embed="rId4">
               <a:extLst>
                 <a:ext uri="{28A0092B-C50C-407E-A947-70E740481C1C}">
                   <a14:useLocalDpi xmlns:a14="http://schemas.microsoft.com/office/drawing/2010/main" val="0"/>
                 </a:ext>
               </a:extLst>
             </a:blip>
-            <a:srcRect/>
             <a:stretch>
               <a:fillRect/>
             </a:stretch>
           </p:blipFill>
-          <p:spPr bwMode="auto">
+          <p:spPr>
             <a:xfrm>
-              <a:off x="757238" y="1825625"/>
-              <a:ext cx="1800225" cy="2543175"/>
+              <a:off x="134541" y="1294605"/>
+              <a:ext cx="2572545" cy="2572545"/>
             </a:xfrm>
             <a:prstGeom prst="rect">
               <a:avLst/>
             </a:prstGeom>
-            <a:noFill/>
-            <a:extLst>
-              <a:ext uri="{909E8E84-426E-40DD-AFC4-6F175D3DCCD1}">
-                <a14:hiddenFill xmlns:a14="http://schemas.microsoft.com/office/drawing/2010/main">
-                  <a:solidFill>
-                    <a:srgbClr val="FFFFFF"/>
-                  </a:solidFill>
-                </a14:hiddenFill>
-              </a:ext>
-            </a:extLst>
           </p:spPr>
         </p:pic>
         <p:pic>
@@ -5642,15 +6874,15 @@
             <p:nvPr/>
           </p:nvPicPr>
           <p:blipFill>
-            <a:blip r:embed="rId3"/>
+            <a:blip r:embed="rId5"/>
             <a:stretch>
               <a:fillRect/>
             </a:stretch>
           </p:blipFill>
           <p:spPr>
             <a:xfrm>
-              <a:off x="1946276" y="3597202"/>
-              <a:ext cx="668338" cy="857105"/>
+              <a:off x="2275086" y="2713407"/>
+              <a:ext cx="620912" cy="796284"/>
             </a:xfrm>
             <a:prstGeom prst="rect">
               <a:avLst/>
@@ -5658,36 +6890,238 @@
           </p:spPr>
         </p:pic>
       </p:grpSp>
-      <p:pic>
-        <p:nvPicPr>
-          <p:cNvPr id="11" name="Picture 10">
-            <a:extLst>
-              <a:ext uri="{FF2B5EF4-FFF2-40B4-BE49-F238E27FC236}">
-                <a16:creationId xmlns:a16="http://schemas.microsoft.com/office/drawing/2014/main" id="{15553F55-0857-4F9B-BCE8-91A38C820B0C}"/>
-              </a:ext>
-            </a:extLst>
-          </p:cNvPr>
-          <p:cNvPicPr>
-            <a:picLocks noChangeAspect="1"/>
-          </p:cNvPicPr>
+      <p:sp>
+        <p:nvSpPr>
+          <p:cNvPr id="10" name="TextBox 9">
+            <a:extLst>
+              <a:ext uri="{FF2B5EF4-FFF2-40B4-BE49-F238E27FC236}">
+                <a16:creationId xmlns:a16="http://schemas.microsoft.com/office/drawing/2014/main" id="{565D7CFE-1989-4229-A429-DB070FB90241}"/>
+              </a:ext>
+            </a:extLst>
+          </p:cNvPr>
+          <p:cNvSpPr txBox="1"/>
           <p:nvPr/>
-        </p:nvPicPr>
-        <p:blipFill>
-          <a:blip r:embed="rId4"/>
-          <a:stretch>
-            <a:fillRect/>
-          </a:stretch>
-        </p:blipFill>
+        </p:nvSpPr>
         <p:spPr>
           <a:xfrm>
-            <a:off x="7594600" y="3829050"/>
-            <a:ext cx="1905000" cy="1905000"/>
+            <a:off x="45641" y="4619552"/>
+            <a:ext cx="3175000" cy="584775"/>
           </a:xfrm>
           <a:prstGeom prst="rect">
             <a:avLst/>
           </a:prstGeom>
+          <a:noFill/>
         </p:spPr>
-      </p:pic>
+        <p:txBody>
+          <a:bodyPr wrap="square" rtlCol="0">
+            <a:spAutoFit/>
+          </a:bodyPr>
+          <a:lstStyle/>
+          <a:p>
+            <a:pPr algn="ctr"/>
+            <a:r>
+              <a:rPr lang="en-US" sz="3200" dirty="0"/>
+              <a:t>Monitors log files</a:t>
+            </a:r>
+          </a:p>
+        </p:txBody>
+      </p:sp>
+      <p:sp>
+        <p:nvSpPr>
+          <p:cNvPr id="13" name="TextBox 12">
+            <a:extLst>
+              <a:ext uri="{FF2B5EF4-FFF2-40B4-BE49-F238E27FC236}">
+                <a16:creationId xmlns:a16="http://schemas.microsoft.com/office/drawing/2014/main" id="{1775F863-23E6-43B4-B3F6-62087AEBA5E5}"/>
+              </a:ext>
+            </a:extLst>
+          </p:cNvPr>
+          <p:cNvSpPr txBox="1"/>
+          <p:nvPr/>
+        </p:nvSpPr>
+        <p:spPr>
+          <a:xfrm>
+            <a:off x="4619067" y="4619552"/>
+            <a:ext cx="3175000" cy="584775"/>
+          </a:xfrm>
+          <a:prstGeom prst="rect">
+            <a:avLst/>
+          </a:prstGeom>
+          <a:noFill/>
+        </p:spPr>
+        <p:txBody>
+          <a:bodyPr wrap="square" rtlCol="0">
+            <a:spAutoFit/>
+          </a:bodyPr>
+          <a:lstStyle/>
+          <a:p>
+            <a:pPr algn="ctr"/>
+            <a:r>
+              <a:rPr lang="en-US" sz="3200" dirty="0"/>
+              <a:t>Pattern</a:t>
+            </a:r>
+          </a:p>
+        </p:txBody>
+      </p:sp>
+      <p:sp>
+        <p:nvSpPr>
+          <p:cNvPr id="14" name="TextBox 13">
+            <a:extLst>
+              <a:ext uri="{FF2B5EF4-FFF2-40B4-BE49-F238E27FC236}">
+                <a16:creationId xmlns:a16="http://schemas.microsoft.com/office/drawing/2014/main" id="{6035DC9F-7D57-44CD-80B1-79BD755B3EAC}"/>
+              </a:ext>
+            </a:extLst>
+          </p:cNvPr>
+          <p:cNvSpPr txBox="1"/>
+          <p:nvPr/>
+        </p:nvSpPr>
+        <p:spPr>
+          <a:xfrm>
+            <a:off x="8967391" y="4619552"/>
+            <a:ext cx="3175000" cy="584775"/>
+          </a:xfrm>
+          <a:prstGeom prst="rect">
+            <a:avLst/>
+          </a:prstGeom>
+          <a:noFill/>
+        </p:spPr>
+        <p:txBody>
+          <a:bodyPr wrap="square" rtlCol="0">
+            <a:spAutoFit/>
+          </a:bodyPr>
+          <a:lstStyle/>
+          <a:p>
+            <a:pPr algn="ctr"/>
+            <a:r>
+              <a:rPr lang="en-US" sz="3200" dirty="0"/>
+              <a:t>Do something</a:t>
+            </a:r>
+          </a:p>
+        </p:txBody>
+      </p:sp>
+      <p:sp>
+        <p:nvSpPr>
+          <p:cNvPr id="12" name="Arrow: Chevron 11">
+            <a:extLst>
+              <a:ext uri="{FF2B5EF4-FFF2-40B4-BE49-F238E27FC236}">
+                <a16:creationId xmlns:a16="http://schemas.microsoft.com/office/drawing/2014/main" id="{D3C14AF8-299C-4896-A3C7-958501CB2363}"/>
+              </a:ext>
+            </a:extLst>
+          </p:cNvPr>
+          <p:cNvSpPr/>
+          <p:nvPr/>
+        </p:nvSpPr>
+        <p:spPr>
+          <a:xfrm>
+            <a:off x="3790076" y="2900285"/>
+            <a:ext cx="444500" cy="796284"/>
+          </a:xfrm>
+          <a:prstGeom prst="chevron">
+            <a:avLst/>
+          </a:prstGeom>
+          <a:solidFill>
+            <a:schemeClr val="bg1">
+              <a:lumMod val="85000"/>
+            </a:schemeClr>
+          </a:solidFill>
+          <a:ln>
+            <a:solidFill>
+              <a:schemeClr val="bg1">
+                <a:lumMod val="65000"/>
+              </a:schemeClr>
+            </a:solidFill>
+          </a:ln>
+        </p:spPr>
+        <p:style>
+          <a:lnRef idx="2">
+            <a:schemeClr val="accent1">
+              <a:shade val="50000"/>
+            </a:schemeClr>
+          </a:lnRef>
+          <a:fillRef idx="1">
+            <a:schemeClr val="accent1"/>
+          </a:fillRef>
+          <a:effectRef idx="0">
+            <a:schemeClr val="accent1"/>
+          </a:effectRef>
+          <a:fontRef idx="minor">
+            <a:schemeClr val="lt1"/>
+          </a:fontRef>
+        </p:style>
+        <p:txBody>
+          <a:bodyPr rtlCol="0" anchor="ctr"/>
+          <a:lstStyle/>
+          <a:p>
+            <a:pPr algn="ctr"/>
+            <a:endParaRPr lang="en-US">
+              <a:solidFill>
+                <a:schemeClr val="tx1"/>
+              </a:solidFill>
+            </a:endParaRPr>
+          </a:p>
+        </p:txBody>
+      </p:sp>
+      <p:sp>
+        <p:nvSpPr>
+          <p:cNvPr id="16" name="Arrow: Chevron 15">
+            <a:extLst>
+              <a:ext uri="{FF2B5EF4-FFF2-40B4-BE49-F238E27FC236}">
+                <a16:creationId xmlns:a16="http://schemas.microsoft.com/office/drawing/2014/main" id="{F37EA005-92EA-42CA-9243-08D22EE9354D}"/>
+              </a:ext>
+            </a:extLst>
+          </p:cNvPr>
+          <p:cNvSpPr/>
+          <p:nvPr/>
+        </p:nvSpPr>
+        <p:spPr>
+          <a:xfrm>
+            <a:off x="8178558" y="2900285"/>
+            <a:ext cx="444500" cy="796284"/>
+          </a:xfrm>
+          <a:prstGeom prst="chevron">
+            <a:avLst/>
+          </a:prstGeom>
+          <a:solidFill>
+            <a:schemeClr val="bg1">
+              <a:lumMod val="85000"/>
+            </a:schemeClr>
+          </a:solidFill>
+          <a:ln>
+            <a:solidFill>
+              <a:schemeClr val="bg1">
+                <a:lumMod val="65000"/>
+              </a:schemeClr>
+            </a:solidFill>
+          </a:ln>
+        </p:spPr>
+        <p:style>
+          <a:lnRef idx="2">
+            <a:schemeClr val="accent1">
+              <a:shade val="50000"/>
+            </a:schemeClr>
+          </a:lnRef>
+          <a:fillRef idx="1">
+            <a:schemeClr val="accent1"/>
+          </a:fillRef>
+          <a:effectRef idx="0">
+            <a:schemeClr val="accent1"/>
+          </a:effectRef>
+          <a:fontRef idx="minor">
+            <a:schemeClr val="lt1"/>
+          </a:fontRef>
+        </p:style>
+        <p:txBody>
+          <a:bodyPr rtlCol="0" anchor="ctr"/>
+          <a:lstStyle/>
+          <a:p>
+            <a:pPr algn="ctr"/>
+            <a:endParaRPr lang="en-US">
+              <a:solidFill>
+                <a:schemeClr val="tx1"/>
+              </a:solidFill>
+            </a:endParaRPr>
+          </a:p>
+        </p:txBody>
+      </p:sp>
     </p:spTree>
     <p:extLst>
       <p:ext uri="{BB962C8B-B14F-4D97-AF65-F5344CB8AC3E}">
@@ -5697,6 +7131,2274 @@
   </p:cSld>
   <p:clrMapOvr>
     <a:masterClrMapping/>
+  </p:clrMapOvr>
+</p:sld>
+</file>
+
+<file path=ppt/slides/slide6.xml><?xml version="1.0" encoding="utf-8"?>
+<p:sld xmlns:a="http://schemas.openxmlformats.org/drawingml/2006/main" xmlns:r="http://schemas.openxmlformats.org/officeDocument/2006/relationships" xmlns:p="http://schemas.openxmlformats.org/presentationml/2006/main">
+  <p:cSld>
+    <p:spTree>
+      <p:nvGrpSpPr>
+        <p:cNvPr id="1" name=""/>
+        <p:cNvGrpSpPr/>
+        <p:nvPr/>
+      </p:nvGrpSpPr>
+      <p:grpSpPr>
+        <a:xfrm>
+          <a:off x="0" y="0"/>
+          <a:ext cx="0" cy="0"/>
+          <a:chOff x="0" y="0"/>
+          <a:chExt cx="0" cy="0"/>
+        </a:xfrm>
+      </p:grpSpPr>
+      <p:grpSp>
+        <p:nvGrpSpPr>
+          <p:cNvPr id="27" name="Group 26">
+            <a:extLst>
+              <a:ext uri="{FF2B5EF4-FFF2-40B4-BE49-F238E27FC236}">
+                <a16:creationId xmlns:a16="http://schemas.microsoft.com/office/drawing/2014/main" id="{3855DBAA-0AF0-4C17-BC4E-8A9F1662D4D2}"/>
+              </a:ext>
+            </a:extLst>
+          </p:cNvPr>
+          <p:cNvGrpSpPr/>
+          <p:nvPr/>
+        </p:nvGrpSpPr>
+        <p:grpSpPr>
+          <a:xfrm>
+            <a:off x="253790" y="928966"/>
+            <a:ext cx="3214113" cy="1727390"/>
+            <a:chOff x="4311440" y="928966"/>
+            <a:chExt cx="3214113" cy="1727390"/>
+          </a:xfrm>
+        </p:grpSpPr>
+        <p:pic>
+          <p:nvPicPr>
+            <p:cNvPr id="11" name="Picture 10">
+              <a:extLst>
+                <a:ext uri="{FF2B5EF4-FFF2-40B4-BE49-F238E27FC236}">
+                  <a16:creationId xmlns:a16="http://schemas.microsoft.com/office/drawing/2014/main" id="{15553F55-0857-4F9B-BCE8-91A38C820B0C}"/>
+                </a:ext>
+              </a:extLst>
+            </p:cNvPr>
+            <p:cNvPicPr>
+              <a:picLocks noChangeAspect="1"/>
+            </p:cNvPicPr>
+            <p:nvPr/>
+          </p:nvPicPr>
+          <p:blipFill>
+            <a:blip r:embed="rId2"/>
+            <a:stretch>
+              <a:fillRect/>
+            </a:stretch>
+          </p:blipFill>
+          <p:spPr>
+            <a:xfrm>
+              <a:off x="5396752" y="1612867"/>
+              <a:ext cx="1043489" cy="1043489"/>
+            </a:xfrm>
+            <a:prstGeom prst="rect">
+              <a:avLst/>
+            </a:prstGeom>
+          </p:spPr>
+        </p:pic>
+        <p:sp>
+          <p:nvSpPr>
+            <p:cNvPr id="15" name="TextBox 14">
+              <a:extLst>
+                <a:ext uri="{FF2B5EF4-FFF2-40B4-BE49-F238E27FC236}">
+                  <a16:creationId xmlns:a16="http://schemas.microsoft.com/office/drawing/2014/main" id="{0D47C143-AB3E-4CBA-8ABA-CDEC568DE1B2}"/>
+                </a:ext>
+              </a:extLst>
+            </p:cNvPr>
+            <p:cNvSpPr txBox="1"/>
+            <p:nvPr/>
+          </p:nvSpPr>
+          <p:spPr>
+            <a:xfrm>
+              <a:off x="4311440" y="928966"/>
+              <a:ext cx="3214113" cy="584775"/>
+            </a:xfrm>
+            <a:prstGeom prst="rect">
+              <a:avLst/>
+            </a:prstGeom>
+            <a:noFill/>
+          </p:spPr>
+          <p:txBody>
+            <a:bodyPr wrap="square" rtlCol="0">
+              <a:spAutoFit/>
+            </a:bodyPr>
+            <a:lstStyle/>
+            <a:p>
+              <a:pPr algn="ctr"/>
+              <a:r>
+                <a:rPr lang="en-US" sz="3200" dirty="0"/>
+                <a:t>Pattern -&gt; Filter</a:t>
+              </a:r>
+            </a:p>
+          </p:txBody>
+        </p:sp>
+      </p:grpSp>
+      <p:pic>
+        <p:nvPicPr>
+          <p:cNvPr id="18" name="Picture 17">
+            <a:extLst>
+              <a:ext uri="{FF2B5EF4-FFF2-40B4-BE49-F238E27FC236}">
+                <a16:creationId xmlns:a16="http://schemas.microsoft.com/office/drawing/2014/main" id="{D53A0208-C203-4227-851B-CF53E4569D25}"/>
+              </a:ext>
+            </a:extLst>
+          </p:cNvPr>
+          <p:cNvPicPr>
+            <a:picLocks noChangeAspect="1"/>
+          </p:cNvPicPr>
+          <p:nvPr/>
+        </p:nvPicPr>
+        <p:blipFill>
+          <a:blip r:embed="rId3">
+            <a:extLst>
+              <a:ext uri="{28A0092B-C50C-407E-A947-70E740481C1C}">
+                <a14:useLocalDpi xmlns:a14="http://schemas.microsoft.com/office/drawing/2010/main" val="0"/>
+              </a:ext>
+            </a:extLst>
+          </a:blip>
+          <a:stretch>
+            <a:fillRect/>
+          </a:stretch>
+        </p:blipFill>
+        <p:spPr>
+          <a:xfrm>
+            <a:off x="9242063" y="2232135"/>
+            <a:ext cx="2143125" cy="2143125"/>
+          </a:xfrm>
+          <a:prstGeom prst="rect">
+            <a:avLst/>
+          </a:prstGeom>
+        </p:spPr>
+      </p:pic>
+      <p:sp>
+        <p:nvSpPr>
+          <p:cNvPr id="19" name="TextBox 18">
+            <a:extLst>
+              <a:ext uri="{FF2B5EF4-FFF2-40B4-BE49-F238E27FC236}">
+                <a16:creationId xmlns:a16="http://schemas.microsoft.com/office/drawing/2014/main" id="{320BB493-EB16-4029-8E60-744DB0CD172A}"/>
+              </a:ext>
+            </a:extLst>
+          </p:cNvPr>
+          <p:cNvSpPr txBox="1"/>
+          <p:nvPr/>
+        </p:nvSpPr>
+        <p:spPr>
+          <a:xfrm>
+            <a:off x="9531266" y="4578172"/>
+            <a:ext cx="1564717" cy="584775"/>
+          </a:xfrm>
+          <a:prstGeom prst="rect">
+            <a:avLst/>
+          </a:prstGeom>
+          <a:noFill/>
+        </p:spPr>
+        <p:txBody>
+          <a:bodyPr wrap="square" rtlCol="0">
+            <a:spAutoFit/>
+          </a:bodyPr>
+          <a:lstStyle/>
+          <a:p>
+            <a:pPr algn="ctr"/>
+            <a:r>
+              <a:rPr lang="en-US" sz="3200" dirty="0"/>
+              <a:t>Jail</a:t>
+            </a:r>
+          </a:p>
+        </p:txBody>
+      </p:sp>
+      <p:grpSp>
+        <p:nvGrpSpPr>
+          <p:cNvPr id="26" name="Group 25">
+            <a:extLst>
+              <a:ext uri="{FF2B5EF4-FFF2-40B4-BE49-F238E27FC236}">
+                <a16:creationId xmlns:a16="http://schemas.microsoft.com/office/drawing/2014/main" id="{8898E240-BB91-476B-A172-3A3E48B119E7}"/>
+              </a:ext>
+            </a:extLst>
+          </p:cNvPr>
+          <p:cNvGrpSpPr/>
+          <p:nvPr/>
+        </p:nvGrpSpPr>
+        <p:grpSpPr>
+          <a:xfrm>
+            <a:off x="59503" y="4644303"/>
+            <a:ext cx="3602686" cy="2006870"/>
+            <a:chOff x="4117153" y="4644303"/>
+            <a:chExt cx="3602686" cy="2006870"/>
+          </a:xfrm>
+        </p:grpSpPr>
+        <p:sp>
+          <p:nvSpPr>
+            <p:cNvPr id="17" name="TextBox 16">
+              <a:extLst>
+                <a:ext uri="{FF2B5EF4-FFF2-40B4-BE49-F238E27FC236}">
+                  <a16:creationId xmlns:a16="http://schemas.microsoft.com/office/drawing/2014/main" id="{2E546757-703D-468C-8181-A5489064352B}"/>
+                </a:ext>
+              </a:extLst>
+            </p:cNvPr>
+            <p:cNvSpPr txBox="1"/>
+            <p:nvPr/>
+          </p:nvSpPr>
+          <p:spPr>
+            <a:xfrm>
+              <a:off x="4117153" y="6066398"/>
+              <a:ext cx="3602686" cy="584775"/>
+            </a:xfrm>
+            <a:prstGeom prst="rect">
+              <a:avLst/>
+            </a:prstGeom>
+            <a:noFill/>
+          </p:spPr>
+          <p:txBody>
+            <a:bodyPr wrap="square" rtlCol="0">
+              <a:spAutoFit/>
+            </a:bodyPr>
+            <a:lstStyle/>
+            <a:p>
+              <a:pPr algn="ctr"/>
+              <a:r>
+                <a:rPr lang="en-US" sz="3200" dirty="0"/>
+                <a:t>Do… -&gt; Action(s)</a:t>
+              </a:r>
+            </a:p>
+          </p:txBody>
+        </p:sp>
+        <p:grpSp>
+          <p:nvGrpSpPr>
+            <p:cNvPr id="25" name="Group 24">
+              <a:extLst>
+                <a:ext uri="{FF2B5EF4-FFF2-40B4-BE49-F238E27FC236}">
+                  <a16:creationId xmlns:a16="http://schemas.microsoft.com/office/drawing/2014/main" id="{16F05038-25FF-4771-B440-1E6C5D2067AB}"/>
+                </a:ext>
+              </a:extLst>
+            </p:cNvPr>
+            <p:cNvGrpSpPr/>
+            <p:nvPr/>
+          </p:nvGrpSpPr>
+          <p:grpSpPr>
+            <a:xfrm>
+              <a:off x="5233923" y="4644303"/>
+              <a:ext cx="1369146" cy="1216747"/>
+              <a:chOff x="5233924" y="4644303"/>
+              <a:chExt cx="1369146" cy="1216747"/>
+            </a:xfrm>
+          </p:grpSpPr>
+          <p:pic>
+            <p:nvPicPr>
+              <p:cNvPr id="5" name="Picture 4" descr="A close up of a sign&#10;&#10;Description generated with very high confidence">
+                <a:extLst>
+                  <a:ext uri="{FF2B5EF4-FFF2-40B4-BE49-F238E27FC236}">
+                    <a16:creationId xmlns:a16="http://schemas.microsoft.com/office/drawing/2014/main" id="{145127D7-14A1-41A3-B5E3-71DB45C0CA00}"/>
+                  </a:ext>
+                </a:extLst>
+              </p:cNvPr>
+              <p:cNvPicPr>
+                <a:picLocks noChangeAspect="1"/>
+              </p:cNvPicPr>
+              <p:nvPr/>
+            </p:nvPicPr>
+            <p:blipFill>
+              <a:blip r:embed="rId4">
+                <a:extLst>
+                  <a:ext uri="{28A0092B-C50C-407E-A947-70E740481C1C}">
+                    <a14:useLocalDpi xmlns:a14="http://schemas.microsoft.com/office/drawing/2010/main" val="0"/>
+                  </a:ext>
+                </a:extLst>
+              </a:blip>
+              <a:stretch>
+                <a:fillRect/>
+              </a:stretch>
+            </p:blipFill>
+            <p:spPr>
+              <a:xfrm>
+                <a:off x="5233924" y="5252677"/>
+                <a:ext cx="608373" cy="608373"/>
+              </a:xfrm>
+              <a:prstGeom prst="rect">
+                <a:avLst/>
+              </a:prstGeom>
+            </p:spPr>
+          </p:pic>
+          <p:pic>
+            <p:nvPicPr>
+              <p:cNvPr id="22" name="Picture 21" descr="A close up of a sign&#10;&#10;Description generated with very high confidence">
+                <a:extLst>
+                  <a:ext uri="{FF2B5EF4-FFF2-40B4-BE49-F238E27FC236}">
+                    <a16:creationId xmlns:a16="http://schemas.microsoft.com/office/drawing/2014/main" id="{EC5718F2-4A1D-461D-B346-172D95480B21}"/>
+                  </a:ext>
+                </a:extLst>
+              </p:cNvPr>
+              <p:cNvPicPr>
+                <a:picLocks noChangeAspect="1"/>
+              </p:cNvPicPr>
+              <p:nvPr/>
+            </p:nvPicPr>
+            <p:blipFill>
+              <a:blip r:embed="rId4">
+                <a:extLst>
+                  <a:ext uri="{28A0092B-C50C-407E-A947-70E740481C1C}">
+                    <a14:useLocalDpi xmlns:a14="http://schemas.microsoft.com/office/drawing/2010/main" val="0"/>
+                  </a:ext>
+                </a:extLst>
+              </a:blip>
+              <a:stretch>
+                <a:fillRect/>
+              </a:stretch>
+            </p:blipFill>
+            <p:spPr>
+              <a:xfrm>
+                <a:off x="5614311" y="4644303"/>
+                <a:ext cx="608373" cy="608373"/>
+              </a:xfrm>
+              <a:prstGeom prst="rect">
+                <a:avLst/>
+              </a:prstGeom>
+            </p:spPr>
+          </p:pic>
+          <p:pic>
+            <p:nvPicPr>
+              <p:cNvPr id="23" name="Picture 22" descr="A close up of a sign&#10;&#10;Description generated with very high confidence">
+                <a:extLst>
+                  <a:ext uri="{FF2B5EF4-FFF2-40B4-BE49-F238E27FC236}">
+                    <a16:creationId xmlns:a16="http://schemas.microsoft.com/office/drawing/2014/main" id="{8DAC223D-2094-4EE2-929E-3983096EA738}"/>
+                  </a:ext>
+                </a:extLst>
+              </p:cNvPr>
+              <p:cNvPicPr>
+                <a:picLocks noChangeAspect="1"/>
+              </p:cNvPicPr>
+              <p:nvPr/>
+            </p:nvPicPr>
+            <p:blipFill>
+              <a:blip r:embed="rId4">
+                <a:extLst>
+                  <a:ext uri="{28A0092B-C50C-407E-A947-70E740481C1C}">
+                    <a14:useLocalDpi xmlns:a14="http://schemas.microsoft.com/office/drawing/2010/main" val="0"/>
+                  </a:ext>
+                </a:extLst>
+              </a:blip>
+              <a:stretch>
+                <a:fillRect/>
+              </a:stretch>
+            </p:blipFill>
+            <p:spPr>
+              <a:xfrm>
+                <a:off x="5994697" y="5252676"/>
+                <a:ext cx="608373" cy="608373"/>
+              </a:xfrm>
+              <a:prstGeom prst="rect">
+                <a:avLst/>
+              </a:prstGeom>
+            </p:spPr>
+          </p:pic>
+        </p:grpSp>
+      </p:grpSp>
+      <p:sp>
+        <p:nvSpPr>
+          <p:cNvPr id="24" name="Right Brace 23">
+            <a:extLst>
+              <a:ext uri="{FF2B5EF4-FFF2-40B4-BE49-F238E27FC236}">
+                <a16:creationId xmlns:a16="http://schemas.microsoft.com/office/drawing/2014/main" id="{C8AA0D1F-FF42-4FE7-9ED5-930334E5BB17}"/>
+              </a:ext>
+            </a:extLst>
+          </p:cNvPr>
+          <p:cNvSpPr/>
+          <p:nvPr/>
+        </p:nvSpPr>
+        <p:spPr>
+          <a:xfrm>
+            <a:off x="7423150" y="1221353"/>
+            <a:ext cx="1441450" cy="5173097"/>
+          </a:xfrm>
+          <a:prstGeom prst="rightBrace">
+            <a:avLst/>
+          </a:prstGeom>
+          <a:ln w="19050">
+            <a:solidFill>
+              <a:schemeClr val="bg1">
+                <a:lumMod val="50000"/>
+              </a:schemeClr>
+            </a:solidFill>
+          </a:ln>
+        </p:spPr>
+        <p:style>
+          <a:lnRef idx="1">
+            <a:schemeClr val="accent1"/>
+          </a:lnRef>
+          <a:fillRef idx="0">
+            <a:schemeClr val="accent1"/>
+          </a:fillRef>
+          <a:effectRef idx="0">
+            <a:schemeClr val="accent1"/>
+          </a:effectRef>
+          <a:fontRef idx="minor">
+            <a:schemeClr val="tx1"/>
+          </a:fontRef>
+        </p:style>
+        <p:txBody>
+          <a:bodyPr rtlCol="0" anchor="ctr"/>
+          <a:lstStyle/>
+          <a:p>
+            <a:pPr algn="ctr"/>
+            <a:endParaRPr lang="en-US"/>
+          </a:p>
+        </p:txBody>
+      </p:sp>
+      <p:sp>
+        <p:nvSpPr>
+          <p:cNvPr id="31" name="Title 1">
+            <a:extLst>
+              <a:ext uri="{FF2B5EF4-FFF2-40B4-BE49-F238E27FC236}">
+                <a16:creationId xmlns:a16="http://schemas.microsoft.com/office/drawing/2014/main" id="{823730B9-3BD3-4481-9DAC-34E6AB26E36F}"/>
+              </a:ext>
+            </a:extLst>
+          </p:cNvPr>
+          <p:cNvSpPr>
+            <a:spLocks noGrp="1"/>
+          </p:cNvSpPr>
+          <p:nvPr>
+            <p:ph type="title"/>
+          </p:nvPr>
+        </p:nvSpPr>
+        <p:spPr>
+          <a:xfrm>
+            <a:off x="0" y="5231"/>
+            <a:ext cx="12192000" cy="705969"/>
+          </a:xfrm>
+          <a:solidFill>
+            <a:schemeClr val="tx1">
+              <a:lumMod val="75000"/>
+              <a:lumOff val="25000"/>
+            </a:schemeClr>
+          </a:solidFill>
+        </p:spPr>
+        <p:txBody>
+          <a:bodyPr>
+            <a:normAutofit/>
+          </a:bodyPr>
+          <a:lstStyle/>
+          <a:p>
+            <a:pPr algn="ctr"/>
+            <a:r>
+              <a:rPr lang="en-US" b="1" dirty="0">
+                <a:solidFill>
+                  <a:schemeClr val="bg1"/>
+                </a:solidFill>
+                <a:latin typeface="+mn-lt"/>
+              </a:rPr>
+              <a:t>Components</a:t>
+            </a:r>
+          </a:p>
+        </p:txBody>
+      </p:sp>
+    </p:spTree>
+    <p:extLst>
+      <p:ext uri="{BB962C8B-B14F-4D97-AF65-F5344CB8AC3E}">
+        <p14:creationId xmlns:p14="http://schemas.microsoft.com/office/powerpoint/2010/main" val="985310026"/>
+      </p:ext>
+    </p:extLst>
+  </p:cSld>
+  <p:clrMapOvr>
+    <a:masterClrMapping/>
+  </p:clrMapOvr>
+</p:sld>
+</file>
+
+<file path=ppt/slides/slide7.xml><?xml version="1.0" encoding="utf-8"?>
+<p:sld xmlns:a="http://schemas.openxmlformats.org/drawingml/2006/main" xmlns:r="http://schemas.openxmlformats.org/officeDocument/2006/relationships" xmlns:p="http://schemas.openxmlformats.org/presentationml/2006/main">
+  <p:cSld>
+    <p:spTree>
+      <p:nvGrpSpPr>
+        <p:cNvPr id="1" name=""/>
+        <p:cNvGrpSpPr/>
+        <p:nvPr/>
+      </p:nvGrpSpPr>
+      <p:grpSpPr>
+        <a:xfrm>
+          <a:off x="0" y="0"/>
+          <a:ext cx="0" cy="0"/>
+          <a:chOff x="0" y="0"/>
+          <a:chExt cx="0" cy="0"/>
+        </a:xfrm>
+      </p:grpSpPr>
+      <p:grpSp>
+        <p:nvGrpSpPr>
+          <p:cNvPr id="27" name="Group 26">
+            <a:extLst>
+              <a:ext uri="{FF2B5EF4-FFF2-40B4-BE49-F238E27FC236}">
+                <a16:creationId xmlns:a16="http://schemas.microsoft.com/office/drawing/2014/main" id="{3855DBAA-0AF0-4C17-BC4E-8A9F1662D4D2}"/>
+              </a:ext>
+            </a:extLst>
+          </p:cNvPr>
+          <p:cNvGrpSpPr/>
+          <p:nvPr/>
+        </p:nvGrpSpPr>
+        <p:grpSpPr>
+          <a:xfrm>
+            <a:off x="253790" y="928966"/>
+            <a:ext cx="3214113" cy="1727390"/>
+            <a:chOff x="4311440" y="928966"/>
+            <a:chExt cx="3214113" cy="1727390"/>
+          </a:xfrm>
+        </p:grpSpPr>
+        <p:pic>
+          <p:nvPicPr>
+            <p:cNvPr id="11" name="Picture 10">
+              <a:extLst>
+                <a:ext uri="{FF2B5EF4-FFF2-40B4-BE49-F238E27FC236}">
+                  <a16:creationId xmlns:a16="http://schemas.microsoft.com/office/drawing/2014/main" id="{15553F55-0857-4F9B-BCE8-91A38C820B0C}"/>
+                </a:ext>
+              </a:extLst>
+            </p:cNvPr>
+            <p:cNvPicPr>
+              <a:picLocks noChangeAspect="1"/>
+            </p:cNvPicPr>
+            <p:nvPr/>
+          </p:nvPicPr>
+          <p:blipFill>
+            <a:blip r:embed="rId2"/>
+            <a:stretch>
+              <a:fillRect/>
+            </a:stretch>
+          </p:blipFill>
+          <p:spPr>
+            <a:xfrm>
+              <a:off x="5396752" y="1612867"/>
+              <a:ext cx="1043489" cy="1043489"/>
+            </a:xfrm>
+            <a:prstGeom prst="rect">
+              <a:avLst/>
+            </a:prstGeom>
+          </p:spPr>
+        </p:pic>
+        <p:sp>
+          <p:nvSpPr>
+            <p:cNvPr id="15" name="TextBox 14">
+              <a:extLst>
+                <a:ext uri="{FF2B5EF4-FFF2-40B4-BE49-F238E27FC236}">
+                  <a16:creationId xmlns:a16="http://schemas.microsoft.com/office/drawing/2014/main" id="{0D47C143-AB3E-4CBA-8ABA-CDEC568DE1B2}"/>
+                </a:ext>
+              </a:extLst>
+            </p:cNvPr>
+            <p:cNvSpPr txBox="1"/>
+            <p:nvPr/>
+          </p:nvSpPr>
+          <p:spPr>
+            <a:xfrm>
+              <a:off x="4311440" y="928966"/>
+              <a:ext cx="3214113" cy="584775"/>
+            </a:xfrm>
+            <a:prstGeom prst="rect">
+              <a:avLst/>
+            </a:prstGeom>
+            <a:noFill/>
+          </p:spPr>
+          <p:txBody>
+            <a:bodyPr wrap="square" rtlCol="0">
+              <a:spAutoFit/>
+            </a:bodyPr>
+            <a:lstStyle/>
+            <a:p>
+              <a:pPr algn="ctr"/>
+              <a:r>
+                <a:rPr lang="en-US" sz="3200" dirty="0">
+                  <a:solidFill>
+                    <a:schemeClr val="bg1">
+                      <a:lumMod val="75000"/>
+                    </a:schemeClr>
+                  </a:solidFill>
+                </a:rPr>
+                <a:t>Pattern -&gt; Filter</a:t>
+              </a:r>
+            </a:p>
+          </p:txBody>
+        </p:sp>
+      </p:grpSp>
+      <p:pic>
+        <p:nvPicPr>
+          <p:cNvPr id="18" name="Picture 17">
+            <a:extLst>
+              <a:ext uri="{FF2B5EF4-FFF2-40B4-BE49-F238E27FC236}">
+                <a16:creationId xmlns:a16="http://schemas.microsoft.com/office/drawing/2014/main" id="{D53A0208-C203-4227-851B-CF53E4569D25}"/>
+              </a:ext>
+            </a:extLst>
+          </p:cNvPr>
+          <p:cNvPicPr>
+            <a:picLocks noChangeAspect="1"/>
+          </p:cNvPicPr>
+          <p:nvPr/>
+        </p:nvPicPr>
+        <p:blipFill>
+          <a:blip r:embed="rId3">
+            <a:extLst>
+              <a:ext uri="{28A0092B-C50C-407E-A947-70E740481C1C}">
+                <a14:useLocalDpi xmlns:a14="http://schemas.microsoft.com/office/drawing/2010/main" val="0"/>
+              </a:ext>
+            </a:extLst>
+          </a:blip>
+          <a:stretch>
+            <a:fillRect/>
+          </a:stretch>
+        </p:blipFill>
+        <p:spPr>
+          <a:xfrm>
+            <a:off x="9242063" y="2232135"/>
+            <a:ext cx="2143125" cy="2143125"/>
+          </a:xfrm>
+          <a:prstGeom prst="rect">
+            <a:avLst/>
+          </a:prstGeom>
+        </p:spPr>
+      </p:pic>
+      <p:sp>
+        <p:nvSpPr>
+          <p:cNvPr id="19" name="TextBox 18">
+            <a:extLst>
+              <a:ext uri="{FF2B5EF4-FFF2-40B4-BE49-F238E27FC236}">
+                <a16:creationId xmlns:a16="http://schemas.microsoft.com/office/drawing/2014/main" id="{320BB493-EB16-4029-8E60-744DB0CD172A}"/>
+              </a:ext>
+            </a:extLst>
+          </p:cNvPr>
+          <p:cNvSpPr txBox="1"/>
+          <p:nvPr/>
+        </p:nvSpPr>
+        <p:spPr>
+          <a:xfrm>
+            <a:off x="9531266" y="4578172"/>
+            <a:ext cx="1564717" cy="584775"/>
+          </a:xfrm>
+          <a:prstGeom prst="rect">
+            <a:avLst/>
+          </a:prstGeom>
+          <a:noFill/>
+        </p:spPr>
+        <p:txBody>
+          <a:bodyPr wrap="square" rtlCol="0">
+            <a:spAutoFit/>
+          </a:bodyPr>
+          <a:lstStyle/>
+          <a:p>
+            <a:pPr algn="ctr"/>
+            <a:r>
+              <a:rPr lang="en-US" sz="3200" dirty="0"/>
+              <a:t>Jail</a:t>
+            </a:r>
+          </a:p>
+        </p:txBody>
+      </p:sp>
+      <p:grpSp>
+        <p:nvGrpSpPr>
+          <p:cNvPr id="26" name="Group 25">
+            <a:extLst>
+              <a:ext uri="{FF2B5EF4-FFF2-40B4-BE49-F238E27FC236}">
+                <a16:creationId xmlns:a16="http://schemas.microsoft.com/office/drawing/2014/main" id="{8898E240-BB91-476B-A172-3A3E48B119E7}"/>
+              </a:ext>
+            </a:extLst>
+          </p:cNvPr>
+          <p:cNvGrpSpPr/>
+          <p:nvPr/>
+        </p:nvGrpSpPr>
+        <p:grpSpPr>
+          <a:xfrm>
+            <a:off x="59503" y="4644303"/>
+            <a:ext cx="3602686" cy="2006870"/>
+            <a:chOff x="4117153" y="4644303"/>
+            <a:chExt cx="3602686" cy="2006870"/>
+          </a:xfrm>
+        </p:grpSpPr>
+        <p:sp>
+          <p:nvSpPr>
+            <p:cNvPr id="17" name="TextBox 16">
+              <a:extLst>
+                <a:ext uri="{FF2B5EF4-FFF2-40B4-BE49-F238E27FC236}">
+                  <a16:creationId xmlns:a16="http://schemas.microsoft.com/office/drawing/2014/main" id="{2E546757-703D-468C-8181-A5489064352B}"/>
+                </a:ext>
+              </a:extLst>
+            </p:cNvPr>
+            <p:cNvSpPr txBox="1"/>
+            <p:nvPr/>
+          </p:nvSpPr>
+          <p:spPr>
+            <a:xfrm>
+              <a:off x="4117153" y="6066398"/>
+              <a:ext cx="3602686" cy="584775"/>
+            </a:xfrm>
+            <a:prstGeom prst="rect">
+              <a:avLst/>
+            </a:prstGeom>
+            <a:noFill/>
+          </p:spPr>
+          <p:txBody>
+            <a:bodyPr wrap="square" rtlCol="0">
+              <a:spAutoFit/>
+            </a:bodyPr>
+            <a:lstStyle/>
+            <a:p>
+              <a:pPr algn="ctr"/>
+              <a:r>
+                <a:rPr lang="en-US" sz="3200" dirty="0">
+                  <a:solidFill>
+                    <a:schemeClr val="bg1">
+                      <a:lumMod val="75000"/>
+                    </a:schemeClr>
+                  </a:solidFill>
+                </a:rPr>
+                <a:t>Do… -&gt; Action(s)</a:t>
+              </a:r>
+            </a:p>
+          </p:txBody>
+        </p:sp>
+        <p:grpSp>
+          <p:nvGrpSpPr>
+            <p:cNvPr id="25" name="Group 24">
+              <a:extLst>
+                <a:ext uri="{FF2B5EF4-FFF2-40B4-BE49-F238E27FC236}">
+                  <a16:creationId xmlns:a16="http://schemas.microsoft.com/office/drawing/2014/main" id="{16F05038-25FF-4771-B440-1E6C5D2067AB}"/>
+                </a:ext>
+              </a:extLst>
+            </p:cNvPr>
+            <p:cNvGrpSpPr/>
+            <p:nvPr/>
+          </p:nvGrpSpPr>
+          <p:grpSpPr>
+            <a:xfrm>
+              <a:off x="5233923" y="4644303"/>
+              <a:ext cx="1369146" cy="1216747"/>
+              <a:chOff x="5233924" y="4644303"/>
+              <a:chExt cx="1369146" cy="1216747"/>
+            </a:xfrm>
+          </p:grpSpPr>
+          <p:pic>
+            <p:nvPicPr>
+              <p:cNvPr id="5" name="Picture 4" descr="A close up of a sign&#10;&#10;Description generated with very high confidence">
+                <a:extLst>
+                  <a:ext uri="{FF2B5EF4-FFF2-40B4-BE49-F238E27FC236}">
+                    <a16:creationId xmlns:a16="http://schemas.microsoft.com/office/drawing/2014/main" id="{145127D7-14A1-41A3-B5E3-71DB45C0CA00}"/>
+                  </a:ext>
+                </a:extLst>
+              </p:cNvPr>
+              <p:cNvPicPr>
+                <a:picLocks noChangeAspect="1"/>
+              </p:cNvPicPr>
+              <p:nvPr/>
+            </p:nvPicPr>
+            <p:blipFill>
+              <a:blip r:embed="rId4">
+                <a:extLst>
+                  <a:ext uri="{28A0092B-C50C-407E-A947-70E740481C1C}">
+                    <a14:useLocalDpi xmlns:a14="http://schemas.microsoft.com/office/drawing/2010/main" val="0"/>
+                  </a:ext>
+                </a:extLst>
+              </a:blip>
+              <a:stretch>
+                <a:fillRect/>
+              </a:stretch>
+            </p:blipFill>
+            <p:spPr>
+              <a:xfrm>
+                <a:off x="5233924" y="5252677"/>
+                <a:ext cx="608373" cy="608373"/>
+              </a:xfrm>
+              <a:prstGeom prst="rect">
+                <a:avLst/>
+              </a:prstGeom>
+            </p:spPr>
+          </p:pic>
+          <p:pic>
+            <p:nvPicPr>
+              <p:cNvPr id="22" name="Picture 21" descr="A close up of a sign&#10;&#10;Description generated with very high confidence">
+                <a:extLst>
+                  <a:ext uri="{FF2B5EF4-FFF2-40B4-BE49-F238E27FC236}">
+                    <a16:creationId xmlns:a16="http://schemas.microsoft.com/office/drawing/2014/main" id="{EC5718F2-4A1D-461D-B346-172D95480B21}"/>
+                  </a:ext>
+                </a:extLst>
+              </p:cNvPr>
+              <p:cNvPicPr>
+                <a:picLocks noChangeAspect="1"/>
+              </p:cNvPicPr>
+              <p:nvPr/>
+            </p:nvPicPr>
+            <p:blipFill>
+              <a:blip r:embed="rId4">
+                <a:extLst>
+                  <a:ext uri="{28A0092B-C50C-407E-A947-70E740481C1C}">
+                    <a14:useLocalDpi xmlns:a14="http://schemas.microsoft.com/office/drawing/2010/main" val="0"/>
+                  </a:ext>
+                </a:extLst>
+              </a:blip>
+              <a:stretch>
+                <a:fillRect/>
+              </a:stretch>
+            </p:blipFill>
+            <p:spPr>
+              <a:xfrm>
+                <a:off x="5614311" y="4644303"/>
+                <a:ext cx="608373" cy="608373"/>
+              </a:xfrm>
+              <a:prstGeom prst="rect">
+                <a:avLst/>
+              </a:prstGeom>
+            </p:spPr>
+          </p:pic>
+          <p:pic>
+            <p:nvPicPr>
+              <p:cNvPr id="23" name="Picture 22" descr="A close up of a sign&#10;&#10;Description generated with very high confidence">
+                <a:extLst>
+                  <a:ext uri="{FF2B5EF4-FFF2-40B4-BE49-F238E27FC236}">
+                    <a16:creationId xmlns:a16="http://schemas.microsoft.com/office/drawing/2014/main" id="{8DAC223D-2094-4EE2-929E-3983096EA738}"/>
+                  </a:ext>
+                </a:extLst>
+              </p:cNvPr>
+              <p:cNvPicPr>
+                <a:picLocks noChangeAspect="1"/>
+              </p:cNvPicPr>
+              <p:nvPr/>
+            </p:nvPicPr>
+            <p:blipFill>
+              <a:blip r:embed="rId4">
+                <a:extLst>
+                  <a:ext uri="{28A0092B-C50C-407E-A947-70E740481C1C}">
+                    <a14:useLocalDpi xmlns:a14="http://schemas.microsoft.com/office/drawing/2010/main" val="0"/>
+                  </a:ext>
+                </a:extLst>
+              </a:blip>
+              <a:stretch>
+                <a:fillRect/>
+              </a:stretch>
+            </p:blipFill>
+            <p:spPr>
+              <a:xfrm>
+                <a:off x="5994697" y="5252676"/>
+                <a:ext cx="608373" cy="608373"/>
+              </a:xfrm>
+              <a:prstGeom prst="rect">
+                <a:avLst/>
+              </a:prstGeom>
+            </p:spPr>
+          </p:pic>
+        </p:grpSp>
+      </p:grpSp>
+      <p:sp>
+        <p:nvSpPr>
+          <p:cNvPr id="24" name="Right Brace 23">
+            <a:extLst>
+              <a:ext uri="{FF2B5EF4-FFF2-40B4-BE49-F238E27FC236}">
+                <a16:creationId xmlns:a16="http://schemas.microsoft.com/office/drawing/2014/main" id="{C8AA0D1F-FF42-4FE7-9ED5-930334E5BB17}"/>
+              </a:ext>
+            </a:extLst>
+          </p:cNvPr>
+          <p:cNvSpPr/>
+          <p:nvPr/>
+        </p:nvSpPr>
+        <p:spPr>
+          <a:xfrm>
+            <a:off x="7423150" y="1221353"/>
+            <a:ext cx="1441450" cy="5173097"/>
+          </a:xfrm>
+          <a:prstGeom prst="rightBrace">
+            <a:avLst/>
+          </a:prstGeom>
+          <a:ln w="19050">
+            <a:solidFill>
+              <a:schemeClr val="bg1">
+                <a:lumMod val="50000"/>
+              </a:schemeClr>
+            </a:solidFill>
+          </a:ln>
+        </p:spPr>
+        <p:style>
+          <a:lnRef idx="1">
+            <a:schemeClr val="accent1"/>
+          </a:lnRef>
+          <a:fillRef idx="0">
+            <a:schemeClr val="accent1"/>
+          </a:fillRef>
+          <a:effectRef idx="0">
+            <a:schemeClr val="accent1"/>
+          </a:effectRef>
+          <a:fontRef idx="minor">
+            <a:schemeClr val="tx1"/>
+          </a:fontRef>
+        </p:style>
+        <p:txBody>
+          <a:bodyPr rtlCol="0" anchor="ctr"/>
+          <a:lstStyle/>
+          <a:p>
+            <a:pPr algn="ctr"/>
+            <a:endParaRPr lang="en-US"/>
+          </a:p>
+        </p:txBody>
+      </p:sp>
+      <p:sp>
+        <p:nvSpPr>
+          <p:cNvPr id="3" name="TextBox 2">
+            <a:extLst>
+              <a:ext uri="{FF2B5EF4-FFF2-40B4-BE49-F238E27FC236}">
+                <a16:creationId xmlns:a16="http://schemas.microsoft.com/office/drawing/2014/main" id="{5B915B2A-6613-4EED-9747-ADAEA8E79303}"/>
+              </a:ext>
+            </a:extLst>
+          </p:cNvPr>
+          <p:cNvSpPr txBox="1"/>
+          <p:nvPr/>
+        </p:nvSpPr>
+        <p:spPr>
+          <a:xfrm>
+            <a:off x="3469214" y="1472744"/>
+            <a:ext cx="3711937" cy="584775"/>
+          </a:xfrm>
+          <a:prstGeom prst="rect">
+            <a:avLst/>
+          </a:prstGeom>
+          <a:noFill/>
+        </p:spPr>
+        <p:txBody>
+          <a:bodyPr wrap="square" rtlCol="0">
+            <a:spAutoFit/>
+          </a:bodyPr>
+          <a:lstStyle/>
+          <a:p>
+            <a:pPr algn="ctr"/>
+            <a:r>
+              <a:rPr lang="en-US" sz="3200" b="1" dirty="0"/>
+              <a:t>Regular Expression</a:t>
+            </a:r>
+          </a:p>
+        </p:txBody>
+      </p:sp>
+      <p:sp>
+        <p:nvSpPr>
+          <p:cNvPr id="8" name="TextBox 7">
+            <a:extLst>
+              <a:ext uri="{FF2B5EF4-FFF2-40B4-BE49-F238E27FC236}">
+                <a16:creationId xmlns:a16="http://schemas.microsoft.com/office/drawing/2014/main" id="{F15F9A74-6552-40C2-8687-C33F2CB6B233}"/>
+              </a:ext>
+            </a:extLst>
+          </p:cNvPr>
+          <p:cNvSpPr txBox="1"/>
+          <p:nvPr/>
+        </p:nvSpPr>
+        <p:spPr>
+          <a:xfrm>
+            <a:off x="2588332" y="2065424"/>
+            <a:ext cx="5473701" cy="461665"/>
+          </a:xfrm>
+          <a:prstGeom prst="rect">
+            <a:avLst/>
+          </a:prstGeom>
+          <a:solidFill>
+            <a:schemeClr val="tx1">
+              <a:lumMod val="50000"/>
+              <a:lumOff val="50000"/>
+            </a:schemeClr>
+          </a:solidFill>
+        </p:spPr>
+        <p:txBody>
+          <a:bodyPr wrap="square" rtlCol="0">
+            <a:spAutoFit/>
+          </a:bodyPr>
+          <a:lstStyle/>
+          <a:p>
+            <a:pPr algn="ctr"/>
+            <a:r>
+              <a:rPr lang="en-US" sz="2400" dirty="0">
+                <a:solidFill>
+                  <a:schemeClr val="bg1"/>
+                </a:solidFill>
+              </a:rPr>
+              <a:t>[</a:t>
+            </a:r>
+            <a:r>
+              <a:rPr lang="en-US" sz="2400" dirty="0" err="1">
+                <a:solidFill>
+                  <a:schemeClr val="bg1"/>
+                </a:solidFill>
+              </a:rPr>
+              <a:t>iI</a:t>
+            </a:r>
+            <a:r>
+              <a:rPr lang="en-US" sz="2400" dirty="0">
+                <a:solidFill>
+                  <a:schemeClr val="bg1"/>
+                </a:solidFill>
+              </a:rPr>
+              <a:t>](?:</a:t>
+            </a:r>
+            <a:r>
+              <a:rPr lang="en-US" sz="2400" dirty="0" err="1">
+                <a:solidFill>
+                  <a:schemeClr val="bg1"/>
+                </a:solidFill>
+              </a:rPr>
+              <a:t>llegal|nvalid</a:t>
+            </a:r>
+            <a:r>
+              <a:rPr lang="en-US" sz="2400" dirty="0">
+                <a:solidFill>
+                  <a:schemeClr val="bg1"/>
+                </a:solidFill>
+              </a:rPr>
+              <a:t>) user .* from &lt;HOST&gt;</a:t>
+            </a:r>
+          </a:p>
+        </p:txBody>
+      </p:sp>
+      <p:sp>
+        <p:nvSpPr>
+          <p:cNvPr id="21" name="TextBox 20">
+            <a:extLst>
+              <a:ext uri="{FF2B5EF4-FFF2-40B4-BE49-F238E27FC236}">
+                <a16:creationId xmlns:a16="http://schemas.microsoft.com/office/drawing/2014/main" id="{A7D811A6-53AE-4AB0-BA69-83C510B9B3BA}"/>
+              </a:ext>
+            </a:extLst>
+          </p:cNvPr>
+          <p:cNvSpPr txBox="1"/>
+          <p:nvPr/>
+        </p:nvSpPr>
+        <p:spPr>
+          <a:xfrm>
+            <a:off x="3469214" y="5228613"/>
+            <a:ext cx="3711937" cy="584775"/>
+          </a:xfrm>
+          <a:prstGeom prst="rect">
+            <a:avLst/>
+          </a:prstGeom>
+          <a:noFill/>
+        </p:spPr>
+        <p:txBody>
+          <a:bodyPr wrap="square" rtlCol="0">
+            <a:spAutoFit/>
+          </a:bodyPr>
+          <a:lstStyle/>
+          <a:p>
+            <a:pPr algn="ctr"/>
+            <a:r>
+              <a:rPr lang="en-US" sz="3200" b="1" dirty="0"/>
+              <a:t>Scripts</a:t>
+            </a:r>
+          </a:p>
+        </p:txBody>
+      </p:sp>
+      <p:sp>
+        <p:nvSpPr>
+          <p:cNvPr id="28" name="TextBox 27">
+            <a:extLst>
+              <a:ext uri="{FF2B5EF4-FFF2-40B4-BE49-F238E27FC236}">
+                <a16:creationId xmlns:a16="http://schemas.microsoft.com/office/drawing/2014/main" id="{0AEE05DE-7F15-4F10-BEDE-12F4C99FA789}"/>
+              </a:ext>
+            </a:extLst>
+          </p:cNvPr>
+          <p:cNvSpPr txBox="1"/>
+          <p:nvPr/>
+        </p:nvSpPr>
+        <p:spPr>
+          <a:xfrm>
+            <a:off x="2588332" y="4701282"/>
+            <a:ext cx="5473701" cy="461665"/>
+          </a:xfrm>
+          <a:prstGeom prst="rect">
+            <a:avLst/>
+          </a:prstGeom>
+          <a:solidFill>
+            <a:schemeClr val="tx1">
+              <a:lumMod val="50000"/>
+              <a:lumOff val="50000"/>
+            </a:schemeClr>
+          </a:solidFill>
+        </p:spPr>
+        <p:txBody>
+          <a:bodyPr wrap="square" rtlCol="0">
+            <a:spAutoFit/>
+          </a:bodyPr>
+          <a:lstStyle/>
+          <a:p>
+            <a:pPr algn="ctr"/>
+            <a:r>
+              <a:rPr lang="en-US" sz="2400" dirty="0">
+                <a:solidFill>
+                  <a:schemeClr val="bg1"/>
+                </a:solidFill>
+              </a:rPr>
+              <a:t>Block &lt;HOST&gt; for 10 minutes</a:t>
+            </a:r>
+          </a:p>
+        </p:txBody>
+      </p:sp>
+      <p:sp>
+        <p:nvSpPr>
+          <p:cNvPr id="30" name="Title 1">
+            <a:extLst>
+              <a:ext uri="{FF2B5EF4-FFF2-40B4-BE49-F238E27FC236}">
+                <a16:creationId xmlns:a16="http://schemas.microsoft.com/office/drawing/2014/main" id="{73C91928-F803-4AD6-9AAA-D39BAB1FD570}"/>
+              </a:ext>
+            </a:extLst>
+          </p:cNvPr>
+          <p:cNvSpPr>
+            <a:spLocks noGrp="1"/>
+          </p:cNvSpPr>
+          <p:nvPr>
+            <p:ph type="title"/>
+          </p:nvPr>
+        </p:nvSpPr>
+        <p:spPr>
+          <a:xfrm>
+            <a:off x="0" y="5231"/>
+            <a:ext cx="12192000" cy="705969"/>
+          </a:xfrm>
+          <a:solidFill>
+            <a:schemeClr val="tx1">
+              <a:lumMod val="75000"/>
+              <a:lumOff val="25000"/>
+            </a:schemeClr>
+          </a:solidFill>
+        </p:spPr>
+        <p:txBody>
+          <a:bodyPr>
+            <a:normAutofit/>
+          </a:bodyPr>
+          <a:lstStyle/>
+          <a:p>
+            <a:pPr algn="ctr"/>
+            <a:r>
+              <a:rPr lang="en-US" b="1" dirty="0">
+                <a:solidFill>
+                  <a:schemeClr val="bg1"/>
+                </a:solidFill>
+                <a:latin typeface="+mn-lt"/>
+              </a:rPr>
+              <a:t>Components</a:t>
+            </a:r>
+          </a:p>
+        </p:txBody>
+      </p:sp>
+    </p:spTree>
+    <p:extLst>
+      <p:ext uri="{BB962C8B-B14F-4D97-AF65-F5344CB8AC3E}">
+        <p14:creationId xmlns:p14="http://schemas.microsoft.com/office/powerpoint/2010/main" val="195365457"/>
+      </p:ext>
+    </p:extLst>
+  </p:cSld>
+  <p:clrMapOvr>
+    <a:masterClrMapping/>
+  </p:clrMapOvr>
+</p:sld>
+</file>
+
+<file path=ppt/slides/slide8.xml><?xml version="1.0" encoding="utf-8"?>
+<p:sld xmlns:a="http://schemas.openxmlformats.org/drawingml/2006/main" xmlns:r="http://schemas.openxmlformats.org/officeDocument/2006/relationships" xmlns:p="http://schemas.openxmlformats.org/presentationml/2006/main">
+  <p:cSld>
+    <p:bg>
+      <p:bgPr>
+        <a:solidFill>
+          <a:schemeClr val="bg1"/>
+        </a:solidFill>
+        <a:effectLst/>
+      </p:bgPr>
+    </p:bg>
+    <p:spTree>
+      <p:nvGrpSpPr>
+        <p:cNvPr id="1" name=""/>
+        <p:cNvGrpSpPr/>
+        <p:nvPr/>
+      </p:nvGrpSpPr>
+      <p:grpSpPr>
+        <a:xfrm>
+          <a:off x="0" y="0"/>
+          <a:ext cx="0" cy="0"/>
+          <a:chOff x="0" y="0"/>
+          <a:chExt cx="0" cy="0"/>
+        </a:xfrm>
+      </p:grpSpPr>
+      <p:sp>
+        <p:nvSpPr>
+          <p:cNvPr id="10" name="Rectangle 9">
+            <a:extLst>
+              <a:ext uri="{FF2B5EF4-FFF2-40B4-BE49-F238E27FC236}">
+                <a16:creationId xmlns:a16="http://schemas.microsoft.com/office/drawing/2014/main" id="{56C20283-73E0-40EC-8AD8-057F581F64C2}"/>
+              </a:ext>
+              <a:ext uri="{C183D7F6-B498-43B3-948B-1728B52AA6E4}">
+                <adec:decorative xmlns:adec="http://schemas.microsoft.com/office/drawing/2017/decorative" val="1"/>
+              </a:ext>
+            </a:extLst>
+          </p:cNvPr>
+          <p:cNvSpPr>
+            <a:spLocks noGrp="1" noRot="1" noChangeAspect="1" noMove="1" noResize="1" noEditPoints="1" noAdjustHandles="1" noChangeArrowheads="1" noChangeShapeType="1" noTextEdit="1"/>
+          </p:cNvSpPr>
+          <p:nvPr>
+            <p:extLst>
+              <p:ext uri="{386F3935-93C4-4BCD-93E2-E3B085C9AB24}">
+                <p16:designElem xmlns:p16="http://schemas.microsoft.com/office/powerpoint/2015/main" val="1"/>
+              </p:ext>
+            </p:extLst>
+          </p:nvPr>
+        </p:nvSpPr>
+        <p:spPr>
+          <a:xfrm>
+            <a:off x="1524" y="0"/>
+            <a:ext cx="12188952" cy="6858000"/>
+          </a:xfrm>
+          <a:prstGeom prst="rect">
+            <a:avLst/>
+          </a:prstGeom>
+          <a:solidFill>
+            <a:schemeClr val="tx1"/>
+          </a:solidFill>
+          <a:ln>
+            <a:noFill/>
+          </a:ln>
+        </p:spPr>
+        <p:style>
+          <a:lnRef idx="2">
+            <a:schemeClr val="accent1">
+              <a:shade val="50000"/>
+            </a:schemeClr>
+          </a:lnRef>
+          <a:fillRef idx="1">
+            <a:schemeClr val="accent1"/>
+          </a:fillRef>
+          <a:effectRef idx="0">
+            <a:schemeClr val="accent1"/>
+          </a:effectRef>
+          <a:fontRef idx="minor">
+            <a:schemeClr val="lt1"/>
+          </a:fontRef>
+        </p:style>
+        <p:txBody>
+          <a:bodyPr rtlCol="0" anchor="ctr"/>
+          <a:lstStyle/>
+          <a:p>
+            <a:pPr algn="ctr"/>
+            <a:endParaRPr lang="en-US"/>
+          </a:p>
+        </p:txBody>
+      </p:sp>
+      <p:sp>
+        <p:nvSpPr>
+          <p:cNvPr id="12" name="Freeform 28">
+            <a:extLst>
+              <a:ext uri="{FF2B5EF4-FFF2-40B4-BE49-F238E27FC236}">
+                <a16:creationId xmlns:a16="http://schemas.microsoft.com/office/drawing/2014/main" id="{3FCC729B-E528-40C3-82D3-BA4375575E87}"/>
+              </a:ext>
+              <a:ext uri="{C183D7F6-B498-43B3-948B-1728B52AA6E4}">
+                <adec:decorative xmlns:adec="http://schemas.microsoft.com/office/drawing/2017/decorative" val="1"/>
+              </a:ext>
+            </a:extLst>
+          </p:cNvPr>
+          <p:cNvSpPr>
+            <a:spLocks noGrp="1" noRot="1" noChangeAspect="1" noMove="1" noResize="1" noEditPoints="1" noAdjustHandles="1" noChangeArrowheads="1" noChangeShapeType="1" noTextEdit="1"/>
+          </p:cNvSpPr>
+          <p:nvPr>
+            <p:extLst>
+              <p:ext uri="{386F3935-93C4-4BCD-93E2-E3B085C9AB24}">
+                <p16:designElem xmlns:p16="http://schemas.microsoft.com/office/powerpoint/2015/main" val="1"/>
+              </p:ext>
+            </p:extLst>
+          </p:nvPr>
+        </p:nvSpPr>
+        <p:spPr>
+          <a:xfrm flipH="1" flipV="1">
+            <a:off x="960120" y="0"/>
+            <a:ext cx="11218661" cy="6858000"/>
+          </a:xfrm>
+          <a:custGeom>
+            <a:avLst/>
+            <a:gdLst>
+              <a:gd name="connsiteX0" fmla="*/ 0 w 11218661"/>
+              <a:gd name="connsiteY0" fmla="*/ 0 h 6858000"/>
+              <a:gd name="connsiteX1" fmla="*/ 8042507 w 11218661"/>
+              <a:gd name="connsiteY1" fmla="*/ 0 h 6858000"/>
+              <a:gd name="connsiteX2" fmla="*/ 11218661 w 11218661"/>
+              <a:gd name="connsiteY2" fmla="*/ 6858000 h 6858000"/>
+              <a:gd name="connsiteX3" fmla="*/ 0 w 11218661"/>
+              <a:gd name="connsiteY3" fmla="*/ 6858000 h 6858000"/>
+            </a:gdLst>
+            <a:ahLst/>
+            <a:cxnLst>
+              <a:cxn ang="0">
+                <a:pos x="connsiteX0" y="connsiteY0"/>
+              </a:cxn>
+              <a:cxn ang="0">
+                <a:pos x="connsiteX1" y="connsiteY1"/>
+              </a:cxn>
+              <a:cxn ang="0">
+                <a:pos x="connsiteX2" y="connsiteY2"/>
+              </a:cxn>
+              <a:cxn ang="0">
+                <a:pos x="connsiteX3" y="connsiteY3"/>
+              </a:cxn>
+            </a:cxnLst>
+            <a:rect l="l" t="t" r="r" b="b"/>
+            <a:pathLst>
+              <a:path w="11218661" h="6858000">
+                <a:moveTo>
+                  <a:pt x="0" y="0"/>
+                </a:moveTo>
+                <a:lnTo>
+                  <a:pt x="8042507" y="0"/>
+                </a:lnTo>
+                <a:lnTo>
+                  <a:pt x="11218661" y="6858000"/>
+                </a:lnTo>
+                <a:lnTo>
+                  <a:pt x="0" y="6858000"/>
+                </a:lnTo>
+                <a:close/>
+              </a:path>
+            </a:pathLst>
+          </a:custGeom>
+          <a:solidFill>
+            <a:schemeClr val="bg1">
+              <a:lumMod val="85000"/>
+              <a:lumOff val="15000"/>
+              <a:alpha val="70000"/>
+            </a:schemeClr>
+          </a:solidFill>
+          <a:ln>
+            <a:noFill/>
+          </a:ln>
+        </p:spPr>
+        <p:style>
+          <a:lnRef idx="2">
+            <a:schemeClr val="accent1">
+              <a:shade val="50000"/>
+            </a:schemeClr>
+          </a:lnRef>
+          <a:fillRef idx="1">
+            <a:schemeClr val="accent1"/>
+          </a:fillRef>
+          <a:effectRef idx="0">
+            <a:schemeClr val="accent1"/>
+          </a:effectRef>
+          <a:fontRef idx="minor">
+            <a:schemeClr val="lt1"/>
+          </a:fontRef>
+        </p:style>
+        <p:txBody>
+          <a:bodyPr wrap="square" rtlCol="0" anchor="ctr">
+            <a:noAutofit/>
+          </a:bodyPr>
+          <a:lstStyle/>
+          <a:p>
+            <a:pPr algn="ctr"/>
+            <a:endParaRPr lang="en-US"/>
+          </a:p>
+        </p:txBody>
+      </p:sp>
+      <p:sp>
+        <p:nvSpPr>
+          <p:cNvPr id="14" name="Freeform 26">
+            <a:extLst>
+              <a:ext uri="{FF2B5EF4-FFF2-40B4-BE49-F238E27FC236}">
+                <a16:creationId xmlns:a16="http://schemas.microsoft.com/office/drawing/2014/main" id="{58F1FB8D-1842-4A04-998D-6CF047AB2790}"/>
+              </a:ext>
+              <a:ext uri="{C183D7F6-B498-43B3-948B-1728B52AA6E4}">
+                <adec:decorative xmlns:adec="http://schemas.microsoft.com/office/drawing/2017/decorative" val="1"/>
+              </a:ext>
+            </a:extLst>
+          </p:cNvPr>
+          <p:cNvSpPr>
+            <a:spLocks noGrp="1" noRot="1" noChangeAspect="1" noMove="1" noResize="1" noEditPoints="1" noAdjustHandles="1" noChangeArrowheads="1" noChangeShapeType="1" noTextEdit="1"/>
+          </p:cNvSpPr>
+          <p:nvPr>
+            <p:extLst>
+              <p:ext uri="{386F3935-93C4-4BCD-93E2-E3B085C9AB24}">
+                <p16:designElem xmlns:p16="http://schemas.microsoft.com/office/powerpoint/2015/main" val="1"/>
+              </p:ext>
+            </p:extLst>
+          </p:nvPr>
+        </p:nvSpPr>
+        <p:spPr>
+          <a:xfrm flipH="1" flipV="1">
+            <a:off x="1420248" y="0"/>
+            <a:ext cx="10771752" cy="6858000"/>
+          </a:xfrm>
+          <a:custGeom>
+            <a:avLst/>
+            <a:gdLst>
+              <a:gd name="connsiteX0" fmla="*/ 0 w 10771752"/>
+              <a:gd name="connsiteY0" fmla="*/ 0 h 6858000"/>
+              <a:gd name="connsiteX1" fmla="*/ 7595598 w 10771752"/>
+              <a:gd name="connsiteY1" fmla="*/ 0 h 6858000"/>
+              <a:gd name="connsiteX2" fmla="*/ 10771752 w 10771752"/>
+              <a:gd name="connsiteY2" fmla="*/ 6858000 h 6858000"/>
+              <a:gd name="connsiteX3" fmla="*/ 0 w 10771752"/>
+              <a:gd name="connsiteY3" fmla="*/ 6858000 h 6858000"/>
+            </a:gdLst>
+            <a:ahLst/>
+            <a:cxnLst>
+              <a:cxn ang="0">
+                <a:pos x="connsiteX0" y="connsiteY0"/>
+              </a:cxn>
+              <a:cxn ang="0">
+                <a:pos x="connsiteX1" y="connsiteY1"/>
+              </a:cxn>
+              <a:cxn ang="0">
+                <a:pos x="connsiteX2" y="connsiteY2"/>
+              </a:cxn>
+              <a:cxn ang="0">
+                <a:pos x="connsiteX3" y="connsiteY3"/>
+              </a:cxn>
+            </a:cxnLst>
+            <a:rect l="l" t="t" r="r" b="b"/>
+            <a:pathLst>
+              <a:path w="10771752" h="6858000">
+                <a:moveTo>
+                  <a:pt x="0" y="0"/>
+                </a:moveTo>
+                <a:lnTo>
+                  <a:pt x="7595598" y="0"/>
+                </a:lnTo>
+                <a:lnTo>
+                  <a:pt x="10771752" y="6858000"/>
+                </a:lnTo>
+                <a:lnTo>
+                  <a:pt x="0" y="6858000"/>
+                </a:lnTo>
+                <a:close/>
+              </a:path>
+            </a:pathLst>
+          </a:custGeom>
+          <a:solidFill>
+            <a:schemeClr val="bg1">
+              <a:lumMod val="85000"/>
+              <a:lumOff val="15000"/>
+            </a:schemeClr>
+          </a:solidFill>
+          <a:ln>
+            <a:noFill/>
+          </a:ln>
+        </p:spPr>
+        <p:style>
+          <a:lnRef idx="2">
+            <a:schemeClr val="accent1">
+              <a:shade val="50000"/>
+            </a:schemeClr>
+          </a:lnRef>
+          <a:fillRef idx="1">
+            <a:schemeClr val="accent1"/>
+          </a:fillRef>
+          <a:effectRef idx="0">
+            <a:schemeClr val="accent1"/>
+          </a:effectRef>
+          <a:fontRef idx="minor">
+            <a:schemeClr val="lt1"/>
+          </a:fontRef>
+        </p:style>
+        <p:txBody>
+          <a:bodyPr wrap="square" rtlCol="0" anchor="ctr">
+            <a:noAutofit/>
+          </a:bodyPr>
+          <a:lstStyle/>
+          <a:p>
+            <a:pPr algn="ctr"/>
+            <a:endParaRPr lang="en-US"/>
+          </a:p>
+        </p:txBody>
+      </p:sp>
+      <p:pic>
+        <p:nvPicPr>
+          <p:cNvPr id="5" name="Picture 4">
+            <a:extLst>
+              <a:ext uri="{FF2B5EF4-FFF2-40B4-BE49-F238E27FC236}">
+                <a16:creationId xmlns:a16="http://schemas.microsoft.com/office/drawing/2014/main" id="{F67A36AD-90E1-4BCB-A8F8-54B73AE35D75}"/>
+              </a:ext>
+            </a:extLst>
+          </p:cNvPr>
+          <p:cNvPicPr>
+            <a:picLocks noChangeAspect="1"/>
+          </p:cNvPicPr>
+          <p:nvPr/>
+        </p:nvPicPr>
+        <p:blipFill>
+          <a:blip r:embed="rId2"/>
+          <a:stretch>
+            <a:fillRect/>
+          </a:stretch>
+        </p:blipFill>
+        <p:spPr>
+          <a:xfrm>
+            <a:off x="480060" y="1715781"/>
+            <a:ext cx="3425957" cy="3425957"/>
+          </a:xfrm>
+          <a:prstGeom prst="rect">
+            <a:avLst/>
+          </a:prstGeom>
+        </p:spPr>
+      </p:pic>
+      <p:sp>
+        <p:nvSpPr>
+          <p:cNvPr id="3" name="Content Placeholder 2">
+            <a:extLst>
+              <a:ext uri="{FF2B5EF4-FFF2-40B4-BE49-F238E27FC236}">
+                <a16:creationId xmlns:a16="http://schemas.microsoft.com/office/drawing/2014/main" id="{8A3578B8-698D-4D84-BD3C-4DAA75B85D9F}"/>
+              </a:ext>
+            </a:extLst>
+          </p:cNvPr>
+          <p:cNvSpPr>
+            <a:spLocks noGrp="1"/>
+          </p:cNvSpPr>
+          <p:nvPr>
+            <p:ph idx="1"/>
+          </p:nvPr>
+        </p:nvSpPr>
+        <p:spPr>
+          <a:xfrm>
+            <a:off x="6071195" y="1112043"/>
+            <a:ext cx="5344582" cy="4633913"/>
+          </a:xfrm>
+        </p:spPr>
+        <p:txBody>
+          <a:bodyPr>
+            <a:noAutofit/>
+          </a:bodyPr>
+          <a:lstStyle/>
+          <a:p>
+            <a:r>
+              <a:rPr lang="en-US" sz="3200"/>
+              <a:t>50+ Default</a:t>
+            </a:r>
+          </a:p>
+          <a:p>
+            <a:endParaRPr lang="en-US" sz="800"/>
+          </a:p>
+          <a:p>
+            <a:r>
+              <a:rPr lang="en-US" sz="3200"/>
+              <a:t>Supported Services:</a:t>
+            </a:r>
+          </a:p>
+          <a:p>
+            <a:pPr lvl="1"/>
+            <a:r>
+              <a:rPr lang="en-US" sz="3200"/>
+              <a:t>SSH</a:t>
+            </a:r>
+          </a:p>
+          <a:p>
+            <a:pPr lvl="1"/>
+            <a:r>
+              <a:rPr lang="en-US" sz="3200"/>
+              <a:t>Apache</a:t>
+            </a:r>
+          </a:p>
+          <a:p>
+            <a:pPr lvl="1"/>
+            <a:r>
+              <a:rPr lang="en-US" sz="3200"/>
+              <a:t>Exim</a:t>
+            </a:r>
+          </a:p>
+          <a:p>
+            <a:pPr lvl="1"/>
+            <a:r>
+              <a:rPr lang="en-US" sz="3200"/>
+              <a:t>Lighttpd</a:t>
+            </a:r>
+          </a:p>
+          <a:p>
+            <a:pPr lvl="1"/>
+            <a:r>
+              <a:rPr lang="en-US" sz="3200"/>
+              <a:t>Postfix</a:t>
+            </a:r>
+          </a:p>
+          <a:p>
+            <a:pPr lvl="1"/>
+            <a:r>
+              <a:rPr lang="en-US" sz="3200"/>
+              <a:t>ProFTPd</a:t>
+            </a:r>
+          </a:p>
+          <a:p>
+            <a:pPr lvl="1"/>
+            <a:r>
+              <a:rPr lang="en-US" sz="3200"/>
+              <a:t>Courier Mail Server</a:t>
+            </a:r>
+          </a:p>
+          <a:p>
+            <a:pPr lvl="1"/>
+            <a:r>
+              <a:rPr lang="en-US" sz="3200"/>
+              <a:t>Vsftpd … and more</a:t>
+            </a:r>
+            <a:endParaRPr lang="en-US" sz="3200" dirty="0"/>
+          </a:p>
+        </p:txBody>
+      </p:sp>
+      <p:sp>
+        <p:nvSpPr>
+          <p:cNvPr id="13" name="Title 1">
+            <a:extLst>
+              <a:ext uri="{FF2B5EF4-FFF2-40B4-BE49-F238E27FC236}">
+                <a16:creationId xmlns:a16="http://schemas.microsoft.com/office/drawing/2014/main" id="{D4DFD4A6-4A25-45C8-94A1-6FAD68614FDE}"/>
+              </a:ext>
+            </a:extLst>
+          </p:cNvPr>
+          <p:cNvSpPr txBox="1">
+            <a:spLocks/>
+          </p:cNvSpPr>
+          <p:nvPr/>
+        </p:nvSpPr>
+        <p:spPr>
+          <a:xfrm>
+            <a:off x="0" y="5231"/>
+            <a:ext cx="12142391" cy="705969"/>
+          </a:xfrm>
+          <a:prstGeom prst="rect">
+            <a:avLst/>
+          </a:prstGeom>
+          <a:noFill/>
+        </p:spPr>
+        <p:txBody>
+          <a:bodyPr vert="horz" lIns="91440" tIns="45720" rIns="91440" bIns="45720" rtlCol="0" anchor="ctr">
+            <a:normAutofit/>
+          </a:bodyPr>
+          <a:lstStyle>
+            <a:lvl1pPr algn="l" defTabSz="914400" rtl="0" eaLnBrk="1" latinLnBrk="0" hangingPunct="1">
+              <a:lnSpc>
+                <a:spcPct val="90000"/>
+              </a:lnSpc>
+              <a:spcBef>
+                <a:spcPct val="0"/>
+              </a:spcBef>
+              <a:buNone/>
+              <a:defRPr sz="4400" kern="1200">
+                <a:solidFill>
+                  <a:schemeClr val="tx1"/>
+                </a:solidFill>
+                <a:latin typeface="+mj-lt"/>
+                <a:ea typeface="+mj-ea"/>
+                <a:cs typeface="+mj-cs"/>
+              </a:defRPr>
+            </a:lvl1pPr>
+          </a:lstStyle>
+          <a:p>
+            <a:pPr algn="ctr"/>
+            <a:r>
+              <a:rPr lang="en-US" b="1">
+                <a:latin typeface="+mn-lt"/>
+              </a:rPr>
+              <a:t>Filters</a:t>
+            </a:r>
+            <a:endParaRPr lang="en-US" b="1" dirty="0">
+              <a:latin typeface="+mn-lt"/>
+            </a:endParaRPr>
+          </a:p>
+        </p:txBody>
+      </p:sp>
+    </p:spTree>
+    <p:extLst>
+      <p:ext uri="{BB962C8B-B14F-4D97-AF65-F5344CB8AC3E}">
+        <p14:creationId xmlns:p14="http://schemas.microsoft.com/office/powerpoint/2010/main" val="968951905"/>
+      </p:ext>
+    </p:extLst>
+  </p:cSld>
+  <p:clrMapOvr>
+    <a:overrideClrMapping bg1="dk1" tx1="lt1" bg2="dk2" tx2="lt2" accent1="accent1" accent2="accent2" accent3="accent3" accent4="accent4" accent5="accent5" accent6="accent6" hlink="hlink" folHlink="folHlink"/>
+  </p:clrMapOvr>
+</p:sld>
+</file>
+
+<file path=ppt/slides/slide9.xml><?xml version="1.0" encoding="utf-8"?>
+<p:sld xmlns:a="http://schemas.openxmlformats.org/drawingml/2006/main" xmlns:r="http://schemas.openxmlformats.org/officeDocument/2006/relationships" xmlns:p="http://schemas.openxmlformats.org/presentationml/2006/main">
+  <p:cSld>
+    <p:bg>
+      <p:bgPr>
+        <a:solidFill>
+          <a:schemeClr val="bg1"/>
+        </a:solidFill>
+        <a:effectLst/>
+      </p:bgPr>
+    </p:bg>
+    <p:spTree>
+      <p:nvGrpSpPr>
+        <p:cNvPr id="1" name=""/>
+        <p:cNvGrpSpPr/>
+        <p:nvPr/>
+      </p:nvGrpSpPr>
+      <p:grpSpPr>
+        <a:xfrm>
+          <a:off x="0" y="0"/>
+          <a:ext cx="0" cy="0"/>
+          <a:chOff x="0" y="0"/>
+          <a:chExt cx="0" cy="0"/>
+        </a:xfrm>
+      </p:grpSpPr>
+      <p:sp>
+        <p:nvSpPr>
+          <p:cNvPr id="10" name="Rectangle 9">
+            <a:extLst>
+              <a:ext uri="{FF2B5EF4-FFF2-40B4-BE49-F238E27FC236}">
+                <a16:creationId xmlns:a16="http://schemas.microsoft.com/office/drawing/2014/main" id="{56C20283-73E0-40EC-8AD8-057F581F64C2}"/>
+              </a:ext>
+              <a:ext uri="{C183D7F6-B498-43B3-948B-1728B52AA6E4}">
+                <adec:decorative xmlns:adec="http://schemas.microsoft.com/office/drawing/2017/decorative" val="1"/>
+              </a:ext>
+            </a:extLst>
+          </p:cNvPr>
+          <p:cNvSpPr>
+            <a:spLocks noGrp="1" noRot="1" noChangeAspect="1" noMove="1" noResize="1" noEditPoints="1" noAdjustHandles="1" noChangeArrowheads="1" noChangeShapeType="1" noTextEdit="1"/>
+          </p:cNvSpPr>
+          <p:nvPr>
+            <p:extLst>
+              <p:ext uri="{386F3935-93C4-4BCD-93E2-E3B085C9AB24}">
+                <p16:designElem xmlns:p16="http://schemas.microsoft.com/office/powerpoint/2015/main" val="1"/>
+              </p:ext>
+            </p:extLst>
+          </p:nvPr>
+        </p:nvSpPr>
+        <p:spPr>
+          <a:xfrm>
+            <a:off x="1524" y="0"/>
+            <a:ext cx="12188952" cy="6858000"/>
+          </a:xfrm>
+          <a:prstGeom prst="rect">
+            <a:avLst/>
+          </a:prstGeom>
+          <a:solidFill>
+            <a:schemeClr val="tx1"/>
+          </a:solidFill>
+          <a:ln>
+            <a:noFill/>
+          </a:ln>
+        </p:spPr>
+        <p:style>
+          <a:lnRef idx="2">
+            <a:schemeClr val="accent1">
+              <a:shade val="50000"/>
+            </a:schemeClr>
+          </a:lnRef>
+          <a:fillRef idx="1">
+            <a:schemeClr val="accent1"/>
+          </a:fillRef>
+          <a:effectRef idx="0">
+            <a:schemeClr val="accent1"/>
+          </a:effectRef>
+          <a:fontRef idx="minor">
+            <a:schemeClr val="lt1"/>
+          </a:fontRef>
+        </p:style>
+        <p:txBody>
+          <a:bodyPr rtlCol="0" anchor="ctr"/>
+          <a:lstStyle/>
+          <a:p>
+            <a:pPr algn="ctr"/>
+            <a:endParaRPr lang="en-US"/>
+          </a:p>
+        </p:txBody>
+      </p:sp>
+      <p:sp>
+        <p:nvSpPr>
+          <p:cNvPr id="12" name="Freeform 28">
+            <a:extLst>
+              <a:ext uri="{FF2B5EF4-FFF2-40B4-BE49-F238E27FC236}">
+                <a16:creationId xmlns:a16="http://schemas.microsoft.com/office/drawing/2014/main" id="{3FCC729B-E528-40C3-82D3-BA4375575E87}"/>
+              </a:ext>
+              <a:ext uri="{C183D7F6-B498-43B3-948B-1728B52AA6E4}">
+                <adec:decorative xmlns:adec="http://schemas.microsoft.com/office/drawing/2017/decorative" val="1"/>
+              </a:ext>
+            </a:extLst>
+          </p:cNvPr>
+          <p:cNvSpPr>
+            <a:spLocks noGrp="1" noRot="1" noChangeAspect="1" noMove="1" noResize="1" noEditPoints="1" noAdjustHandles="1" noChangeArrowheads="1" noChangeShapeType="1" noTextEdit="1"/>
+          </p:cNvSpPr>
+          <p:nvPr>
+            <p:extLst>
+              <p:ext uri="{386F3935-93C4-4BCD-93E2-E3B085C9AB24}">
+                <p16:designElem xmlns:p16="http://schemas.microsoft.com/office/powerpoint/2015/main" val="1"/>
+              </p:ext>
+            </p:extLst>
+          </p:nvPr>
+        </p:nvSpPr>
+        <p:spPr>
+          <a:xfrm flipH="1" flipV="1">
+            <a:off x="960120" y="0"/>
+            <a:ext cx="11218661" cy="6858000"/>
+          </a:xfrm>
+          <a:custGeom>
+            <a:avLst/>
+            <a:gdLst>
+              <a:gd name="connsiteX0" fmla="*/ 0 w 11218661"/>
+              <a:gd name="connsiteY0" fmla="*/ 0 h 6858000"/>
+              <a:gd name="connsiteX1" fmla="*/ 8042507 w 11218661"/>
+              <a:gd name="connsiteY1" fmla="*/ 0 h 6858000"/>
+              <a:gd name="connsiteX2" fmla="*/ 11218661 w 11218661"/>
+              <a:gd name="connsiteY2" fmla="*/ 6858000 h 6858000"/>
+              <a:gd name="connsiteX3" fmla="*/ 0 w 11218661"/>
+              <a:gd name="connsiteY3" fmla="*/ 6858000 h 6858000"/>
+            </a:gdLst>
+            <a:ahLst/>
+            <a:cxnLst>
+              <a:cxn ang="0">
+                <a:pos x="connsiteX0" y="connsiteY0"/>
+              </a:cxn>
+              <a:cxn ang="0">
+                <a:pos x="connsiteX1" y="connsiteY1"/>
+              </a:cxn>
+              <a:cxn ang="0">
+                <a:pos x="connsiteX2" y="connsiteY2"/>
+              </a:cxn>
+              <a:cxn ang="0">
+                <a:pos x="connsiteX3" y="connsiteY3"/>
+              </a:cxn>
+            </a:cxnLst>
+            <a:rect l="l" t="t" r="r" b="b"/>
+            <a:pathLst>
+              <a:path w="11218661" h="6858000">
+                <a:moveTo>
+                  <a:pt x="0" y="0"/>
+                </a:moveTo>
+                <a:lnTo>
+                  <a:pt x="8042507" y="0"/>
+                </a:lnTo>
+                <a:lnTo>
+                  <a:pt x="11218661" y="6858000"/>
+                </a:lnTo>
+                <a:lnTo>
+                  <a:pt x="0" y="6858000"/>
+                </a:lnTo>
+                <a:close/>
+              </a:path>
+            </a:pathLst>
+          </a:custGeom>
+          <a:solidFill>
+            <a:schemeClr val="bg1">
+              <a:lumMod val="85000"/>
+              <a:lumOff val="15000"/>
+              <a:alpha val="70000"/>
+            </a:schemeClr>
+          </a:solidFill>
+          <a:ln>
+            <a:noFill/>
+          </a:ln>
+        </p:spPr>
+        <p:style>
+          <a:lnRef idx="2">
+            <a:schemeClr val="accent1">
+              <a:shade val="50000"/>
+            </a:schemeClr>
+          </a:lnRef>
+          <a:fillRef idx="1">
+            <a:schemeClr val="accent1"/>
+          </a:fillRef>
+          <a:effectRef idx="0">
+            <a:schemeClr val="accent1"/>
+          </a:effectRef>
+          <a:fontRef idx="minor">
+            <a:schemeClr val="lt1"/>
+          </a:fontRef>
+        </p:style>
+        <p:txBody>
+          <a:bodyPr wrap="square" rtlCol="0" anchor="ctr">
+            <a:noAutofit/>
+          </a:bodyPr>
+          <a:lstStyle/>
+          <a:p>
+            <a:pPr algn="ctr"/>
+            <a:endParaRPr lang="en-US"/>
+          </a:p>
+        </p:txBody>
+      </p:sp>
+      <p:sp>
+        <p:nvSpPr>
+          <p:cNvPr id="14" name="Freeform 26">
+            <a:extLst>
+              <a:ext uri="{FF2B5EF4-FFF2-40B4-BE49-F238E27FC236}">
+                <a16:creationId xmlns:a16="http://schemas.microsoft.com/office/drawing/2014/main" id="{58F1FB8D-1842-4A04-998D-6CF047AB2790}"/>
+              </a:ext>
+              <a:ext uri="{C183D7F6-B498-43B3-948B-1728B52AA6E4}">
+                <adec:decorative xmlns:adec="http://schemas.microsoft.com/office/drawing/2017/decorative" val="1"/>
+              </a:ext>
+            </a:extLst>
+          </p:cNvPr>
+          <p:cNvSpPr>
+            <a:spLocks noGrp="1" noRot="1" noChangeAspect="1" noMove="1" noResize="1" noEditPoints="1" noAdjustHandles="1" noChangeArrowheads="1" noChangeShapeType="1" noTextEdit="1"/>
+          </p:cNvSpPr>
+          <p:nvPr>
+            <p:extLst>
+              <p:ext uri="{386F3935-93C4-4BCD-93E2-E3B085C9AB24}">
+                <p16:designElem xmlns:p16="http://schemas.microsoft.com/office/powerpoint/2015/main" val="1"/>
+              </p:ext>
+            </p:extLst>
+          </p:nvPr>
+        </p:nvSpPr>
+        <p:spPr>
+          <a:xfrm flipH="1" flipV="1">
+            <a:off x="1420248" y="0"/>
+            <a:ext cx="10771752" cy="6858000"/>
+          </a:xfrm>
+          <a:custGeom>
+            <a:avLst/>
+            <a:gdLst>
+              <a:gd name="connsiteX0" fmla="*/ 0 w 10771752"/>
+              <a:gd name="connsiteY0" fmla="*/ 0 h 6858000"/>
+              <a:gd name="connsiteX1" fmla="*/ 7595598 w 10771752"/>
+              <a:gd name="connsiteY1" fmla="*/ 0 h 6858000"/>
+              <a:gd name="connsiteX2" fmla="*/ 10771752 w 10771752"/>
+              <a:gd name="connsiteY2" fmla="*/ 6858000 h 6858000"/>
+              <a:gd name="connsiteX3" fmla="*/ 0 w 10771752"/>
+              <a:gd name="connsiteY3" fmla="*/ 6858000 h 6858000"/>
+            </a:gdLst>
+            <a:ahLst/>
+            <a:cxnLst>
+              <a:cxn ang="0">
+                <a:pos x="connsiteX0" y="connsiteY0"/>
+              </a:cxn>
+              <a:cxn ang="0">
+                <a:pos x="connsiteX1" y="connsiteY1"/>
+              </a:cxn>
+              <a:cxn ang="0">
+                <a:pos x="connsiteX2" y="connsiteY2"/>
+              </a:cxn>
+              <a:cxn ang="0">
+                <a:pos x="connsiteX3" y="connsiteY3"/>
+              </a:cxn>
+            </a:cxnLst>
+            <a:rect l="l" t="t" r="r" b="b"/>
+            <a:pathLst>
+              <a:path w="10771752" h="6858000">
+                <a:moveTo>
+                  <a:pt x="0" y="0"/>
+                </a:moveTo>
+                <a:lnTo>
+                  <a:pt x="7595598" y="0"/>
+                </a:lnTo>
+                <a:lnTo>
+                  <a:pt x="10771752" y="6858000"/>
+                </a:lnTo>
+                <a:lnTo>
+                  <a:pt x="0" y="6858000"/>
+                </a:lnTo>
+                <a:close/>
+              </a:path>
+            </a:pathLst>
+          </a:custGeom>
+          <a:solidFill>
+            <a:schemeClr val="bg1">
+              <a:lumMod val="85000"/>
+              <a:lumOff val="15000"/>
+            </a:schemeClr>
+          </a:solidFill>
+          <a:ln>
+            <a:noFill/>
+          </a:ln>
+        </p:spPr>
+        <p:style>
+          <a:lnRef idx="2">
+            <a:schemeClr val="accent1">
+              <a:shade val="50000"/>
+            </a:schemeClr>
+          </a:lnRef>
+          <a:fillRef idx="1">
+            <a:schemeClr val="accent1"/>
+          </a:fillRef>
+          <a:effectRef idx="0">
+            <a:schemeClr val="accent1"/>
+          </a:effectRef>
+          <a:fontRef idx="minor">
+            <a:schemeClr val="lt1"/>
+          </a:fontRef>
+        </p:style>
+        <p:txBody>
+          <a:bodyPr wrap="square" rtlCol="0" anchor="ctr">
+            <a:noAutofit/>
+          </a:bodyPr>
+          <a:lstStyle/>
+          <a:p>
+            <a:pPr algn="ctr"/>
+            <a:endParaRPr lang="en-US"/>
+          </a:p>
+        </p:txBody>
+      </p:sp>
+      <p:sp>
+        <p:nvSpPr>
+          <p:cNvPr id="3" name="Content Placeholder 2">
+            <a:extLst>
+              <a:ext uri="{FF2B5EF4-FFF2-40B4-BE49-F238E27FC236}">
+                <a16:creationId xmlns:a16="http://schemas.microsoft.com/office/drawing/2014/main" id="{8A3578B8-698D-4D84-BD3C-4DAA75B85D9F}"/>
+              </a:ext>
+            </a:extLst>
+          </p:cNvPr>
+          <p:cNvSpPr>
+            <a:spLocks noGrp="1"/>
+          </p:cNvSpPr>
+          <p:nvPr>
+            <p:ph idx="1"/>
+          </p:nvPr>
+        </p:nvSpPr>
+        <p:spPr>
+          <a:xfrm>
+            <a:off x="6096000" y="1073150"/>
+            <a:ext cx="5344582" cy="5160963"/>
+          </a:xfrm>
+        </p:spPr>
+        <p:txBody>
+          <a:bodyPr>
+            <a:noAutofit/>
+          </a:bodyPr>
+          <a:lstStyle/>
+          <a:p>
+            <a:r>
+              <a:rPr lang="en-US" sz="3200" dirty="0"/>
+              <a:t>80+ Default</a:t>
+            </a:r>
+          </a:p>
+          <a:p>
+            <a:endParaRPr lang="en-US" sz="3200" dirty="0"/>
+          </a:p>
+          <a:p>
+            <a:r>
+              <a:rPr lang="en-US" sz="3200" dirty="0" err="1"/>
+              <a:t>Netfilter</a:t>
+            </a:r>
+            <a:endParaRPr lang="en-US" sz="3200" dirty="0"/>
+          </a:p>
+          <a:p>
+            <a:r>
+              <a:rPr lang="en-US" sz="3200" dirty="0"/>
+              <a:t>IP Tables</a:t>
+            </a:r>
+          </a:p>
+          <a:p>
+            <a:r>
+              <a:rPr lang="en-US" sz="3200" dirty="0"/>
+              <a:t>TCP Wrapper </a:t>
+            </a:r>
+            <a:r>
+              <a:rPr lang="en-US" sz="2400" dirty="0"/>
+              <a:t>(/</a:t>
+            </a:r>
+            <a:r>
+              <a:rPr lang="en-US" sz="2400" dirty="0" err="1"/>
+              <a:t>etc</a:t>
+            </a:r>
+            <a:r>
+              <a:rPr lang="en-US" sz="2400" dirty="0"/>
+              <a:t>/</a:t>
+            </a:r>
+            <a:r>
+              <a:rPr lang="en-US" sz="2400" dirty="0" err="1"/>
+              <a:t>hosts.deny</a:t>
+            </a:r>
+            <a:r>
+              <a:rPr lang="en-US" sz="2400" dirty="0"/>
+              <a:t>)</a:t>
+            </a:r>
+          </a:p>
+          <a:p>
+            <a:r>
+              <a:rPr lang="en-US" sz="3200" dirty="0"/>
+              <a:t>Many other firewalls</a:t>
+            </a:r>
+          </a:p>
+          <a:p>
+            <a:r>
+              <a:rPr lang="en-US" sz="3200" dirty="0"/>
+              <a:t>Python-based actions</a:t>
+            </a:r>
+          </a:p>
+        </p:txBody>
+      </p:sp>
+      <p:sp>
+        <p:nvSpPr>
+          <p:cNvPr id="13" name="Title 1">
+            <a:extLst>
+              <a:ext uri="{FF2B5EF4-FFF2-40B4-BE49-F238E27FC236}">
+                <a16:creationId xmlns:a16="http://schemas.microsoft.com/office/drawing/2014/main" id="{D4DFD4A6-4A25-45C8-94A1-6FAD68614FDE}"/>
+              </a:ext>
+            </a:extLst>
+          </p:cNvPr>
+          <p:cNvSpPr txBox="1">
+            <a:spLocks/>
+          </p:cNvSpPr>
+          <p:nvPr/>
+        </p:nvSpPr>
+        <p:spPr>
+          <a:xfrm>
+            <a:off x="0" y="5231"/>
+            <a:ext cx="12142391" cy="705969"/>
+          </a:xfrm>
+          <a:prstGeom prst="rect">
+            <a:avLst/>
+          </a:prstGeom>
+          <a:noFill/>
+        </p:spPr>
+        <p:txBody>
+          <a:bodyPr vert="horz" lIns="91440" tIns="45720" rIns="91440" bIns="45720" rtlCol="0" anchor="ctr">
+            <a:normAutofit/>
+          </a:bodyPr>
+          <a:lstStyle>
+            <a:lvl1pPr algn="l" defTabSz="914400" rtl="0" eaLnBrk="1" latinLnBrk="0" hangingPunct="1">
+              <a:lnSpc>
+                <a:spcPct val="90000"/>
+              </a:lnSpc>
+              <a:spcBef>
+                <a:spcPct val="0"/>
+              </a:spcBef>
+              <a:buNone/>
+              <a:defRPr sz="4400" kern="1200">
+                <a:solidFill>
+                  <a:schemeClr val="tx1"/>
+                </a:solidFill>
+                <a:latin typeface="+mj-lt"/>
+                <a:ea typeface="+mj-ea"/>
+                <a:cs typeface="+mj-cs"/>
+              </a:defRPr>
+            </a:lvl1pPr>
+          </a:lstStyle>
+          <a:p>
+            <a:pPr algn="ctr"/>
+            <a:r>
+              <a:rPr lang="en-US" b="1" dirty="0">
+                <a:latin typeface="+mn-lt"/>
+              </a:rPr>
+              <a:t>Actions</a:t>
+            </a:r>
+          </a:p>
+        </p:txBody>
+      </p:sp>
+      <p:grpSp>
+        <p:nvGrpSpPr>
+          <p:cNvPr id="11" name="Group 10">
+            <a:extLst>
+              <a:ext uri="{FF2B5EF4-FFF2-40B4-BE49-F238E27FC236}">
+                <a16:creationId xmlns:a16="http://schemas.microsoft.com/office/drawing/2014/main" id="{51D2B859-694C-4A8A-A0FF-E271CEFFC2F8}"/>
+              </a:ext>
+            </a:extLst>
+          </p:cNvPr>
+          <p:cNvGrpSpPr/>
+          <p:nvPr/>
+        </p:nvGrpSpPr>
+        <p:grpSpPr>
+          <a:xfrm>
+            <a:off x="858772" y="2154561"/>
+            <a:ext cx="2900428" cy="2548878"/>
+            <a:chOff x="5233924" y="4644303"/>
+            <a:chExt cx="1369146" cy="1216747"/>
+          </a:xfrm>
+        </p:grpSpPr>
+        <p:pic>
+          <p:nvPicPr>
+            <p:cNvPr id="15" name="Picture 14" descr="A close up of a sign&#10;&#10;Description generated with very high confidence">
+              <a:extLst>
+                <a:ext uri="{FF2B5EF4-FFF2-40B4-BE49-F238E27FC236}">
+                  <a16:creationId xmlns:a16="http://schemas.microsoft.com/office/drawing/2014/main" id="{BD648085-E280-40AA-BEE6-E17B8BF3D504}"/>
+                </a:ext>
+              </a:extLst>
+            </p:cNvPr>
+            <p:cNvPicPr>
+              <a:picLocks noChangeAspect="1"/>
+            </p:cNvPicPr>
+            <p:nvPr/>
+          </p:nvPicPr>
+          <p:blipFill>
+            <a:blip r:embed="rId2">
+              <a:extLst>
+                <a:ext uri="{28A0092B-C50C-407E-A947-70E740481C1C}">
+                  <a14:useLocalDpi xmlns:a14="http://schemas.microsoft.com/office/drawing/2010/main" val="0"/>
+                </a:ext>
+              </a:extLst>
+            </a:blip>
+            <a:stretch>
+              <a:fillRect/>
+            </a:stretch>
+          </p:blipFill>
+          <p:spPr>
+            <a:xfrm>
+              <a:off x="5233924" y="5252677"/>
+              <a:ext cx="608373" cy="608373"/>
+            </a:xfrm>
+            <a:prstGeom prst="rect">
+              <a:avLst/>
+            </a:prstGeom>
+          </p:spPr>
+        </p:pic>
+        <p:pic>
+          <p:nvPicPr>
+            <p:cNvPr id="16" name="Picture 15" descr="A close up of a sign&#10;&#10;Description generated with very high confidence">
+              <a:extLst>
+                <a:ext uri="{FF2B5EF4-FFF2-40B4-BE49-F238E27FC236}">
+                  <a16:creationId xmlns:a16="http://schemas.microsoft.com/office/drawing/2014/main" id="{CD7832DC-CCFB-4FF8-B118-3BB8DD1BFE4F}"/>
+                </a:ext>
+              </a:extLst>
+            </p:cNvPr>
+            <p:cNvPicPr>
+              <a:picLocks noChangeAspect="1"/>
+            </p:cNvPicPr>
+            <p:nvPr/>
+          </p:nvPicPr>
+          <p:blipFill>
+            <a:blip r:embed="rId2">
+              <a:extLst>
+                <a:ext uri="{28A0092B-C50C-407E-A947-70E740481C1C}">
+                  <a14:useLocalDpi xmlns:a14="http://schemas.microsoft.com/office/drawing/2010/main" val="0"/>
+                </a:ext>
+              </a:extLst>
+            </a:blip>
+            <a:stretch>
+              <a:fillRect/>
+            </a:stretch>
+          </p:blipFill>
+          <p:spPr>
+            <a:xfrm>
+              <a:off x="5614311" y="4644303"/>
+              <a:ext cx="608373" cy="608373"/>
+            </a:xfrm>
+            <a:prstGeom prst="rect">
+              <a:avLst/>
+            </a:prstGeom>
+          </p:spPr>
+        </p:pic>
+        <p:pic>
+          <p:nvPicPr>
+            <p:cNvPr id="17" name="Picture 16" descr="A close up of a sign&#10;&#10;Description generated with very high confidence">
+              <a:extLst>
+                <a:ext uri="{FF2B5EF4-FFF2-40B4-BE49-F238E27FC236}">
+                  <a16:creationId xmlns:a16="http://schemas.microsoft.com/office/drawing/2014/main" id="{C46D8C03-5E27-498D-80CF-AC2518601A22}"/>
+                </a:ext>
+              </a:extLst>
+            </p:cNvPr>
+            <p:cNvPicPr>
+              <a:picLocks noChangeAspect="1"/>
+            </p:cNvPicPr>
+            <p:nvPr/>
+          </p:nvPicPr>
+          <p:blipFill>
+            <a:blip r:embed="rId2">
+              <a:extLst>
+                <a:ext uri="{28A0092B-C50C-407E-A947-70E740481C1C}">
+                  <a14:useLocalDpi xmlns:a14="http://schemas.microsoft.com/office/drawing/2010/main" val="0"/>
+                </a:ext>
+              </a:extLst>
+            </a:blip>
+            <a:stretch>
+              <a:fillRect/>
+            </a:stretch>
+          </p:blipFill>
+          <p:spPr>
+            <a:xfrm>
+              <a:off x="5994697" y="5252676"/>
+              <a:ext cx="608373" cy="608373"/>
+            </a:xfrm>
+            <a:prstGeom prst="rect">
+              <a:avLst/>
+            </a:prstGeom>
+          </p:spPr>
+        </p:pic>
+      </p:grpSp>
+    </p:spTree>
+    <p:extLst>
+      <p:ext uri="{BB962C8B-B14F-4D97-AF65-F5344CB8AC3E}">
+        <p14:creationId xmlns:p14="http://schemas.microsoft.com/office/powerpoint/2010/main" val="3743128135"/>
+      </p:ext>
+    </p:extLst>
+  </p:cSld>
+  <p:clrMapOvr>
+    <a:overrideClrMapping bg1="dk1" tx1="lt1" bg2="dk2" tx2="lt2" accent1="accent1" accent2="accent2" accent3="accent3" accent4="accent4" accent5="accent5" accent6="accent6" hlink="hlink" folHlink="folHlink"/>
   </p:clrMapOvr>
 </p:sld>
 </file>

</xml_diff>

<commit_message>
Final presentation5 - fail2ban
</commit_message>
<xml_diff>
--- a/MondayPresentations/5_fail2ban/Fail2Ban.pptx
+++ b/MondayPresentations/5_fail2ban/Fail2Ban.pptx
@@ -221,7 +221,7 @@
           <a:p>
             <a:fld id="{26EC06EC-96D1-47F8-BC7B-CDB1F3A5A8A0}" type="datetimeFigureOut">
               <a:rPr lang="en-US" smtClean="0"/>
-              <a:t>7/1/2018</a:t>
+              <a:t>7/2/2018</a:t>
             </a:fld>
             <a:endParaRPr lang="en-US"/>
           </a:p>
@@ -1193,6 +1193,90 @@
 </p:notes>
 </file>
 
+<file path=ppt/notesSlides/notesSlide4.xml><?xml version="1.0" encoding="utf-8"?>
+<p:notes xmlns:a="http://schemas.openxmlformats.org/drawingml/2006/main" xmlns:r="http://schemas.openxmlformats.org/officeDocument/2006/relationships" xmlns:p="http://schemas.openxmlformats.org/presentationml/2006/main">
+  <p:cSld>
+    <p:spTree>
+      <p:nvGrpSpPr>
+        <p:cNvPr id="1" name=""/>
+        <p:cNvGrpSpPr/>
+        <p:nvPr/>
+      </p:nvGrpSpPr>
+      <p:grpSpPr>
+        <a:xfrm>
+          <a:off x="0" y="0"/>
+          <a:ext cx="0" cy="0"/>
+          <a:chOff x="0" y="0"/>
+          <a:chExt cx="0" cy="0"/>
+        </a:xfrm>
+      </p:grpSpPr>
+      <p:sp>
+        <p:nvSpPr>
+          <p:cNvPr id="2" name="Slide Image Placeholder 1"/>
+          <p:cNvSpPr>
+            <a:spLocks noGrp="1" noRot="1" noChangeAspect="1"/>
+          </p:cNvSpPr>
+          <p:nvPr>
+            <p:ph type="sldImg"/>
+          </p:nvPr>
+        </p:nvSpPr>
+        <p:spPr/>
+      </p:sp>
+      <p:sp>
+        <p:nvSpPr>
+          <p:cNvPr id="3" name="Notes Placeholder 2"/>
+          <p:cNvSpPr>
+            <a:spLocks noGrp="1"/>
+          </p:cNvSpPr>
+          <p:nvPr>
+            <p:ph type="body" idx="1"/>
+          </p:nvPr>
+        </p:nvSpPr>
+        <p:spPr/>
+        <p:txBody>
+          <a:bodyPr/>
+          <a:lstStyle/>
+          <a:p>
+            <a:endParaRPr lang="en-US" dirty="0"/>
+          </a:p>
+        </p:txBody>
+      </p:sp>
+      <p:sp>
+        <p:nvSpPr>
+          <p:cNvPr id="4" name="Slide Number Placeholder 3"/>
+          <p:cNvSpPr>
+            <a:spLocks noGrp="1"/>
+          </p:cNvSpPr>
+          <p:nvPr>
+            <p:ph type="sldNum" sz="quarter" idx="10"/>
+          </p:nvPr>
+        </p:nvSpPr>
+        <p:spPr/>
+        <p:txBody>
+          <a:bodyPr/>
+          <a:lstStyle/>
+          <a:p>
+            <a:fld id="{3D333A4B-B0C0-41D5-8830-D1E3718BA891}" type="slidenum">
+              <a:rPr lang="en-US" smtClean="0"/>
+              <a:t>13</a:t>
+            </a:fld>
+            <a:endParaRPr lang="en-US"/>
+          </a:p>
+        </p:txBody>
+      </p:sp>
+    </p:spTree>
+    <p:extLst>
+      <p:ext uri="{BB962C8B-B14F-4D97-AF65-F5344CB8AC3E}">
+        <p14:creationId xmlns:p14="http://schemas.microsoft.com/office/powerpoint/2010/main" val="36774307"/>
+      </p:ext>
+    </p:extLst>
+  </p:cSld>
+  <p:clrMapOvr>
+    <a:masterClrMapping/>
+  </p:clrMapOvr>
+</p:notes>
+</file>
+
 <file path=ppt/slideLayouts/slideLayout1.xml><?xml version="1.0" encoding="utf-8"?>
 <p:sldLayout xmlns:a="http://schemas.openxmlformats.org/drawingml/2006/main" xmlns:r="http://schemas.openxmlformats.org/officeDocument/2006/relationships" xmlns:p="http://schemas.openxmlformats.org/presentationml/2006/main" type="title" preserve="1">
   <p:cSld name="Title Slide">
@@ -1340,7 +1424,7 @@
           <a:p>
             <a:fld id="{F552E4DF-CF9E-431C-BABE-2D0DA00FD989}" type="datetimeFigureOut">
               <a:rPr lang="en-US" smtClean="0"/>
-              <a:t>7/1/2018</a:t>
+              <a:t>7/2/2018</a:t>
             </a:fld>
             <a:endParaRPr lang="en-US"/>
           </a:p>
@@ -1538,7 +1622,7 @@
           <a:p>
             <a:fld id="{F552E4DF-CF9E-431C-BABE-2D0DA00FD989}" type="datetimeFigureOut">
               <a:rPr lang="en-US" smtClean="0"/>
-              <a:t>7/1/2018</a:t>
+              <a:t>7/2/2018</a:t>
             </a:fld>
             <a:endParaRPr lang="en-US"/>
           </a:p>
@@ -1746,7 +1830,7 @@
           <a:p>
             <a:fld id="{F552E4DF-CF9E-431C-BABE-2D0DA00FD989}" type="datetimeFigureOut">
               <a:rPr lang="en-US" smtClean="0"/>
-              <a:t>7/1/2018</a:t>
+              <a:t>7/2/2018</a:t>
             </a:fld>
             <a:endParaRPr lang="en-US"/>
           </a:p>
@@ -1944,7 +2028,7 @@
           <a:p>
             <a:fld id="{F552E4DF-CF9E-431C-BABE-2D0DA00FD989}" type="datetimeFigureOut">
               <a:rPr lang="en-US" smtClean="0"/>
-              <a:t>7/1/2018</a:t>
+              <a:t>7/2/2018</a:t>
             </a:fld>
             <a:endParaRPr lang="en-US"/>
           </a:p>
@@ -2219,7 +2303,7 @@
           <a:p>
             <a:fld id="{F552E4DF-CF9E-431C-BABE-2D0DA00FD989}" type="datetimeFigureOut">
               <a:rPr lang="en-US" smtClean="0"/>
-              <a:t>7/1/2018</a:t>
+              <a:t>7/2/2018</a:t>
             </a:fld>
             <a:endParaRPr lang="en-US"/>
           </a:p>
@@ -2484,7 +2568,7 @@
           <a:p>
             <a:fld id="{F552E4DF-CF9E-431C-BABE-2D0DA00FD989}" type="datetimeFigureOut">
               <a:rPr lang="en-US" smtClean="0"/>
-              <a:t>7/1/2018</a:t>
+              <a:t>7/2/2018</a:t>
             </a:fld>
             <a:endParaRPr lang="en-US"/>
           </a:p>
@@ -2896,7 +2980,7 @@
           <a:p>
             <a:fld id="{F552E4DF-CF9E-431C-BABE-2D0DA00FD989}" type="datetimeFigureOut">
               <a:rPr lang="en-US" smtClean="0"/>
-              <a:t>7/1/2018</a:t>
+              <a:t>7/2/2018</a:t>
             </a:fld>
             <a:endParaRPr lang="en-US"/>
           </a:p>
@@ -3037,7 +3121,7 @@
           <a:p>
             <a:fld id="{F552E4DF-CF9E-431C-BABE-2D0DA00FD989}" type="datetimeFigureOut">
               <a:rPr lang="en-US" smtClean="0"/>
-              <a:t>7/1/2018</a:t>
+              <a:t>7/2/2018</a:t>
             </a:fld>
             <a:endParaRPr lang="en-US"/>
           </a:p>
@@ -3150,7 +3234,7 @@
           <a:p>
             <a:fld id="{F552E4DF-CF9E-431C-BABE-2D0DA00FD989}" type="datetimeFigureOut">
               <a:rPr lang="en-US" smtClean="0"/>
-              <a:t>7/1/2018</a:t>
+              <a:t>7/2/2018</a:t>
             </a:fld>
             <a:endParaRPr lang="en-US"/>
           </a:p>
@@ -3461,7 +3545,7 @@
           <a:p>
             <a:fld id="{F552E4DF-CF9E-431C-BABE-2D0DA00FD989}" type="datetimeFigureOut">
               <a:rPr lang="en-US" smtClean="0"/>
-              <a:t>7/1/2018</a:t>
+              <a:t>7/2/2018</a:t>
             </a:fld>
             <a:endParaRPr lang="en-US"/>
           </a:p>
@@ -3749,7 +3833,7 @@
           <a:p>
             <a:fld id="{F552E4DF-CF9E-431C-BABE-2D0DA00FD989}" type="datetimeFigureOut">
               <a:rPr lang="en-US" smtClean="0"/>
-              <a:t>7/1/2018</a:t>
+              <a:t>7/2/2018</a:t>
             </a:fld>
             <a:endParaRPr lang="en-US"/>
           </a:p>
@@ -3990,7 +4074,7 @@
           <a:p>
             <a:fld id="{F552E4DF-CF9E-431C-BABE-2D0DA00FD989}" type="datetimeFigureOut">
               <a:rPr lang="en-US" smtClean="0"/>
-              <a:t>7/1/2018</a:t>
+              <a:t>7/2/2018</a:t>
             </a:fld>
             <a:endParaRPr lang="en-US"/>
           </a:p>
@@ -5586,7 +5670,7 @@
           </p:nvPr>
         </p:nvPicPr>
         <p:blipFill>
-          <a:blip r:embed="rId2"/>
+          <a:blip r:embed="rId3"/>
           <a:stretch>
             <a:fillRect/>
           </a:stretch>
@@ -5601,6 +5685,46 @@
           </a:prstGeom>
         </p:spPr>
       </p:pic>
+      <p:sp>
+        <p:nvSpPr>
+          <p:cNvPr id="2" name="TextBox 1">
+            <a:extLst>
+              <a:ext uri="{FF2B5EF4-FFF2-40B4-BE49-F238E27FC236}">
+                <a16:creationId xmlns:a16="http://schemas.microsoft.com/office/drawing/2014/main" id="{06415251-53F6-45A7-A87E-F55D6E85B378}"/>
+              </a:ext>
+            </a:extLst>
+          </p:cNvPr>
+          <p:cNvSpPr txBox="1"/>
+          <p:nvPr/>
+        </p:nvSpPr>
+        <p:spPr>
+          <a:xfrm>
+            <a:off x="7727950" y="6508750"/>
+            <a:ext cx="4464050" cy="338554"/>
+          </a:xfrm>
+          <a:prstGeom prst="rect">
+            <a:avLst/>
+          </a:prstGeom>
+          <a:noFill/>
+        </p:spPr>
+        <p:txBody>
+          <a:bodyPr wrap="square" rtlCol="0">
+            <a:spAutoFit/>
+          </a:bodyPr>
+          <a:lstStyle/>
+          <a:p>
+            <a:pPr algn="r"/>
+            <a:r>
+              <a:rPr lang="en-US" sz="1600" dirty="0">
+                <a:solidFill>
+                  <a:schemeClr val="bg1"/>
+                </a:solidFill>
+              </a:rPr>
+              <a:t>Created with RRD Tools</a:t>
+            </a:r>
+          </a:p>
+        </p:txBody>
+      </p:sp>
     </p:spTree>
     <p:extLst>
       <p:ext uri="{BB962C8B-B14F-4D97-AF65-F5344CB8AC3E}">
@@ -6571,7 +6695,7 @@
         <p:spPr>
           <a:xfrm>
             <a:off x="5297762" y="2799889"/>
-            <a:ext cx="5747187" cy="2987543"/>
+            <a:ext cx="5747187" cy="3340560"/>
           </a:xfrm>
         </p:spPr>
         <p:txBody>
@@ -6650,13 +6774,6 @@
               </a:rPr>
               <a:t>POSIX (Unix-like OS)</a:t>
             </a:r>
-          </a:p>
-          <a:p>
-            <a:endParaRPr lang="en-US" sz="3200" dirty="0">
-              <a:solidFill>
-                <a:srgbClr val="FFFFFF"/>
-              </a:solidFill>
-            </a:endParaRPr>
           </a:p>
         </p:txBody>
       </p:sp>
@@ -7595,6 +7712,93 @@
           </a:p>
         </p:txBody>
       </p:sp>
+      <p:grpSp>
+        <p:nvGrpSpPr>
+          <p:cNvPr id="16" name="Group 15">
+            <a:extLst>
+              <a:ext uri="{FF2B5EF4-FFF2-40B4-BE49-F238E27FC236}">
+                <a16:creationId xmlns:a16="http://schemas.microsoft.com/office/drawing/2014/main" id="{A0135E10-A7AF-401D-90A0-045F1140E6A2}"/>
+              </a:ext>
+            </a:extLst>
+          </p:cNvPr>
+          <p:cNvGrpSpPr/>
+          <p:nvPr/>
+        </p:nvGrpSpPr>
+        <p:grpSpPr>
+          <a:xfrm>
+            <a:off x="9663113" y="1211806"/>
+            <a:ext cx="1086689" cy="946150"/>
+            <a:chOff x="134541" y="1294605"/>
+            <a:chExt cx="2761457" cy="2572545"/>
+          </a:xfrm>
+        </p:grpSpPr>
+        <p:pic>
+          <p:nvPicPr>
+            <p:cNvPr id="20" name="Picture 19" descr="A close up of a sign&#10;&#10;Description generated with high confidence">
+              <a:extLst>
+                <a:ext uri="{FF2B5EF4-FFF2-40B4-BE49-F238E27FC236}">
+                  <a16:creationId xmlns:a16="http://schemas.microsoft.com/office/drawing/2014/main" id="{548EE045-E73C-46AA-A85D-4598328D29FB}"/>
+                </a:ext>
+              </a:extLst>
+            </p:cNvPr>
+            <p:cNvPicPr>
+              <a:picLocks noChangeAspect="1"/>
+            </p:cNvPicPr>
+            <p:nvPr/>
+          </p:nvPicPr>
+          <p:blipFill>
+            <a:blip r:embed="rId5">
+              <a:extLst>
+                <a:ext uri="{28A0092B-C50C-407E-A947-70E740481C1C}">
+                  <a14:useLocalDpi xmlns:a14="http://schemas.microsoft.com/office/drawing/2010/main" val="0"/>
+                </a:ext>
+              </a:extLst>
+            </a:blip>
+            <a:stretch>
+              <a:fillRect/>
+            </a:stretch>
+          </p:blipFill>
+          <p:spPr>
+            <a:xfrm>
+              <a:off x="134541" y="1294605"/>
+              <a:ext cx="2572545" cy="2572545"/>
+            </a:xfrm>
+            <a:prstGeom prst="rect">
+              <a:avLst/>
+            </a:prstGeom>
+          </p:spPr>
+        </p:pic>
+        <p:pic>
+          <p:nvPicPr>
+            <p:cNvPr id="21" name="Picture 20">
+              <a:extLst>
+                <a:ext uri="{FF2B5EF4-FFF2-40B4-BE49-F238E27FC236}">
+                  <a16:creationId xmlns:a16="http://schemas.microsoft.com/office/drawing/2014/main" id="{1ED9D93F-2ADF-48EA-80FE-009F2E568616}"/>
+                </a:ext>
+              </a:extLst>
+            </p:cNvPr>
+            <p:cNvPicPr>
+              <a:picLocks noChangeAspect="1"/>
+            </p:cNvPicPr>
+            <p:nvPr/>
+          </p:nvPicPr>
+          <p:blipFill>
+            <a:blip r:embed="rId6"/>
+            <a:stretch>
+              <a:fillRect/>
+            </a:stretch>
+          </p:blipFill>
+          <p:spPr>
+            <a:xfrm>
+              <a:off x="2275086" y="2713407"/>
+              <a:ext cx="620912" cy="796284"/>
+            </a:xfrm>
+            <a:prstGeom prst="rect">
+              <a:avLst/>
+            </a:prstGeom>
+          </p:spPr>
+        </p:pic>
+      </p:grpSp>
     </p:spTree>
     <p:extLst>
       <p:ext uri="{BB962C8B-B14F-4D97-AF65-F5344CB8AC3E}">
@@ -8274,6 +8478,93 @@
           </a:p>
         </p:txBody>
       </p:sp>
+      <p:grpSp>
+        <p:nvGrpSpPr>
+          <p:cNvPr id="20" name="Group 19">
+            <a:extLst>
+              <a:ext uri="{FF2B5EF4-FFF2-40B4-BE49-F238E27FC236}">
+                <a16:creationId xmlns:a16="http://schemas.microsoft.com/office/drawing/2014/main" id="{15286CE1-98A7-44D7-BA54-51E9380E64EA}"/>
+              </a:ext>
+            </a:extLst>
+          </p:cNvPr>
+          <p:cNvGrpSpPr/>
+          <p:nvPr/>
+        </p:nvGrpSpPr>
+        <p:grpSpPr>
+          <a:xfrm>
+            <a:off x="9663113" y="1211806"/>
+            <a:ext cx="1086689" cy="946150"/>
+            <a:chOff x="134541" y="1294605"/>
+            <a:chExt cx="2761457" cy="2572545"/>
+          </a:xfrm>
+        </p:grpSpPr>
+        <p:pic>
+          <p:nvPicPr>
+            <p:cNvPr id="29" name="Picture 28" descr="A close up of a sign&#10;&#10;Description generated with high confidence">
+              <a:extLst>
+                <a:ext uri="{FF2B5EF4-FFF2-40B4-BE49-F238E27FC236}">
+                  <a16:creationId xmlns:a16="http://schemas.microsoft.com/office/drawing/2014/main" id="{3E7C9B39-7FF2-464D-9932-E139486E6970}"/>
+                </a:ext>
+              </a:extLst>
+            </p:cNvPr>
+            <p:cNvPicPr>
+              <a:picLocks noChangeAspect="1"/>
+            </p:cNvPicPr>
+            <p:nvPr/>
+          </p:nvPicPr>
+          <p:blipFill>
+            <a:blip r:embed="rId5">
+              <a:extLst>
+                <a:ext uri="{28A0092B-C50C-407E-A947-70E740481C1C}">
+                  <a14:useLocalDpi xmlns:a14="http://schemas.microsoft.com/office/drawing/2010/main" val="0"/>
+                </a:ext>
+              </a:extLst>
+            </a:blip>
+            <a:stretch>
+              <a:fillRect/>
+            </a:stretch>
+          </p:blipFill>
+          <p:spPr>
+            <a:xfrm>
+              <a:off x="134541" y="1294605"/>
+              <a:ext cx="2572545" cy="2572545"/>
+            </a:xfrm>
+            <a:prstGeom prst="rect">
+              <a:avLst/>
+            </a:prstGeom>
+          </p:spPr>
+        </p:pic>
+        <p:pic>
+          <p:nvPicPr>
+            <p:cNvPr id="31" name="Picture 30">
+              <a:extLst>
+                <a:ext uri="{FF2B5EF4-FFF2-40B4-BE49-F238E27FC236}">
+                  <a16:creationId xmlns:a16="http://schemas.microsoft.com/office/drawing/2014/main" id="{0337B37F-ECAF-4281-8AFF-06A47FBAF089}"/>
+                </a:ext>
+              </a:extLst>
+            </p:cNvPr>
+            <p:cNvPicPr>
+              <a:picLocks noChangeAspect="1"/>
+            </p:cNvPicPr>
+            <p:nvPr/>
+          </p:nvPicPr>
+          <p:blipFill>
+            <a:blip r:embed="rId6"/>
+            <a:stretch>
+              <a:fillRect/>
+            </a:stretch>
+          </p:blipFill>
+          <p:spPr>
+            <a:xfrm>
+              <a:off x="2275086" y="2713407"/>
+              <a:ext cx="620912" cy="796284"/>
+            </a:xfrm>
+            <a:prstGeom prst="rect">
+              <a:avLst/>
+            </a:prstGeom>
+          </p:spPr>
+        </p:pic>
+      </p:grpSp>
     </p:spTree>
     <p:extLst>
       <p:ext uri="{BB962C8B-B14F-4D97-AF65-F5344CB8AC3E}">

</xml_diff>